<commit_message>
Slightly modified the order of frontend tools. This makes more sense for the presentation
</commit_message>
<xml_diff>
--- a/Präsentation/YourChoice.pptx
+++ b/Präsentation/YourChoice.pptx
@@ -487,7 +487,7 @@
             <a:fld id="{5923F103-BC34-4FE4-A40E-EDDEECFDA5D0}" type="datetimeFigureOut">
               <a:rPr lang="en-US" dirty="0"/>
               <a:pPr/>
-              <a:t>18-Mar-18</a:t>
+              <a:t>3/20/2018</a:t>
             </a:fld>
             <a:endParaRPr lang="en-US" dirty="0"/>
           </a:p>
@@ -1575,7 +1575,7 @@
           <a:p>
             <a:fld id="{923A1CC3-2375-41D4-9E03-427CAF2A4C1A}" type="datetimeFigureOut">
               <a:rPr lang="en-US" dirty="0"/>
-              <a:t>18-Mar-18</a:t>
+              <a:t>3/20/2018</a:t>
             </a:fld>
             <a:endParaRPr lang="en-US" dirty="0"/>
           </a:p>
@@ -2555,7 +2555,7 @@
           <a:p>
             <a:fld id="{AFF16868-8199-4C2C-A5B1-63AEE139F88E}" type="datetimeFigureOut">
               <a:rPr lang="en-US" dirty="0"/>
-              <a:t>18-Mar-18</a:t>
+              <a:t>3/20/2018</a:t>
             </a:fld>
             <a:endParaRPr lang="en-US" dirty="0"/>
           </a:p>
@@ -3689,7 +3689,7 @@
           <a:p>
             <a:fld id="{AAD9FF7F-6988-44CC-821B-644E70CD2F73}" type="datetimeFigureOut">
               <a:rPr lang="en-US" dirty="0"/>
-              <a:t>18-Mar-18</a:t>
+              <a:t>3/20/2018</a:t>
             </a:fld>
             <a:endParaRPr lang="en-US" dirty="0"/>
           </a:p>
@@ -4722,7 +4722,7 @@
           <a:p>
             <a:fld id="{5C12C299-16B2-4475-990D-751901EACC14}" type="datetimeFigureOut">
               <a:rPr lang="en-US" dirty="0"/>
-              <a:t>18-Mar-18</a:t>
+              <a:t>3/20/2018</a:t>
             </a:fld>
             <a:endParaRPr lang="en-US" dirty="0"/>
           </a:p>
@@ -5382,7 +5382,7 @@
           <a:p>
             <a:fld id="{9FE86839-B9D8-4651-8783-F325ECE74E65}" type="datetimeFigureOut">
               <a:rPr lang="en-US" dirty="0"/>
-              <a:t>18-Mar-18</a:t>
+              <a:t>3/20/2018</a:t>
             </a:fld>
             <a:endParaRPr lang="en-US" dirty="0"/>
           </a:p>
@@ -6243,7 +6243,7 @@
           <a:p>
             <a:fld id="{FD484F64-32F6-45C5-931F-ADC1662401D0}" type="datetimeFigureOut">
               <a:rPr lang="en-US" dirty="0"/>
-              <a:t>18-Mar-18</a:t>
+              <a:t>3/20/2018</a:t>
             </a:fld>
             <a:endParaRPr lang="en-US" dirty="0"/>
           </a:p>
@@ -6433,7 +6433,7 @@
           <a:p>
             <a:fld id="{53086D93-FCAC-47E0-A2EE-787E62CA814C}" type="datetimeFigureOut">
               <a:rPr lang="en-US" dirty="0"/>
-              <a:t>18-Mar-18</a:t>
+              <a:t>3/20/2018</a:t>
             </a:fld>
             <a:endParaRPr lang="en-US" dirty="0"/>
           </a:p>
@@ -7405,7 +7405,7 @@
           <a:p>
             <a:fld id="{CDA879A6-0FD0-4734-A311-86BFCA472E6E}" type="datetimeFigureOut">
               <a:rPr lang="en-US" dirty="0"/>
-              <a:t>18-Mar-18</a:t>
+              <a:t>3/20/2018</a:t>
             </a:fld>
             <a:endParaRPr lang="en-US" dirty="0"/>
           </a:p>
@@ -7616,7 +7616,7 @@
           <a:p>
             <a:fld id="{19C9CA7B-DFD4-44B5-8C60-D14B8CD1FB59}" type="datetimeFigureOut">
               <a:rPr lang="en-US" dirty="0"/>
-              <a:t>18-Mar-18</a:t>
+              <a:t>3/20/2018</a:t>
             </a:fld>
             <a:endParaRPr lang="en-US" dirty="0"/>
           </a:p>
@@ -8650,7 +8650,7 @@
           <a:p>
             <a:fld id="{F34E6425-0181-43F2-84FC-787E803FD2F8}" type="datetimeFigureOut">
               <a:rPr lang="en-US" dirty="0"/>
-              <a:t>18-Mar-18</a:t>
+              <a:t>3/20/2018</a:t>
             </a:fld>
             <a:endParaRPr lang="en-US" dirty="0"/>
           </a:p>
@@ -8922,7 +8922,7 @@
           <a:p>
             <a:fld id="{3BDB8791-F1B0-41E7-B7FD-A781E65C4266}" type="datetimeFigureOut">
               <a:rPr lang="en-US" dirty="0"/>
-              <a:t>18-Mar-18</a:t>
+              <a:t>3/20/2018</a:t>
             </a:fld>
             <a:endParaRPr lang="en-US" dirty="0"/>
           </a:p>
@@ -9332,7 +9332,7 @@
           <a:p>
             <a:fld id="{5FDD63B2-E120-4ED8-B27B-C685F510A5FE}" type="datetimeFigureOut">
               <a:rPr lang="en-US" dirty="0"/>
-              <a:t>18-Mar-18</a:t>
+              <a:t>3/20/2018</a:t>
             </a:fld>
             <a:endParaRPr lang="en-US" dirty="0"/>
           </a:p>
@@ -9459,7 +9459,7 @@
           <a:p>
             <a:fld id="{7AA18ACC-A947-437B-A130-35BD54FDF1E9}" type="datetimeFigureOut">
               <a:rPr lang="en-US" dirty="0"/>
-              <a:t>18-Mar-18</a:t>
+              <a:t>3/20/2018</a:t>
             </a:fld>
             <a:endParaRPr lang="en-US" dirty="0"/>
           </a:p>
@@ -9554,7 +9554,7 @@
           <a:p>
             <a:fld id="{7C8D7E02-BCB8-4D50-A234-369438C08659}" type="datetimeFigureOut">
               <a:rPr lang="en-US" dirty="0"/>
-              <a:t>18-Mar-18</a:t>
+              <a:t>3/20/2018</a:t>
             </a:fld>
             <a:endParaRPr lang="en-US" dirty="0"/>
           </a:p>
@@ -10635,7 +10635,7 @@
           <a:p>
             <a:fld id="{76E86A4C-8E40-4F87-A4F0-01A0687C5742}" type="datetimeFigureOut">
               <a:rPr lang="en-US" dirty="0"/>
-              <a:t>18-Mar-18</a:t>
+              <a:t>3/20/2018</a:t>
             </a:fld>
             <a:endParaRPr lang="en-US" dirty="0"/>
           </a:p>
@@ -11743,7 +11743,7 @@
           <a:p>
             <a:fld id="{35E72C73-2D91-4E12-BA25-F0AA0C03599B}" type="datetimeFigureOut">
               <a:rPr lang="en-US" dirty="0"/>
-              <a:t>18-Mar-18</a:t>
+              <a:t>3/20/2018</a:t>
             </a:fld>
             <a:endParaRPr lang="en-US" dirty="0"/>
           </a:p>
@@ -12740,7 +12740,7 @@
           <a:p>
             <a:fld id="{2BE451C3-0FF4-47C4-B829-773ADF60F88C}" type="datetimeFigureOut">
               <a:rPr lang="en-US" dirty="0"/>
-              <a:t>18-Mar-18</a:t>
+              <a:t>3/20/2018</a:t>
             </a:fld>
             <a:endParaRPr lang="en-US" dirty="0"/>
           </a:p>
@@ -14262,69 +14262,98 @@
           <a:lstStyle/>
           <a:p>
             <a:r>
-              <a:rPr lang="de-DE" sz="1600">
+              <a:rPr lang="de-DE" sz="1600" dirty="0">
                 <a:solidFill>
                   <a:schemeClr val="tx1"/>
                 </a:solidFill>
               </a:rPr>
-              <a:t>Node</a:t>
+              <a:t>Node.js</a:t>
             </a:r>
           </a:p>
           <a:p>
+            <a:r>
+              <a:rPr lang="de-DE" sz="1600" dirty="0">
+                <a:solidFill>
+                  <a:schemeClr val="tx1"/>
+                </a:solidFill>
+              </a:rPr>
+              <a:t>NPM</a:t>
+            </a:r>
+          </a:p>
+          <a:p>
+            <a:r>
+              <a:rPr lang="en-GB" sz="1600" dirty="0">
+                <a:solidFill>
+                  <a:schemeClr val="tx1"/>
+                </a:solidFill>
+              </a:rPr>
+              <a:t>B</a:t>
+            </a:r>
+            <a:r>
+              <a:rPr lang="de-DE" sz="1600" dirty="0" err="1">
+                <a:solidFill>
+                  <a:schemeClr val="tx1"/>
+                </a:solidFill>
+              </a:rPr>
+              <a:t>abel</a:t>
+            </a:r>
+            <a:endParaRPr lang="de-DE" sz="1600" dirty="0">
+              <a:solidFill>
+                <a:schemeClr val="tx1"/>
+              </a:solidFill>
+            </a:endParaRPr>
+          </a:p>
+          <a:p>
+            <a:r>
+              <a:rPr lang="en-GB" sz="1600" dirty="0">
+                <a:solidFill>
+                  <a:schemeClr val="tx1"/>
+                </a:solidFill>
+              </a:rPr>
+              <a:t>L</a:t>
+            </a:r>
+            <a:r>
+              <a:rPr lang="de-DE" sz="1600" dirty="0">
+                <a:solidFill>
+                  <a:schemeClr val="tx1"/>
+                </a:solidFill>
+              </a:rPr>
+              <a:t>ESS</a:t>
+            </a:r>
+          </a:p>
+          <a:p>
+            <a:r>
+              <a:rPr lang="en-GB" sz="1600" dirty="0">
+                <a:solidFill>
+                  <a:schemeClr val="tx1"/>
+                </a:solidFill>
+              </a:rPr>
+              <a:t>W</a:t>
+            </a:r>
             <a:r>
               <a:rPr lang="de-DE" sz="1600">
                 <a:solidFill>
                   <a:schemeClr val="tx1"/>
                 </a:solidFill>
               </a:rPr>
-              <a:t>Npm</a:t>
+              <a:t>ebpack</a:t>
             </a:r>
+            <a:endParaRPr lang="de-DE" sz="1600" dirty="0">
+              <a:solidFill>
+                <a:schemeClr val="tx1"/>
+              </a:solidFill>
+            </a:endParaRPr>
           </a:p>
           <a:p>
             <a:r>
-              <a:rPr lang="de-DE" sz="1600">
-                <a:solidFill>
-                  <a:schemeClr val="tx1"/>
-                </a:solidFill>
-              </a:rPr>
-              <a:t>Antd</a:t>
-            </a:r>
-          </a:p>
-          <a:p>
-            <a:r>
-              <a:rPr lang="de-DE" sz="1600">
-                <a:solidFill>
-                  <a:schemeClr val="tx1"/>
-                </a:solidFill>
-              </a:rPr>
-              <a:t>Axios</a:t>
-            </a:r>
-          </a:p>
-          <a:p>
-            <a:r>
-              <a:rPr lang="de-DE" sz="1600">
-                <a:solidFill>
-                  <a:schemeClr val="tx1"/>
-                </a:solidFill>
-              </a:rPr>
-              <a:t>Babel</a:t>
-            </a:r>
-          </a:p>
-          <a:p>
-            <a:r>
-              <a:rPr lang="de-DE" sz="1600">
+              <a:rPr lang="de-DE" sz="1600" dirty="0" err="1">
                 <a:solidFill>
                   <a:schemeClr val="tx1"/>
                 </a:solidFill>
               </a:rPr>
               <a:t>React</a:t>
             </a:r>
-          </a:p>
-          <a:p>
-            <a:pPr marL="0" indent="0">
-              <a:buNone/>
-            </a:pPr>
-            <a:endParaRPr lang="de-DE" sz="1600">
+            <a:endParaRPr lang="de-DE" sz="1600" dirty="0">
               <a:solidFill>
                 <a:schemeClr val="tx1"/>
               </a:solidFill>
@@ -14990,7 +15019,22 @@
           <a:lstStyle/>
           <a:p>
             <a:r>
-              <a:rPr lang="de-DE" sz="1600">
+              <a:rPr lang="de-DE" sz="1600" dirty="0" err="1">
+                <a:solidFill>
+                  <a:schemeClr val="tx1"/>
+                </a:solidFill>
+              </a:rPr>
+              <a:t>Antd</a:t>
+            </a:r>
+            <a:endParaRPr lang="de-DE" sz="1600" dirty="0">
+              <a:solidFill>
+                <a:schemeClr val="tx1"/>
+              </a:solidFill>
+            </a:endParaRPr>
+          </a:p>
+          <a:p>
+            <a:r>
+              <a:rPr lang="de-DE" sz="1600" dirty="0">
                 <a:solidFill>
                   <a:schemeClr val="tx1"/>
                 </a:solidFill>
@@ -15000,43 +15044,48 @@
           </a:p>
           <a:p>
             <a:r>
-              <a:rPr lang="de-DE" sz="1600">
+              <a:rPr lang="de-DE" sz="1600" dirty="0" err="1">
                 <a:solidFill>
                   <a:schemeClr val="tx1"/>
                 </a:solidFill>
               </a:rPr>
-              <a:t>Eslint</a:t>
+              <a:t>Axios</a:t>
             </a:r>
+            <a:endParaRPr lang="de-DE" sz="1600" dirty="0">
+              <a:solidFill>
+                <a:schemeClr val="tx1"/>
+              </a:solidFill>
+            </a:endParaRPr>
           </a:p>
           <a:p>
             <a:r>
-              <a:rPr lang="de-DE" sz="1600">
+              <a:rPr lang="de-DE" sz="1600" dirty="0" err="1">
                 <a:solidFill>
                   <a:schemeClr val="tx1"/>
                 </a:solidFill>
               </a:rPr>
-              <a:t>Moment</a:t>
+              <a:t>ESLint</a:t>
             </a:r>
+            <a:endParaRPr lang="de-DE" sz="1600" dirty="0">
+              <a:solidFill>
+                <a:schemeClr val="tx1"/>
+              </a:solidFill>
+            </a:endParaRPr>
           </a:p>
           <a:p>
             <a:r>
-              <a:rPr lang="de-DE" sz="1600">
+              <a:rPr lang="de-DE" sz="1600" dirty="0" err="1">
                 <a:solidFill>
                   <a:schemeClr val="tx1"/>
                 </a:solidFill>
               </a:rPr>
-              <a:t>Less</a:t>
+              <a:t>Prettier</a:t>
             </a:r>
-          </a:p>
-          <a:p>
-            <a:r>
-              <a:rPr lang="de-DE" sz="1600">
-                <a:solidFill>
-                  <a:schemeClr val="tx1"/>
-                </a:solidFill>
-              </a:rPr>
-              <a:t>prettier</a:t>
-            </a:r>
+            <a:endParaRPr lang="de-DE" sz="1600" dirty="0">
+              <a:solidFill>
+                <a:schemeClr val="tx1"/>
+              </a:solidFill>
+            </a:endParaRPr>
           </a:p>
         </p:txBody>
       </p:sp>

</xml_diff>

<commit_message>
added notes for my slide
</commit_message>
<xml_diff>
--- a/Präsentation/YourChoice.pptx
+++ b/Präsentation/YourChoice.pptx
@@ -4,6 +4,9 @@
   <p:sldMasterIdLst>
     <p:sldMasterId id="2147483648" r:id="rId1"/>
   </p:sldMasterIdLst>
+  <p:notesMasterIdLst>
+    <p:notesMasterId r:id="rId18"/>
+  </p:notesMasterIdLst>
   <p:sldIdLst>
     <p:sldId id="256" r:id="rId2"/>
     <p:sldId id="260" r:id="rId3"/>
@@ -151,6 +154,772 @@
 </p:presentation>
 </file>
 
+<file path=ppt/notesMasters/notesMaster1.xml><?xml version="1.0" encoding="utf-8"?>
+<p:notesMaster xmlns:a="http://schemas.openxmlformats.org/drawingml/2006/main" xmlns:r="http://schemas.openxmlformats.org/officeDocument/2006/relationships" xmlns:p="http://schemas.openxmlformats.org/presentationml/2006/main">
+  <p:cSld>
+    <p:bg>
+      <p:bgRef idx="1001">
+        <a:schemeClr val="bg1"/>
+      </p:bgRef>
+    </p:bg>
+    <p:spTree>
+      <p:nvGrpSpPr>
+        <p:cNvPr id="1" name=""/>
+        <p:cNvGrpSpPr/>
+        <p:nvPr/>
+      </p:nvGrpSpPr>
+      <p:grpSpPr>
+        <a:xfrm>
+          <a:off x="0" y="0"/>
+          <a:ext cx="0" cy="0"/>
+          <a:chOff x="0" y="0"/>
+          <a:chExt cx="0" cy="0"/>
+        </a:xfrm>
+      </p:grpSpPr>
+      <p:sp>
+        <p:nvSpPr>
+          <p:cNvPr id="2" name="Header Placeholder 1"/>
+          <p:cNvSpPr>
+            <a:spLocks noGrp="1"/>
+          </p:cNvSpPr>
+          <p:nvPr>
+            <p:ph type="hdr" sz="quarter"/>
+          </p:nvPr>
+        </p:nvSpPr>
+        <p:spPr>
+          <a:xfrm>
+            <a:off x="0" y="0"/>
+            <a:ext cx="2971800" cy="458788"/>
+          </a:xfrm>
+          <a:prstGeom prst="rect">
+            <a:avLst/>
+          </a:prstGeom>
+        </p:spPr>
+        <p:txBody>
+          <a:bodyPr vert="horz" lIns="91440" tIns="45720" rIns="91440" bIns="45720" rtlCol="0"/>
+          <a:lstStyle>
+            <a:lvl1pPr algn="l">
+              <a:defRPr sz="1200"/>
+            </a:lvl1pPr>
+          </a:lstStyle>
+          <a:p>
+            <a:endParaRPr lang="de-DE"/>
+          </a:p>
+        </p:txBody>
+      </p:sp>
+      <p:sp>
+        <p:nvSpPr>
+          <p:cNvPr id="3" name="Date Placeholder 2"/>
+          <p:cNvSpPr>
+            <a:spLocks noGrp="1"/>
+          </p:cNvSpPr>
+          <p:nvPr>
+            <p:ph type="dt" idx="1"/>
+          </p:nvPr>
+        </p:nvSpPr>
+        <p:spPr>
+          <a:xfrm>
+            <a:off x="3884613" y="0"/>
+            <a:ext cx="2971800" cy="458788"/>
+          </a:xfrm>
+          <a:prstGeom prst="rect">
+            <a:avLst/>
+          </a:prstGeom>
+        </p:spPr>
+        <p:txBody>
+          <a:bodyPr vert="horz" lIns="91440" tIns="45720" rIns="91440" bIns="45720" rtlCol="0"/>
+          <a:lstStyle>
+            <a:lvl1pPr algn="r">
+              <a:defRPr sz="1200"/>
+            </a:lvl1pPr>
+          </a:lstStyle>
+          <a:p>
+            <a:fld id="{E4DEAD90-4A80-4B89-AD7F-4BDBF11CDDA5}" type="datetimeFigureOut">
+              <a:rPr lang="de-DE" smtClean="0"/>
+              <a:t>20.03.2018</a:t>
+            </a:fld>
+            <a:endParaRPr lang="de-DE"/>
+          </a:p>
+        </p:txBody>
+      </p:sp>
+      <p:sp>
+        <p:nvSpPr>
+          <p:cNvPr id="4" name="Slide Image Placeholder 3"/>
+          <p:cNvSpPr>
+            <a:spLocks noGrp="1" noRot="1" noChangeAspect="1"/>
+          </p:cNvSpPr>
+          <p:nvPr>
+            <p:ph type="sldImg" idx="2"/>
+          </p:nvPr>
+        </p:nvSpPr>
+        <p:spPr>
+          <a:xfrm>
+            <a:off x="685800" y="1143000"/>
+            <a:ext cx="5486400" cy="3086100"/>
+          </a:xfrm>
+          <a:prstGeom prst="rect">
+            <a:avLst/>
+          </a:prstGeom>
+          <a:noFill/>
+          <a:ln w="12700">
+            <a:solidFill>
+              <a:prstClr val="black"/>
+            </a:solidFill>
+          </a:ln>
+        </p:spPr>
+        <p:txBody>
+          <a:bodyPr vert="horz" lIns="91440" tIns="45720" rIns="91440" bIns="45720" rtlCol="0" anchor="ctr"/>
+          <a:lstStyle/>
+          <a:p>
+            <a:endParaRPr lang="de-DE"/>
+          </a:p>
+        </p:txBody>
+      </p:sp>
+      <p:sp>
+        <p:nvSpPr>
+          <p:cNvPr id="5" name="Notes Placeholder 4"/>
+          <p:cNvSpPr>
+            <a:spLocks noGrp="1"/>
+          </p:cNvSpPr>
+          <p:nvPr>
+            <p:ph type="body" sz="quarter" idx="3"/>
+          </p:nvPr>
+        </p:nvSpPr>
+        <p:spPr>
+          <a:xfrm>
+            <a:off x="685800" y="4400550"/>
+            <a:ext cx="5486400" cy="3600450"/>
+          </a:xfrm>
+          <a:prstGeom prst="rect">
+            <a:avLst/>
+          </a:prstGeom>
+        </p:spPr>
+        <p:txBody>
+          <a:bodyPr vert="horz" lIns="91440" tIns="45720" rIns="91440" bIns="45720" rtlCol="0"/>
+          <a:lstStyle/>
+          <a:p>
+            <a:pPr lvl="0"/>
+            <a:r>
+              <a:rPr lang="en-US"/>
+              <a:t>Edit Master text styles</a:t>
+            </a:r>
+          </a:p>
+          <a:p>
+            <a:pPr lvl="1"/>
+            <a:r>
+              <a:rPr lang="en-US"/>
+              <a:t>Second level</a:t>
+            </a:r>
+          </a:p>
+          <a:p>
+            <a:pPr lvl="2"/>
+            <a:r>
+              <a:rPr lang="en-US"/>
+              <a:t>Third level</a:t>
+            </a:r>
+          </a:p>
+          <a:p>
+            <a:pPr lvl="3"/>
+            <a:r>
+              <a:rPr lang="en-US"/>
+              <a:t>Fourth level</a:t>
+            </a:r>
+          </a:p>
+          <a:p>
+            <a:pPr lvl="4"/>
+            <a:r>
+              <a:rPr lang="en-US"/>
+              <a:t>Fifth level</a:t>
+            </a:r>
+            <a:endParaRPr lang="de-DE"/>
+          </a:p>
+        </p:txBody>
+      </p:sp>
+      <p:sp>
+        <p:nvSpPr>
+          <p:cNvPr id="6" name="Footer Placeholder 5"/>
+          <p:cNvSpPr>
+            <a:spLocks noGrp="1"/>
+          </p:cNvSpPr>
+          <p:nvPr>
+            <p:ph type="ftr" sz="quarter" idx="4"/>
+          </p:nvPr>
+        </p:nvSpPr>
+        <p:spPr>
+          <a:xfrm>
+            <a:off x="0" y="8685213"/>
+            <a:ext cx="2971800" cy="458787"/>
+          </a:xfrm>
+          <a:prstGeom prst="rect">
+            <a:avLst/>
+          </a:prstGeom>
+        </p:spPr>
+        <p:txBody>
+          <a:bodyPr vert="horz" lIns="91440" tIns="45720" rIns="91440" bIns="45720" rtlCol="0" anchor="b"/>
+          <a:lstStyle>
+            <a:lvl1pPr algn="l">
+              <a:defRPr sz="1200"/>
+            </a:lvl1pPr>
+          </a:lstStyle>
+          <a:p>
+            <a:endParaRPr lang="de-DE"/>
+          </a:p>
+        </p:txBody>
+      </p:sp>
+      <p:sp>
+        <p:nvSpPr>
+          <p:cNvPr id="7" name="Slide Number Placeholder 6"/>
+          <p:cNvSpPr>
+            <a:spLocks noGrp="1"/>
+          </p:cNvSpPr>
+          <p:nvPr>
+            <p:ph type="sldNum" sz="quarter" idx="5"/>
+          </p:nvPr>
+        </p:nvSpPr>
+        <p:spPr>
+          <a:xfrm>
+            <a:off x="3884613" y="8685213"/>
+            <a:ext cx="2971800" cy="458787"/>
+          </a:xfrm>
+          <a:prstGeom prst="rect">
+            <a:avLst/>
+          </a:prstGeom>
+        </p:spPr>
+        <p:txBody>
+          <a:bodyPr vert="horz" lIns="91440" tIns="45720" rIns="91440" bIns="45720" rtlCol="0" anchor="b"/>
+          <a:lstStyle>
+            <a:lvl1pPr algn="r">
+              <a:defRPr sz="1200"/>
+            </a:lvl1pPr>
+          </a:lstStyle>
+          <a:p>
+            <a:fld id="{09177962-0B6C-4A60-8A0A-9A648941852D}" type="slidenum">
+              <a:rPr lang="de-DE" smtClean="0"/>
+              <a:t>‹#›</a:t>
+            </a:fld>
+            <a:endParaRPr lang="de-DE"/>
+          </a:p>
+        </p:txBody>
+      </p:sp>
+    </p:spTree>
+    <p:extLst>
+      <p:ext uri="{BB962C8B-B14F-4D97-AF65-F5344CB8AC3E}">
+        <p14:creationId xmlns:p14="http://schemas.microsoft.com/office/powerpoint/2010/main" val="1169975336"/>
+      </p:ext>
+    </p:extLst>
+  </p:cSld>
+  <p:clrMap bg1="lt1" tx1="dk1" bg2="lt2" tx2="dk2" accent1="accent1" accent2="accent2" accent3="accent3" accent4="accent4" accent5="accent5" accent6="accent6" hlink="hlink" folHlink="folHlink"/>
+  <p:notesStyle>
+    <a:lvl1pPr marL="0" algn="l" defTabSz="914400" rtl="0" eaLnBrk="1" latinLnBrk="0" hangingPunct="1">
+      <a:defRPr sz="1200" kern="1200">
+        <a:solidFill>
+          <a:schemeClr val="tx1"/>
+        </a:solidFill>
+        <a:latin typeface="+mn-lt"/>
+        <a:ea typeface="+mn-ea"/>
+        <a:cs typeface="+mn-cs"/>
+      </a:defRPr>
+    </a:lvl1pPr>
+    <a:lvl2pPr marL="457200" algn="l" defTabSz="914400" rtl="0" eaLnBrk="1" latinLnBrk="0" hangingPunct="1">
+      <a:defRPr sz="1200" kern="1200">
+        <a:solidFill>
+          <a:schemeClr val="tx1"/>
+        </a:solidFill>
+        <a:latin typeface="+mn-lt"/>
+        <a:ea typeface="+mn-ea"/>
+        <a:cs typeface="+mn-cs"/>
+      </a:defRPr>
+    </a:lvl2pPr>
+    <a:lvl3pPr marL="914400" algn="l" defTabSz="914400" rtl="0" eaLnBrk="1" latinLnBrk="0" hangingPunct="1">
+      <a:defRPr sz="1200" kern="1200">
+        <a:solidFill>
+          <a:schemeClr val="tx1"/>
+        </a:solidFill>
+        <a:latin typeface="+mn-lt"/>
+        <a:ea typeface="+mn-ea"/>
+        <a:cs typeface="+mn-cs"/>
+      </a:defRPr>
+    </a:lvl3pPr>
+    <a:lvl4pPr marL="1371600" algn="l" defTabSz="914400" rtl="0" eaLnBrk="1" latinLnBrk="0" hangingPunct="1">
+      <a:defRPr sz="1200" kern="1200">
+        <a:solidFill>
+          <a:schemeClr val="tx1"/>
+        </a:solidFill>
+        <a:latin typeface="+mn-lt"/>
+        <a:ea typeface="+mn-ea"/>
+        <a:cs typeface="+mn-cs"/>
+      </a:defRPr>
+    </a:lvl4pPr>
+    <a:lvl5pPr marL="1828800" algn="l" defTabSz="914400" rtl="0" eaLnBrk="1" latinLnBrk="0" hangingPunct="1">
+      <a:defRPr sz="1200" kern="1200">
+        <a:solidFill>
+          <a:schemeClr val="tx1"/>
+        </a:solidFill>
+        <a:latin typeface="+mn-lt"/>
+        <a:ea typeface="+mn-ea"/>
+        <a:cs typeface="+mn-cs"/>
+      </a:defRPr>
+    </a:lvl5pPr>
+    <a:lvl6pPr marL="2286000" algn="l" defTabSz="914400" rtl="0" eaLnBrk="1" latinLnBrk="0" hangingPunct="1">
+      <a:defRPr sz="1200" kern="1200">
+        <a:solidFill>
+          <a:schemeClr val="tx1"/>
+        </a:solidFill>
+        <a:latin typeface="+mn-lt"/>
+        <a:ea typeface="+mn-ea"/>
+        <a:cs typeface="+mn-cs"/>
+      </a:defRPr>
+    </a:lvl6pPr>
+    <a:lvl7pPr marL="2743200" algn="l" defTabSz="914400" rtl="0" eaLnBrk="1" latinLnBrk="0" hangingPunct="1">
+      <a:defRPr sz="1200" kern="1200">
+        <a:solidFill>
+          <a:schemeClr val="tx1"/>
+        </a:solidFill>
+        <a:latin typeface="+mn-lt"/>
+        <a:ea typeface="+mn-ea"/>
+        <a:cs typeface="+mn-cs"/>
+      </a:defRPr>
+    </a:lvl7pPr>
+    <a:lvl8pPr marL="3200400" algn="l" defTabSz="914400" rtl="0" eaLnBrk="1" latinLnBrk="0" hangingPunct="1">
+      <a:defRPr sz="1200" kern="1200">
+        <a:solidFill>
+          <a:schemeClr val="tx1"/>
+        </a:solidFill>
+        <a:latin typeface="+mn-lt"/>
+        <a:ea typeface="+mn-ea"/>
+        <a:cs typeface="+mn-cs"/>
+      </a:defRPr>
+    </a:lvl8pPr>
+    <a:lvl9pPr marL="3657600" algn="l" defTabSz="914400" rtl="0" eaLnBrk="1" latinLnBrk="0" hangingPunct="1">
+      <a:defRPr sz="1200" kern="1200">
+        <a:solidFill>
+          <a:schemeClr val="tx1"/>
+        </a:solidFill>
+        <a:latin typeface="+mn-lt"/>
+        <a:ea typeface="+mn-ea"/>
+        <a:cs typeface="+mn-cs"/>
+      </a:defRPr>
+    </a:lvl9pPr>
+  </p:notesStyle>
+</p:notesMaster>
+</file>
+
+<file path=ppt/notesSlides/notesSlide1.xml><?xml version="1.0" encoding="utf-8"?>
+<p:notes xmlns:a="http://schemas.openxmlformats.org/drawingml/2006/main" xmlns:r="http://schemas.openxmlformats.org/officeDocument/2006/relationships" xmlns:p="http://schemas.openxmlformats.org/presentationml/2006/main">
+  <p:cSld>
+    <p:spTree>
+      <p:nvGrpSpPr>
+        <p:cNvPr id="1" name=""/>
+        <p:cNvGrpSpPr/>
+        <p:nvPr/>
+      </p:nvGrpSpPr>
+      <p:grpSpPr>
+        <a:xfrm>
+          <a:off x="0" y="0"/>
+          <a:ext cx="0" cy="0"/>
+          <a:chOff x="0" y="0"/>
+          <a:chExt cx="0" cy="0"/>
+        </a:xfrm>
+      </p:grpSpPr>
+      <p:sp>
+        <p:nvSpPr>
+          <p:cNvPr id="2" name="Slide Image Placeholder 1"/>
+          <p:cNvSpPr>
+            <a:spLocks noGrp="1" noRot="1" noChangeAspect="1"/>
+          </p:cNvSpPr>
+          <p:nvPr>
+            <p:ph type="sldImg"/>
+          </p:nvPr>
+        </p:nvSpPr>
+        <p:spPr/>
+      </p:sp>
+      <p:sp>
+        <p:nvSpPr>
+          <p:cNvPr id="3" name="Notes Placeholder 2"/>
+          <p:cNvSpPr>
+            <a:spLocks noGrp="1"/>
+          </p:cNvSpPr>
+          <p:nvPr>
+            <p:ph type="body" idx="1"/>
+          </p:nvPr>
+        </p:nvSpPr>
+        <p:spPr/>
+        <p:txBody>
+          <a:bodyPr/>
+          <a:lstStyle/>
+          <a:p>
+            <a:pPr marL="171450" indent="-171450">
+              <a:buFontTx/>
+              <a:buChar char="-"/>
+            </a:pPr>
+            <a:r>
+              <a:rPr lang="de-DE" dirty="0"/>
+              <a:t>Online Wahlsystem</a:t>
+            </a:r>
+          </a:p>
+        </p:txBody>
+      </p:sp>
+      <p:sp>
+        <p:nvSpPr>
+          <p:cNvPr id="4" name="Slide Number Placeholder 3"/>
+          <p:cNvSpPr>
+            <a:spLocks noGrp="1"/>
+          </p:cNvSpPr>
+          <p:nvPr>
+            <p:ph type="sldNum" sz="quarter" idx="10"/>
+          </p:nvPr>
+        </p:nvSpPr>
+        <p:spPr/>
+        <p:txBody>
+          <a:bodyPr/>
+          <a:lstStyle/>
+          <a:p>
+            <a:fld id="{09177962-0B6C-4A60-8A0A-9A648941852D}" type="slidenum">
+              <a:rPr lang="de-DE" smtClean="0"/>
+              <a:t>1</a:t>
+            </a:fld>
+            <a:endParaRPr lang="de-DE"/>
+          </a:p>
+        </p:txBody>
+      </p:sp>
+    </p:spTree>
+    <p:extLst>
+      <p:ext uri="{BB962C8B-B14F-4D97-AF65-F5344CB8AC3E}">
+        <p14:creationId xmlns:p14="http://schemas.microsoft.com/office/powerpoint/2010/main" val="4100263789"/>
+      </p:ext>
+    </p:extLst>
+  </p:cSld>
+  <p:clrMapOvr>
+    <a:masterClrMapping/>
+  </p:clrMapOvr>
+</p:notes>
+</file>
+
+<file path=ppt/notesSlides/notesSlide2.xml><?xml version="1.0" encoding="utf-8"?>
+<p:notes xmlns:a="http://schemas.openxmlformats.org/drawingml/2006/main" xmlns:r="http://schemas.openxmlformats.org/officeDocument/2006/relationships" xmlns:p="http://schemas.openxmlformats.org/presentationml/2006/main">
+  <p:cSld>
+    <p:spTree>
+      <p:nvGrpSpPr>
+        <p:cNvPr id="1" name=""/>
+        <p:cNvGrpSpPr/>
+        <p:nvPr/>
+      </p:nvGrpSpPr>
+      <p:grpSpPr>
+        <a:xfrm>
+          <a:off x="0" y="0"/>
+          <a:ext cx="0" cy="0"/>
+          <a:chOff x="0" y="0"/>
+          <a:chExt cx="0" cy="0"/>
+        </a:xfrm>
+      </p:grpSpPr>
+      <p:sp>
+        <p:nvSpPr>
+          <p:cNvPr id="2" name="Slide Image Placeholder 1"/>
+          <p:cNvSpPr>
+            <a:spLocks noGrp="1" noRot="1" noChangeAspect="1"/>
+          </p:cNvSpPr>
+          <p:nvPr>
+            <p:ph type="sldImg"/>
+          </p:nvPr>
+        </p:nvSpPr>
+        <p:spPr/>
+      </p:sp>
+      <p:sp>
+        <p:nvSpPr>
+          <p:cNvPr id="3" name="Notes Placeholder 2"/>
+          <p:cNvSpPr>
+            <a:spLocks noGrp="1"/>
+          </p:cNvSpPr>
+          <p:nvPr>
+            <p:ph type="body" idx="1"/>
+          </p:nvPr>
+        </p:nvSpPr>
+        <p:spPr/>
+        <p:txBody>
+          <a:bodyPr/>
+          <a:lstStyle/>
+          <a:p>
+            <a:endParaRPr lang="de-DE" dirty="0"/>
+          </a:p>
+        </p:txBody>
+      </p:sp>
+      <p:sp>
+        <p:nvSpPr>
+          <p:cNvPr id="4" name="Slide Number Placeholder 3"/>
+          <p:cNvSpPr>
+            <a:spLocks noGrp="1"/>
+          </p:cNvSpPr>
+          <p:nvPr>
+            <p:ph type="sldNum" sz="quarter" idx="10"/>
+          </p:nvPr>
+        </p:nvSpPr>
+        <p:spPr/>
+        <p:txBody>
+          <a:bodyPr/>
+          <a:lstStyle/>
+          <a:p>
+            <a:fld id="{09177962-0B6C-4A60-8A0A-9A648941852D}" type="slidenum">
+              <a:rPr lang="de-DE" smtClean="0"/>
+              <a:t>2</a:t>
+            </a:fld>
+            <a:endParaRPr lang="de-DE"/>
+          </a:p>
+        </p:txBody>
+      </p:sp>
+    </p:spTree>
+    <p:extLst>
+      <p:ext uri="{BB962C8B-B14F-4D97-AF65-F5344CB8AC3E}">
+        <p14:creationId xmlns:p14="http://schemas.microsoft.com/office/powerpoint/2010/main" val="3303949132"/>
+      </p:ext>
+    </p:extLst>
+  </p:cSld>
+  <p:clrMapOvr>
+    <a:masterClrMapping/>
+  </p:clrMapOvr>
+</p:notes>
+</file>
+
+<file path=ppt/notesSlides/notesSlide3.xml><?xml version="1.0" encoding="utf-8"?>
+<p:notes xmlns:a="http://schemas.openxmlformats.org/drawingml/2006/main" xmlns:r="http://schemas.openxmlformats.org/officeDocument/2006/relationships" xmlns:p="http://schemas.openxmlformats.org/presentationml/2006/main">
+  <p:cSld>
+    <p:spTree>
+      <p:nvGrpSpPr>
+        <p:cNvPr id="1" name=""/>
+        <p:cNvGrpSpPr/>
+        <p:nvPr/>
+      </p:nvGrpSpPr>
+      <p:grpSpPr>
+        <a:xfrm>
+          <a:off x="0" y="0"/>
+          <a:ext cx="0" cy="0"/>
+          <a:chOff x="0" y="0"/>
+          <a:chExt cx="0" cy="0"/>
+        </a:xfrm>
+      </p:grpSpPr>
+      <p:sp>
+        <p:nvSpPr>
+          <p:cNvPr id="2" name="Slide Image Placeholder 1"/>
+          <p:cNvSpPr>
+            <a:spLocks noGrp="1" noRot="1" noChangeAspect="1"/>
+          </p:cNvSpPr>
+          <p:nvPr>
+            <p:ph type="sldImg"/>
+          </p:nvPr>
+        </p:nvSpPr>
+        <p:spPr/>
+      </p:sp>
+      <p:sp>
+        <p:nvSpPr>
+          <p:cNvPr id="3" name="Notes Placeholder 2"/>
+          <p:cNvSpPr>
+            <a:spLocks noGrp="1"/>
+          </p:cNvSpPr>
+          <p:nvPr>
+            <p:ph type="body" idx="1"/>
+          </p:nvPr>
+        </p:nvSpPr>
+        <p:spPr/>
+        <p:txBody>
+          <a:bodyPr/>
+          <a:lstStyle/>
+          <a:p>
+            <a:pPr marL="171450" indent="-171450">
+              <a:buFontTx/>
+              <a:buChar char="-"/>
+            </a:pPr>
+            <a:r>
+              <a:rPr lang="de-DE" b="1" dirty="0"/>
+              <a:t>2 Minuten </a:t>
+            </a:r>
+            <a:r>
+              <a:rPr lang="de-DE" dirty="0"/>
+              <a:t>nach Ausfall Hauptserver</a:t>
+            </a:r>
+          </a:p>
+          <a:p>
+            <a:pPr marL="171450" indent="-171450">
+              <a:buFontTx/>
+              <a:buChar char="-"/>
+            </a:pPr>
+            <a:r>
+              <a:rPr lang="de-DE" b="1" dirty="0"/>
+              <a:t>Direkte Kopie </a:t>
+            </a:r>
+            <a:r>
+              <a:rPr lang="de-DE" dirty="0"/>
+              <a:t>des </a:t>
+            </a:r>
+            <a:r>
+              <a:rPr lang="de-DE" dirty="0" err="1"/>
+              <a:t>Hauptsevers</a:t>
+            </a:r>
+            <a:r>
+              <a:rPr lang="de-DE" dirty="0"/>
+              <a:t>, Hauptserver sendet valide Daten</a:t>
+            </a:r>
+          </a:p>
+          <a:p>
+            <a:pPr marL="171450" indent="-171450">
+              <a:buFontTx/>
+              <a:buChar char="-"/>
+            </a:pPr>
+            <a:r>
+              <a:rPr lang="de-DE" dirty="0"/>
+              <a:t>Ist Hauptserver nicht mehr erreichbar, übernimmt Nebenserver mit </a:t>
+            </a:r>
+            <a:r>
+              <a:rPr lang="de-DE" b="1" dirty="0"/>
+              <a:t>gleicher URL</a:t>
+            </a:r>
+          </a:p>
+          <a:p>
+            <a:pPr marL="171450" indent="-171450">
+              <a:buFontTx/>
+              <a:buChar char="-"/>
+            </a:pPr>
+            <a:r>
+              <a:rPr lang="de-DE" dirty="0"/>
+              <a:t>Kunde sieht kleines </a:t>
+            </a:r>
+            <a:r>
+              <a:rPr lang="de-DE" b="1" dirty="0"/>
+              <a:t>Pop-Up</a:t>
+            </a:r>
+            <a:r>
+              <a:rPr lang="de-DE" dirty="0"/>
+              <a:t>, das ihn darüber informiert</a:t>
+            </a:r>
+          </a:p>
+          <a:p>
+            <a:pPr marL="171450" indent="-171450">
+              <a:buFontTx/>
+              <a:buChar char="-"/>
+            </a:pPr>
+            <a:endParaRPr lang="de-DE" dirty="0"/>
+          </a:p>
+          <a:p>
+            <a:pPr marL="171450" indent="-171450">
+              <a:buFontTx/>
+              <a:buChar char="-"/>
+            </a:pPr>
+            <a:r>
+              <a:rPr lang="de-DE" dirty="0"/>
+              <a:t>Umweltfreundlich durch enorme </a:t>
+            </a:r>
+            <a:r>
+              <a:rPr lang="de-DE" b="1" dirty="0"/>
+              <a:t>Papiereinsparung</a:t>
+            </a:r>
+          </a:p>
+          <a:p>
+            <a:pPr marL="171450" indent="-171450">
+              <a:buFontTx/>
+              <a:buChar char="-"/>
+            </a:pPr>
+            <a:endParaRPr lang="de-DE" dirty="0"/>
+          </a:p>
+          <a:p>
+            <a:pPr marL="171450" indent="-171450">
+              <a:buFontTx/>
+              <a:buChar char="-"/>
+            </a:pPr>
+            <a:r>
+              <a:rPr lang="de-DE" dirty="0"/>
+              <a:t>Listen an Wahlersteller/ zuständige Stelle </a:t>
+            </a:r>
+            <a:r>
+              <a:rPr lang="de-DE" b="1" dirty="0"/>
+              <a:t>senden</a:t>
+            </a:r>
+            <a:r>
+              <a:rPr lang="de-DE" dirty="0"/>
+              <a:t>, importieren der Listen</a:t>
+            </a:r>
+          </a:p>
+          <a:p>
+            <a:pPr marL="171450" indent="-171450">
+              <a:buFontTx/>
+              <a:buChar char="-"/>
+            </a:pPr>
+            <a:r>
+              <a:rPr lang="de-DE" dirty="0"/>
+              <a:t>Listen </a:t>
+            </a:r>
+            <a:r>
+              <a:rPr lang="de-DE" b="1" dirty="0"/>
+              <a:t>enthalten</a:t>
+            </a:r>
+            <a:r>
+              <a:rPr lang="de-DE" dirty="0"/>
+              <a:t>: Wähler, Parteien und Kandidaten</a:t>
+            </a:r>
+          </a:p>
+          <a:p>
+            <a:pPr marL="171450" indent="-171450">
+              <a:buFontTx/>
+              <a:buChar char="-"/>
+            </a:pPr>
+            <a:r>
+              <a:rPr lang="de-DE" dirty="0"/>
+              <a:t>Ersteller der Liste sorgt für </a:t>
+            </a:r>
+            <a:r>
+              <a:rPr lang="de-DE" b="1" dirty="0"/>
+              <a:t>Richtigkeit</a:t>
+            </a:r>
+          </a:p>
+          <a:p>
+            <a:pPr marL="171450" indent="-171450">
+              <a:buFontTx/>
+              <a:buChar char="-"/>
+            </a:pPr>
+            <a:endParaRPr lang="de-DE" dirty="0"/>
+          </a:p>
+          <a:p>
+            <a:pPr marL="171450" indent="-171450">
+              <a:buFontTx/>
+              <a:buChar char="-"/>
+            </a:pPr>
+            <a:endParaRPr lang="de-DE" dirty="0"/>
+          </a:p>
+        </p:txBody>
+      </p:sp>
+      <p:sp>
+        <p:nvSpPr>
+          <p:cNvPr id="4" name="Slide Number Placeholder 3"/>
+          <p:cNvSpPr>
+            <a:spLocks noGrp="1"/>
+          </p:cNvSpPr>
+          <p:nvPr>
+            <p:ph type="sldNum" sz="quarter" idx="10"/>
+          </p:nvPr>
+        </p:nvSpPr>
+        <p:spPr/>
+        <p:txBody>
+          <a:bodyPr/>
+          <a:lstStyle/>
+          <a:p>
+            <a:fld id="{09177962-0B6C-4A60-8A0A-9A648941852D}" type="slidenum">
+              <a:rPr lang="de-DE" smtClean="0"/>
+              <a:t>3</a:t>
+            </a:fld>
+            <a:endParaRPr lang="de-DE"/>
+          </a:p>
+        </p:txBody>
+      </p:sp>
+    </p:spTree>
+    <p:extLst>
+      <p:ext uri="{BB962C8B-B14F-4D97-AF65-F5344CB8AC3E}">
+        <p14:creationId xmlns:p14="http://schemas.microsoft.com/office/powerpoint/2010/main" val="3933204163"/>
+      </p:ext>
+    </p:extLst>
+  </p:cSld>
+  <p:clrMapOvr>
+    <a:masterClrMapping/>
+  </p:clrMapOvr>
+</p:notes>
+</file>
+
 <file path=ppt/slideLayouts/slideLayout1.xml><?xml version="1.0" encoding="utf-8"?>
 <p:sldLayout xmlns:a="http://schemas.openxmlformats.org/drawingml/2006/main" xmlns:r="http://schemas.openxmlformats.org/officeDocument/2006/relationships" xmlns:p="http://schemas.openxmlformats.org/presentationml/2006/main" showMasterSp="0" type="title" preserve="1">
   <p:cSld name="Title Slide">
@@ -487,7 +1256,7 @@
             <a:fld id="{5923F103-BC34-4FE4-A40E-EDDEECFDA5D0}" type="datetimeFigureOut">
               <a:rPr lang="en-US" dirty="0"/>
               <a:pPr/>
-              <a:t>3/20/2018</a:t>
+              <a:t>20-Mar-18</a:t>
             </a:fld>
             <a:endParaRPr lang="en-US" dirty="0"/>
           </a:p>
@@ -1575,7 +2344,7 @@
           <a:p>
             <a:fld id="{923A1CC3-2375-41D4-9E03-427CAF2A4C1A}" type="datetimeFigureOut">
               <a:rPr lang="en-US" dirty="0"/>
-              <a:t>3/20/2018</a:t>
+              <a:t>20-Mar-18</a:t>
             </a:fld>
             <a:endParaRPr lang="en-US" dirty="0"/>
           </a:p>
@@ -2555,7 +3324,7 @@
           <a:p>
             <a:fld id="{AFF16868-8199-4C2C-A5B1-63AEE139F88E}" type="datetimeFigureOut">
               <a:rPr lang="en-US" dirty="0"/>
-              <a:t>3/20/2018</a:t>
+              <a:t>20-Mar-18</a:t>
             </a:fld>
             <a:endParaRPr lang="en-US" dirty="0"/>
           </a:p>
@@ -3689,7 +4458,7 @@
           <a:p>
             <a:fld id="{AAD9FF7F-6988-44CC-821B-644E70CD2F73}" type="datetimeFigureOut">
               <a:rPr lang="en-US" dirty="0"/>
-              <a:t>3/20/2018</a:t>
+              <a:t>20-Mar-18</a:t>
             </a:fld>
             <a:endParaRPr lang="en-US" dirty="0"/>
           </a:p>
@@ -4722,7 +5491,7 @@
           <a:p>
             <a:fld id="{5C12C299-16B2-4475-990D-751901EACC14}" type="datetimeFigureOut">
               <a:rPr lang="en-US" dirty="0"/>
-              <a:t>3/20/2018</a:t>
+              <a:t>20-Mar-18</a:t>
             </a:fld>
             <a:endParaRPr lang="en-US" dirty="0"/>
           </a:p>
@@ -5382,7 +6151,7 @@
           <a:p>
             <a:fld id="{9FE86839-B9D8-4651-8783-F325ECE74E65}" type="datetimeFigureOut">
               <a:rPr lang="en-US" dirty="0"/>
-              <a:t>3/20/2018</a:t>
+              <a:t>20-Mar-18</a:t>
             </a:fld>
             <a:endParaRPr lang="en-US" dirty="0"/>
           </a:p>
@@ -6243,7 +7012,7 @@
           <a:p>
             <a:fld id="{FD484F64-32F6-45C5-931F-ADC1662401D0}" type="datetimeFigureOut">
               <a:rPr lang="en-US" dirty="0"/>
-              <a:t>3/20/2018</a:t>
+              <a:t>20-Mar-18</a:t>
             </a:fld>
             <a:endParaRPr lang="en-US" dirty="0"/>
           </a:p>
@@ -6433,7 +7202,7 @@
           <a:p>
             <a:fld id="{53086D93-FCAC-47E0-A2EE-787E62CA814C}" type="datetimeFigureOut">
               <a:rPr lang="en-US" dirty="0"/>
-              <a:t>3/20/2018</a:t>
+              <a:t>20-Mar-18</a:t>
             </a:fld>
             <a:endParaRPr lang="en-US" dirty="0"/>
           </a:p>
@@ -7405,7 +8174,7 @@
           <a:p>
             <a:fld id="{CDA879A6-0FD0-4734-A311-86BFCA472E6E}" type="datetimeFigureOut">
               <a:rPr lang="en-US" dirty="0"/>
-              <a:t>3/20/2018</a:t>
+              <a:t>20-Mar-18</a:t>
             </a:fld>
             <a:endParaRPr lang="en-US" dirty="0"/>
           </a:p>
@@ -7616,7 +8385,7 @@
           <a:p>
             <a:fld id="{19C9CA7B-DFD4-44B5-8C60-D14B8CD1FB59}" type="datetimeFigureOut">
               <a:rPr lang="en-US" dirty="0"/>
-              <a:t>3/20/2018</a:t>
+              <a:t>20-Mar-18</a:t>
             </a:fld>
             <a:endParaRPr lang="en-US" dirty="0"/>
           </a:p>
@@ -8650,7 +9419,7 @@
           <a:p>
             <a:fld id="{F34E6425-0181-43F2-84FC-787E803FD2F8}" type="datetimeFigureOut">
               <a:rPr lang="en-US" dirty="0"/>
-              <a:t>3/20/2018</a:t>
+              <a:t>20-Mar-18</a:t>
             </a:fld>
             <a:endParaRPr lang="en-US" dirty="0"/>
           </a:p>
@@ -8922,7 +9691,7 @@
           <a:p>
             <a:fld id="{3BDB8791-F1B0-41E7-B7FD-A781E65C4266}" type="datetimeFigureOut">
               <a:rPr lang="en-US" dirty="0"/>
-              <a:t>3/20/2018</a:t>
+              <a:t>20-Mar-18</a:t>
             </a:fld>
             <a:endParaRPr lang="en-US" dirty="0"/>
           </a:p>
@@ -9332,7 +10101,7 @@
           <a:p>
             <a:fld id="{5FDD63B2-E120-4ED8-B27B-C685F510A5FE}" type="datetimeFigureOut">
               <a:rPr lang="en-US" dirty="0"/>
-              <a:t>3/20/2018</a:t>
+              <a:t>20-Mar-18</a:t>
             </a:fld>
             <a:endParaRPr lang="en-US" dirty="0"/>
           </a:p>
@@ -9459,7 +10228,7 @@
           <a:p>
             <a:fld id="{7AA18ACC-A947-437B-A130-35BD54FDF1E9}" type="datetimeFigureOut">
               <a:rPr lang="en-US" dirty="0"/>
-              <a:t>3/20/2018</a:t>
+              <a:t>20-Mar-18</a:t>
             </a:fld>
             <a:endParaRPr lang="en-US" dirty="0"/>
           </a:p>
@@ -9554,7 +10323,7 @@
           <a:p>
             <a:fld id="{7C8D7E02-BCB8-4D50-A234-369438C08659}" type="datetimeFigureOut">
               <a:rPr lang="en-US" dirty="0"/>
-              <a:t>3/20/2018</a:t>
+              <a:t>20-Mar-18</a:t>
             </a:fld>
             <a:endParaRPr lang="en-US" dirty="0"/>
           </a:p>
@@ -10635,7 +11404,7 @@
           <a:p>
             <a:fld id="{76E86A4C-8E40-4F87-A4F0-01A0687C5742}" type="datetimeFigureOut">
               <a:rPr lang="en-US" dirty="0"/>
-              <a:t>3/20/2018</a:t>
+              <a:t>20-Mar-18</a:t>
             </a:fld>
             <a:endParaRPr lang="en-US" dirty="0"/>
           </a:p>
@@ -11743,7 +12512,7 @@
           <a:p>
             <a:fld id="{35E72C73-2D91-4E12-BA25-F0AA0C03599B}" type="datetimeFigureOut">
               <a:rPr lang="en-US" dirty="0"/>
-              <a:t>3/20/2018</a:t>
+              <a:t>20-Mar-18</a:t>
             </a:fld>
             <a:endParaRPr lang="en-US" dirty="0"/>
           </a:p>
@@ -12740,7 +13509,7 @@
           <a:p>
             <a:fld id="{2BE451C3-0FF4-47C4-B829-773ADF60F88C}" type="datetimeFigureOut">
               <a:rPr lang="en-US" dirty="0"/>
-              <a:t>3/20/2018</a:t>
+              <a:t>20-Mar-18</a:t>
             </a:fld>
             <a:endParaRPr lang="en-US" dirty="0"/>
           </a:p>
@@ -13289,7 +14058,7 @@
     <p:bg>
       <p:bgPr>
         <a:blipFill rotWithShape="1">
-          <a:blip r:embed="rId2">
+          <a:blip r:embed="rId3">
             <a:duotone>
               <a:schemeClr val="bg2">
                 <a:shade val="69000"/>
@@ -18050,7 +18819,7 @@
     <p:bg>
       <p:bgPr>
         <a:blipFill rotWithShape="1">
-          <a:blip r:embed="rId2">
+          <a:blip r:embed="rId3">
             <a:duotone>
               <a:schemeClr val="bg2">
                 <a:shade val="69000"/>
@@ -18791,7 +19560,7 @@
     <p:bg>
       <p:bgPr>
         <a:blipFill rotWithShape="1">
-          <a:blip r:embed="rId2">
+          <a:blip r:embed="rId3">
             <a:duotone>
               <a:schemeClr val="bg2">
                 <a:shade val="69000"/>
@@ -22835,4 +23604,299 @@
     </a:ext>
   </a:extLst>
 </a:theme>
+</file>
+
+<file path=ppt/theme/theme2.xml><?xml version="1.0" encoding="utf-8"?>
+<a:theme xmlns:a="http://schemas.openxmlformats.org/drawingml/2006/main" name="Office Theme">
+  <a:themeElements>
+    <a:clrScheme name="Office">
+      <a:dk1>
+        <a:sysClr val="windowText" lastClr="000000"/>
+      </a:dk1>
+      <a:lt1>
+        <a:sysClr val="window" lastClr="FFFFFF"/>
+      </a:lt1>
+      <a:dk2>
+        <a:srgbClr val="44546A"/>
+      </a:dk2>
+      <a:lt2>
+        <a:srgbClr val="E7E6E6"/>
+      </a:lt2>
+      <a:accent1>
+        <a:srgbClr val="4472C4"/>
+      </a:accent1>
+      <a:accent2>
+        <a:srgbClr val="ED7D31"/>
+      </a:accent2>
+      <a:accent3>
+        <a:srgbClr val="A5A5A5"/>
+      </a:accent3>
+      <a:accent4>
+        <a:srgbClr val="FFC000"/>
+      </a:accent4>
+      <a:accent5>
+        <a:srgbClr val="5B9BD5"/>
+      </a:accent5>
+      <a:accent6>
+        <a:srgbClr val="70AD47"/>
+      </a:accent6>
+      <a:hlink>
+        <a:srgbClr val="0563C1"/>
+      </a:hlink>
+      <a:folHlink>
+        <a:srgbClr val="954F72"/>
+      </a:folHlink>
+    </a:clrScheme>
+    <a:fontScheme name="Office">
+      <a:majorFont>
+        <a:latin typeface="Calibri Light" panose="020F0302020204030204"/>
+        <a:ea typeface=""/>
+        <a:cs typeface=""/>
+        <a:font script="Jpan" typeface="游ゴシック Light"/>
+        <a:font script="Hang" typeface="맑은 고딕"/>
+        <a:font script="Hans" typeface="等线 Light"/>
+        <a:font script="Hant" typeface="新細明體"/>
+        <a:font script="Arab" typeface="Times New Roman"/>
+        <a:font script="Hebr" typeface="Times New Roman"/>
+        <a:font script="Thai" typeface="Angsana New"/>
+        <a:font script="Ethi" typeface="Nyala"/>
+        <a:font script="Beng" typeface="Vrinda"/>
+        <a:font script="Gujr" typeface="Shruti"/>
+        <a:font script="Khmr" typeface="MoolBoran"/>
+        <a:font script="Knda" typeface="Tunga"/>
+        <a:font script="Guru" typeface="Raavi"/>
+        <a:font script="Cans" typeface="Euphemia"/>
+        <a:font script="Cher" typeface="Plantagenet Cherokee"/>
+        <a:font script="Yiii" typeface="Microsoft Yi Baiti"/>
+        <a:font script="Tibt" typeface="Microsoft Himalaya"/>
+        <a:font script="Thaa" typeface="MV Boli"/>
+        <a:font script="Deva" typeface="Mangal"/>
+        <a:font script="Telu" typeface="Gautami"/>
+        <a:font script="Taml" typeface="Latha"/>
+        <a:font script="Syrc" typeface="Estrangelo Edessa"/>
+        <a:font script="Orya" typeface="Kalinga"/>
+        <a:font script="Mlym" typeface="Kartika"/>
+        <a:font script="Laoo" typeface="DokChampa"/>
+        <a:font script="Sinh" typeface="Iskoola Pota"/>
+        <a:font script="Mong" typeface="Mongolian Baiti"/>
+        <a:font script="Viet" typeface="Times New Roman"/>
+        <a:font script="Uigh" typeface="Microsoft Uighur"/>
+        <a:font script="Geor" typeface="Sylfaen"/>
+        <a:font script="Armn" typeface="Arial"/>
+        <a:font script="Bugi" typeface="Leelawadee UI"/>
+        <a:font script="Bopo" typeface="Microsoft JhengHei"/>
+        <a:font script="Java" typeface="Javanese Text"/>
+        <a:font script="Lisu" typeface="Segoe UI"/>
+        <a:font script="Mymr" typeface="Myanmar Text"/>
+        <a:font script="Nkoo" typeface="Ebrima"/>
+        <a:font script="Olck" typeface="Nirmala UI"/>
+        <a:font script="Osma" typeface="Ebrima"/>
+        <a:font script="Phag" typeface="Phagspa"/>
+        <a:font script="Syrn" typeface="Estrangelo Edessa"/>
+        <a:font script="Syrj" typeface="Estrangelo Edessa"/>
+        <a:font script="Syre" typeface="Estrangelo Edessa"/>
+        <a:font script="Sora" typeface="Nirmala UI"/>
+        <a:font script="Tale" typeface="Microsoft Tai Le"/>
+        <a:font script="Talu" typeface="Microsoft New Tai Lue"/>
+        <a:font script="Tfng" typeface="Ebrima"/>
+      </a:majorFont>
+      <a:minorFont>
+        <a:latin typeface="Calibri" panose="020F0502020204030204"/>
+        <a:ea typeface=""/>
+        <a:cs typeface=""/>
+        <a:font script="Jpan" typeface="游ゴシック"/>
+        <a:font script="Hang" typeface="맑은 고딕"/>
+        <a:font script="Hans" typeface="等线"/>
+        <a:font script="Hant" typeface="新細明體"/>
+        <a:font script="Arab" typeface="Arial"/>
+        <a:font script="Hebr" typeface="Arial"/>
+        <a:font script="Thai" typeface="Cordia New"/>
+        <a:font script="Ethi" typeface="Nyala"/>
+        <a:font script="Beng" typeface="Vrinda"/>
+        <a:font script="Gujr" typeface="Shruti"/>
+        <a:font script="Khmr" typeface="DaunPenh"/>
+        <a:font script="Knda" typeface="Tunga"/>
+        <a:font script="Guru" typeface="Raavi"/>
+        <a:font script="Cans" typeface="Euphemia"/>
+        <a:font script="Cher" typeface="Plantagenet Cherokee"/>
+        <a:font script="Yiii" typeface="Microsoft Yi Baiti"/>
+        <a:font script="Tibt" typeface="Microsoft Himalaya"/>
+        <a:font script="Thaa" typeface="MV Boli"/>
+        <a:font script="Deva" typeface="Mangal"/>
+        <a:font script="Telu" typeface="Gautami"/>
+        <a:font script="Taml" typeface="Latha"/>
+        <a:font script="Syrc" typeface="Estrangelo Edessa"/>
+        <a:font script="Orya" typeface="Kalinga"/>
+        <a:font script="Mlym" typeface="Kartika"/>
+        <a:font script="Laoo" typeface="DokChampa"/>
+        <a:font script="Sinh" typeface="Iskoola Pota"/>
+        <a:font script="Mong" typeface="Mongolian Baiti"/>
+        <a:font script="Viet" typeface="Arial"/>
+        <a:font script="Uigh" typeface="Microsoft Uighur"/>
+        <a:font script="Geor" typeface="Sylfaen"/>
+        <a:font script="Armn" typeface="Arial"/>
+        <a:font script="Bugi" typeface="Leelawadee UI"/>
+        <a:font script="Bopo" typeface="Microsoft JhengHei"/>
+        <a:font script="Java" typeface="Javanese Text"/>
+        <a:font script="Lisu" typeface="Segoe UI"/>
+        <a:font script="Mymr" typeface="Myanmar Text"/>
+        <a:font script="Nkoo" typeface="Ebrima"/>
+        <a:font script="Olck" typeface="Nirmala UI"/>
+        <a:font script="Osma" typeface="Ebrima"/>
+        <a:font script="Phag" typeface="Phagspa"/>
+        <a:font script="Syrn" typeface="Estrangelo Edessa"/>
+        <a:font script="Syrj" typeface="Estrangelo Edessa"/>
+        <a:font script="Syre" typeface="Estrangelo Edessa"/>
+        <a:font script="Sora" typeface="Nirmala UI"/>
+        <a:font script="Tale" typeface="Microsoft Tai Le"/>
+        <a:font script="Talu" typeface="Microsoft New Tai Lue"/>
+        <a:font script="Tfng" typeface="Ebrima"/>
+      </a:minorFont>
+    </a:fontScheme>
+    <a:fmtScheme name="Office">
+      <a:fillStyleLst>
+        <a:solidFill>
+          <a:schemeClr val="phClr"/>
+        </a:solidFill>
+        <a:gradFill rotWithShape="1">
+          <a:gsLst>
+            <a:gs pos="0">
+              <a:schemeClr val="phClr">
+                <a:lumMod val="110000"/>
+                <a:satMod val="105000"/>
+                <a:tint val="67000"/>
+              </a:schemeClr>
+            </a:gs>
+            <a:gs pos="50000">
+              <a:schemeClr val="phClr">
+                <a:lumMod val="105000"/>
+                <a:satMod val="103000"/>
+                <a:tint val="73000"/>
+              </a:schemeClr>
+            </a:gs>
+            <a:gs pos="100000">
+              <a:schemeClr val="phClr">
+                <a:lumMod val="105000"/>
+                <a:satMod val="109000"/>
+                <a:tint val="81000"/>
+              </a:schemeClr>
+            </a:gs>
+          </a:gsLst>
+          <a:lin ang="5400000" scaled="0"/>
+        </a:gradFill>
+        <a:gradFill rotWithShape="1">
+          <a:gsLst>
+            <a:gs pos="0">
+              <a:schemeClr val="phClr">
+                <a:satMod val="103000"/>
+                <a:lumMod val="102000"/>
+                <a:tint val="94000"/>
+              </a:schemeClr>
+            </a:gs>
+            <a:gs pos="50000">
+              <a:schemeClr val="phClr">
+                <a:satMod val="110000"/>
+                <a:lumMod val="100000"/>
+                <a:shade val="100000"/>
+              </a:schemeClr>
+            </a:gs>
+            <a:gs pos="100000">
+              <a:schemeClr val="phClr">
+                <a:lumMod val="99000"/>
+                <a:satMod val="120000"/>
+                <a:shade val="78000"/>
+              </a:schemeClr>
+            </a:gs>
+          </a:gsLst>
+          <a:lin ang="5400000" scaled="0"/>
+        </a:gradFill>
+      </a:fillStyleLst>
+      <a:lnStyleLst>
+        <a:ln w="6350" cap="flat" cmpd="sng" algn="ctr">
+          <a:solidFill>
+            <a:schemeClr val="phClr"/>
+          </a:solidFill>
+          <a:prstDash val="solid"/>
+          <a:miter lim="800000"/>
+        </a:ln>
+        <a:ln w="12700" cap="flat" cmpd="sng" algn="ctr">
+          <a:solidFill>
+            <a:schemeClr val="phClr"/>
+          </a:solidFill>
+          <a:prstDash val="solid"/>
+          <a:miter lim="800000"/>
+        </a:ln>
+        <a:ln w="19050" cap="flat" cmpd="sng" algn="ctr">
+          <a:solidFill>
+            <a:schemeClr val="phClr"/>
+          </a:solidFill>
+          <a:prstDash val="solid"/>
+          <a:miter lim="800000"/>
+        </a:ln>
+      </a:lnStyleLst>
+      <a:effectStyleLst>
+        <a:effectStyle>
+          <a:effectLst/>
+        </a:effectStyle>
+        <a:effectStyle>
+          <a:effectLst/>
+        </a:effectStyle>
+        <a:effectStyle>
+          <a:effectLst>
+            <a:outerShdw blurRad="57150" dist="19050" dir="5400000" algn="ctr" rotWithShape="0">
+              <a:srgbClr val="000000">
+                <a:alpha val="63000"/>
+              </a:srgbClr>
+            </a:outerShdw>
+          </a:effectLst>
+        </a:effectStyle>
+      </a:effectStyleLst>
+      <a:bgFillStyleLst>
+        <a:solidFill>
+          <a:schemeClr val="phClr"/>
+        </a:solidFill>
+        <a:solidFill>
+          <a:schemeClr val="phClr">
+            <a:tint val="95000"/>
+            <a:satMod val="170000"/>
+          </a:schemeClr>
+        </a:solidFill>
+        <a:gradFill rotWithShape="1">
+          <a:gsLst>
+            <a:gs pos="0">
+              <a:schemeClr val="phClr">
+                <a:tint val="93000"/>
+                <a:satMod val="150000"/>
+                <a:shade val="98000"/>
+                <a:lumMod val="102000"/>
+              </a:schemeClr>
+            </a:gs>
+            <a:gs pos="50000">
+              <a:schemeClr val="phClr">
+                <a:tint val="98000"/>
+                <a:satMod val="130000"/>
+                <a:shade val="90000"/>
+                <a:lumMod val="103000"/>
+              </a:schemeClr>
+            </a:gs>
+            <a:gs pos="100000">
+              <a:schemeClr val="phClr">
+                <a:shade val="63000"/>
+                <a:satMod val="120000"/>
+              </a:schemeClr>
+            </a:gs>
+          </a:gsLst>
+          <a:lin ang="5400000" scaled="0"/>
+        </a:gradFill>
+      </a:bgFillStyleLst>
+    </a:fmtScheme>
+  </a:themeElements>
+  <a:objectDefaults/>
+  <a:extraClrSchemeLst/>
+  <a:extLst>
+    <a:ext uri="{05A4C25C-085E-4340-85A3-A5531E510DB2}">
+      <thm15:themeFamily xmlns:thm15="http://schemas.microsoft.com/office/thememl/2012/main" name="Office Theme" id="{62F939B6-93AF-4DB8-9C6B-D6C7DFDC589F}" vid="{4A3C46E8-61CC-4603-A589-7422A47A8E4A}"/>
+    </a:ext>
+  </a:extLst>
+</a:theme>
 </file>
</xml_diff>

<commit_message>
Changed order of backend tools. Modified the list entries
</commit_message>
<xml_diff>
--- a/Präsentation/YourChoice.pptx
+++ b/Präsentation/YourChoice.pptx
@@ -236,7 +236,7 @@
           <a:p>
             <a:fld id="{E4DEAD90-4A80-4B89-AD7F-4BDBF11CDDA5}" type="datetimeFigureOut">
               <a:rPr lang="de-DE" smtClean="0"/>
-              <a:t>20.03.2018</a:t>
+              <a:t>21.03.2018</a:t>
             </a:fld>
             <a:endParaRPr lang="de-DE"/>
           </a:p>
@@ -1256,7 +1256,7 @@
             <a:fld id="{5923F103-BC34-4FE4-A40E-EDDEECFDA5D0}" type="datetimeFigureOut">
               <a:rPr lang="en-US" dirty="0"/>
               <a:pPr/>
-              <a:t>20-Mar-18</a:t>
+              <a:t>3/21/2018</a:t>
             </a:fld>
             <a:endParaRPr lang="en-US" dirty="0"/>
           </a:p>
@@ -2344,7 +2344,7 @@
           <a:p>
             <a:fld id="{923A1CC3-2375-41D4-9E03-427CAF2A4C1A}" type="datetimeFigureOut">
               <a:rPr lang="en-US" dirty="0"/>
-              <a:t>20-Mar-18</a:t>
+              <a:t>3/21/2018</a:t>
             </a:fld>
             <a:endParaRPr lang="en-US" dirty="0"/>
           </a:p>
@@ -3324,7 +3324,7 @@
           <a:p>
             <a:fld id="{AFF16868-8199-4C2C-A5B1-63AEE139F88E}" type="datetimeFigureOut">
               <a:rPr lang="en-US" dirty="0"/>
-              <a:t>20-Mar-18</a:t>
+              <a:t>3/21/2018</a:t>
             </a:fld>
             <a:endParaRPr lang="en-US" dirty="0"/>
           </a:p>
@@ -4458,7 +4458,7 @@
           <a:p>
             <a:fld id="{AAD9FF7F-6988-44CC-821B-644E70CD2F73}" type="datetimeFigureOut">
               <a:rPr lang="en-US" dirty="0"/>
-              <a:t>20-Mar-18</a:t>
+              <a:t>3/21/2018</a:t>
             </a:fld>
             <a:endParaRPr lang="en-US" dirty="0"/>
           </a:p>
@@ -5491,7 +5491,7 @@
           <a:p>
             <a:fld id="{5C12C299-16B2-4475-990D-751901EACC14}" type="datetimeFigureOut">
               <a:rPr lang="en-US" dirty="0"/>
-              <a:t>20-Mar-18</a:t>
+              <a:t>3/21/2018</a:t>
             </a:fld>
             <a:endParaRPr lang="en-US" dirty="0"/>
           </a:p>
@@ -6151,7 +6151,7 @@
           <a:p>
             <a:fld id="{9FE86839-B9D8-4651-8783-F325ECE74E65}" type="datetimeFigureOut">
               <a:rPr lang="en-US" dirty="0"/>
-              <a:t>20-Mar-18</a:t>
+              <a:t>3/21/2018</a:t>
             </a:fld>
             <a:endParaRPr lang="en-US" dirty="0"/>
           </a:p>
@@ -7012,7 +7012,7 @@
           <a:p>
             <a:fld id="{FD484F64-32F6-45C5-931F-ADC1662401D0}" type="datetimeFigureOut">
               <a:rPr lang="en-US" dirty="0"/>
-              <a:t>20-Mar-18</a:t>
+              <a:t>3/21/2018</a:t>
             </a:fld>
             <a:endParaRPr lang="en-US" dirty="0"/>
           </a:p>
@@ -7202,7 +7202,7 @@
           <a:p>
             <a:fld id="{53086D93-FCAC-47E0-A2EE-787E62CA814C}" type="datetimeFigureOut">
               <a:rPr lang="en-US" dirty="0"/>
-              <a:t>20-Mar-18</a:t>
+              <a:t>3/21/2018</a:t>
             </a:fld>
             <a:endParaRPr lang="en-US" dirty="0"/>
           </a:p>
@@ -8174,7 +8174,7 @@
           <a:p>
             <a:fld id="{CDA879A6-0FD0-4734-A311-86BFCA472E6E}" type="datetimeFigureOut">
               <a:rPr lang="en-US" dirty="0"/>
-              <a:t>20-Mar-18</a:t>
+              <a:t>3/21/2018</a:t>
             </a:fld>
             <a:endParaRPr lang="en-US" dirty="0"/>
           </a:p>
@@ -8385,7 +8385,7 @@
           <a:p>
             <a:fld id="{19C9CA7B-DFD4-44B5-8C60-D14B8CD1FB59}" type="datetimeFigureOut">
               <a:rPr lang="en-US" dirty="0"/>
-              <a:t>20-Mar-18</a:t>
+              <a:t>3/21/2018</a:t>
             </a:fld>
             <a:endParaRPr lang="en-US" dirty="0"/>
           </a:p>
@@ -9419,7 +9419,7 @@
           <a:p>
             <a:fld id="{F34E6425-0181-43F2-84FC-787E803FD2F8}" type="datetimeFigureOut">
               <a:rPr lang="en-US" dirty="0"/>
-              <a:t>20-Mar-18</a:t>
+              <a:t>3/21/2018</a:t>
             </a:fld>
             <a:endParaRPr lang="en-US" dirty="0"/>
           </a:p>
@@ -9691,7 +9691,7 @@
           <a:p>
             <a:fld id="{3BDB8791-F1B0-41E7-B7FD-A781E65C4266}" type="datetimeFigureOut">
               <a:rPr lang="en-US" dirty="0"/>
-              <a:t>20-Mar-18</a:t>
+              <a:t>3/21/2018</a:t>
             </a:fld>
             <a:endParaRPr lang="en-US" dirty="0"/>
           </a:p>
@@ -10101,7 +10101,7 @@
           <a:p>
             <a:fld id="{5FDD63B2-E120-4ED8-B27B-C685F510A5FE}" type="datetimeFigureOut">
               <a:rPr lang="en-US" dirty="0"/>
-              <a:t>20-Mar-18</a:t>
+              <a:t>3/21/2018</a:t>
             </a:fld>
             <a:endParaRPr lang="en-US" dirty="0"/>
           </a:p>
@@ -10228,7 +10228,7 @@
           <a:p>
             <a:fld id="{7AA18ACC-A947-437B-A130-35BD54FDF1E9}" type="datetimeFigureOut">
               <a:rPr lang="en-US" dirty="0"/>
-              <a:t>20-Mar-18</a:t>
+              <a:t>3/21/2018</a:t>
             </a:fld>
             <a:endParaRPr lang="en-US" dirty="0"/>
           </a:p>
@@ -10323,7 +10323,7 @@
           <a:p>
             <a:fld id="{7C8D7E02-BCB8-4D50-A234-369438C08659}" type="datetimeFigureOut">
               <a:rPr lang="en-US" dirty="0"/>
-              <a:t>20-Mar-18</a:t>
+              <a:t>3/21/2018</a:t>
             </a:fld>
             <a:endParaRPr lang="en-US" dirty="0"/>
           </a:p>
@@ -11404,7 +11404,7 @@
           <a:p>
             <a:fld id="{76E86A4C-8E40-4F87-A4F0-01A0687C5742}" type="datetimeFigureOut">
               <a:rPr lang="en-US" dirty="0"/>
-              <a:t>20-Mar-18</a:t>
+              <a:t>3/21/2018</a:t>
             </a:fld>
             <a:endParaRPr lang="en-US" dirty="0"/>
           </a:p>
@@ -12512,7 +12512,7 @@
           <a:p>
             <a:fld id="{35E72C73-2D91-4E12-BA25-F0AA0C03599B}" type="datetimeFigureOut">
               <a:rPr lang="en-US" dirty="0"/>
-              <a:t>20-Mar-18</a:t>
+              <a:t>3/21/2018</a:t>
             </a:fld>
             <a:endParaRPr lang="en-US" dirty="0"/>
           </a:p>
@@ -13509,7 +13509,7 @@
           <a:p>
             <a:fld id="{2BE451C3-0FF4-47C4-B829-773ADF60F88C}" type="datetimeFigureOut">
               <a:rPr lang="en-US" dirty="0"/>
-              <a:t>20-Mar-18</a:t>
+              <a:t>3/21/2018</a:t>
             </a:fld>
             <a:endParaRPr lang="en-US" dirty="0"/>
           </a:p>
@@ -15856,6 +15856,32 @@
               </a:solidFill>
             </a:endParaRPr>
           </a:p>
+          <a:p>
+            <a:r>
+              <a:rPr lang="en-GB" sz="1600" dirty="0">
+                <a:solidFill>
+                  <a:schemeClr val="tx1"/>
+                </a:solidFill>
+              </a:rPr>
+              <a:t>V</a:t>
+            </a:r>
+            <a:r>
+              <a:rPr lang="de-DE" sz="1600" dirty="0" err="1">
+                <a:solidFill>
+                  <a:schemeClr val="tx1"/>
+                </a:solidFill>
+              </a:rPr>
+              <a:t>isual</a:t>
+            </a:r>
+            <a:r>
+              <a:rPr lang="de-DE" sz="1600" dirty="0">
+                <a:solidFill>
+                  <a:schemeClr val="tx1"/>
+                </a:solidFill>
+              </a:rPr>
+              <a:t> Studio Code (Food Truck Extension)</a:t>
+            </a:r>
+          </a:p>
         </p:txBody>
       </p:sp>
     </p:spTree>
@@ -16516,7 +16542,56 @@
           <a:lstStyle/>
           <a:p>
             <a:r>
-              <a:rPr lang="de-DE" sz="1600">
+              <a:rPr lang="de-DE" sz="1600" dirty="0" err="1">
+                <a:solidFill>
+                  <a:schemeClr val="tx1"/>
+                </a:solidFill>
+              </a:rPr>
+              <a:t>Vagrant</a:t>
+            </a:r>
+            <a:endParaRPr lang="de-DE" sz="1600" dirty="0">
+              <a:solidFill>
+                <a:schemeClr val="tx1"/>
+              </a:solidFill>
+            </a:endParaRPr>
+          </a:p>
+          <a:p>
+            <a:r>
+              <a:rPr lang="de-DE" sz="1600" dirty="0" err="1">
+                <a:solidFill>
+                  <a:schemeClr val="tx1"/>
+                </a:solidFill>
+              </a:rPr>
+              <a:t>Homestead</a:t>
+            </a:r>
+            <a:r>
+              <a:rPr lang="de-DE" sz="1600" dirty="0">
+                <a:solidFill>
+                  <a:schemeClr val="tx1"/>
+                </a:solidFill>
+              </a:rPr>
+              <a:t> (</a:t>
+            </a:r>
+            <a:r>
+              <a:rPr lang="de-DE" sz="1600" dirty="0" err="1">
+                <a:solidFill>
+                  <a:schemeClr val="tx1"/>
+                </a:solidFill>
+              </a:rPr>
+              <a:t>Virtualbox</a:t>
+            </a:r>
+            <a:r>
+              <a:rPr lang="de-DE" sz="1600" dirty="0">
+                <a:solidFill>
+                  <a:schemeClr val="tx1"/>
+                </a:solidFill>
+              </a:rPr>
+              <a:t> Image)</a:t>
+            </a:r>
+          </a:p>
+          <a:p>
+            <a:r>
+              <a:rPr lang="de-DE" sz="1600" dirty="0">
                 <a:solidFill>
                   <a:schemeClr val="tx1"/>
                 </a:solidFill>
@@ -16526,33 +16601,41 @@
           </a:p>
           <a:p>
             <a:r>
-              <a:rPr lang="de-DE" sz="1600">
+              <a:rPr lang="en-GB" sz="1600" dirty="0">
+                <a:solidFill>
+                  <a:schemeClr val="tx1"/>
+                </a:solidFill>
+              </a:rPr>
+              <a:t>C</a:t>
+            </a:r>
+            <a:r>
+              <a:rPr lang="de-DE" sz="1600" dirty="0" err="1">
+                <a:solidFill>
+                  <a:schemeClr val="tx1"/>
+                </a:solidFill>
+              </a:rPr>
+              <a:t>omposer</a:t>
+            </a:r>
+            <a:endParaRPr lang="de-DE" sz="1600" dirty="0">
+              <a:solidFill>
+                <a:schemeClr val="tx1"/>
+              </a:solidFill>
+            </a:endParaRPr>
+          </a:p>
+          <a:p>
+            <a:r>
+              <a:rPr lang="de-DE" sz="1600" dirty="0" err="1">
                 <a:solidFill>
                   <a:schemeClr val="tx1"/>
                 </a:solidFill>
               </a:rPr>
               <a:t>Laravel</a:t>
             </a:r>
-          </a:p>
-          <a:p>
-            <a:r>
-              <a:rPr lang="de-DE" sz="1600">
-                <a:solidFill>
-                  <a:schemeClr val="tx1"/>
-                </a:solidFill>
-              </a:rPr>
-              <a:t>Homestead</a:t>
-            </a:r>
-          </a:p>
-          <a:p>
-            <a:r>
-              <a:rPr lang="de-DE" sz="1600">
-                <a:solidFill>
-                  <a:schemeClr val="tx1"/>
-                </a:solidFill>
-              </a:rPr>
-              <a:t>Virtualbox</a:t>
-            </a:r>
+            <a:endParaRPr lang="de-DE" sz="1600" dirty="0">
+              <a:solidFill>
+                <a:schemeClr val="tx1"/>
+              </a:solidFill>
+            </a:endParaRPr>
           </a:p>
         </p:txBody>
       </p:sp>
@@ -17214,17 +17297,7 @@
           <a:lstStyle/>
           <a:p>
             <a:r>
-              <a:rPr lang="de-DE" sz="1600">
-                <a:solidFill>
-                  <a:schemeClr val="tx1"/>
-                </a:solidFill>
-              </a:rPr>
-              <a:t>Vagrant</a:t>
-            </a:r>
-          </a:p>
-          <a:p>
-            <a:r>
-              <a:rPr lang="de-DE" sz="1600">
+              <a:rPr lang="de-DE" sz="1600" dirty="0">
                 <a:solidFill>
                   <a:schemeClr val="tx1"/>
                 </a:solidFill>
@@ -17234,7 +17307,30 @@
           </a:p>
           <a:p>
             <a:r>
-              <a:rPr lang="de-DE" sz="1600">
+              <a:rPr lang="en-GB" sz="1600" dirty="0">
+                <a:solidFill>
+                  <a:schemeClr val="tx1"/>
+                </a:solidFill>
+              </a:rPr>
+              <a:t>N</a:t>
+            </a:r>
+            <a:r>
+              <a:rPr lang="de-DE" sz="1600" dirty="0" err="1">
+                <a:solidFill>
+                  <a:schemeClr val="tx1"/>
+                </a:solidFill>
+              </a:rPr>
+              <a:t>ginx</a:t>
+            </a:r>
+            <a:endParaRPr lang="de-DE" sz="1600" dirty="0">
+              <a:solidFill>
+                <a:schemeClr val="tx1"/>
+              </a:solidFill>
+            </a:endParaRPr>
+          </a:p>
+          <a:p>
+            <a:r>
+              <a:rPr lang="de-DE" sz="1600" dirty="0">
                 <a:solidFill>
                   <a:schemeClr val="tx1"/>
                 </a:solidFill>
@@ -17244,13 +17340,41 @@
           </a:p>
           <a:p>
             <a:r>
-              <a:rPr lang="de-DE" sz="1600">
+              <a:rPr lang="en-GB" sz="1600" dirty="0">
+                <a:solidFill>
+                  <a:schemeClr val="tx1"/>
+                </a:solidFill>
+              </a:rPr>
+              <a:t>E</a:t>
+            </a:r>
+            <a:r>
+              <a:rPr lang="de-DE" sz="1600" dirty="0" err="1">
+                <a:solidFill>
+                  <a:schemeClr val="tx1"/>
+                </a:solidFill>
+              </a:rPr>
+              <a:t>loquent</a:t>
+            </a:r>
+            <a:endParaRPr lang="de-DE" sz="1600" dirty="0">
+              <a:solidFill>
+                <a:schemeClr val="tx1"/>
+              </a:solidFill>
+            </a:endParaRPr>
+          </a:p>
+          <a:p>
+            <a:r>
+              <a:rPr lang="de-DE" sz="1600" dirty="0" err="1">
                 <a:solidFill>
                   <a:schemeClr val="tx1"/>
                 </a:solidFill>
               </a:rPr>
               <a:t>PHPStorm</a:t>
             </a:r>
+            <a:endParaRPr lang="de-DE" sz="1600" dirty="0">
+              <a:solidFill>
+                <a:schemeClr val="tx1"/>
+              </a:solidFill>
+            </a:endParaRPr>
           </a:p>
         </p:txBody>
       </p:sp>

</xml_diff>

<commit_message>
Replaced the architecture diagram on presentation slides
</commit_message>
<xml_diff>
--- a/Präsentation/YourChoice.pptx
+++ b/Präsentation/YourChoice.pptx
@@ -911,6 +911,90 @@
     <p:extLst>
       <p:ext uri="{BB962C8B-B14F-4D97-AF65-F5344CB8AC3E}">
         <p14:creationId xmlns:p14="http://schemas.microsoft.com/office/powerpoint/2010/main" val="3933204163"/>
+      </p:ext>
+    </p:extLst>
+  </p:cSld>
+  <p:clrMapOvr>
+    <a:masterClrMapping/>
+  </p:clrMapOvr>
+</p:notes>
+</file>
+
+<file path=ppt/notesSlides/notesSlide4.xml><?xml version="1.0" encoding="utf-8"?>
+<p:notes xmlns:a="http://schemas.openxmlformats.org/drawingml/2006/main" xmlns:r="http://schemas.openxmlformats.org/officeDocument/2006/relationships" xmlns:p="http://schemas.openxmlformats.org/presentationml/2006/main">
+  <p:cSld>
+    <p:spTree>
+      <p:nvGrpSpPr>
+        <p:cNvPr id="1" name=""/>
+        <p:cNvGrpSpPr/>
+        <p:nvPr/>
+      </p:nvGrpSpPr>
+      <p:grpSpPr>
+        <a:xfrm>
+          <a:off x="0" y="0"/>
+          <a:ext cx="0" cy="0"/>
+          <a:chOff x="0" y="0"/>
+          <a:chExt cx="0" cy="0"/>
+        </a:xfrm>
+      </p:grpSpPr>
+      <p:sp>
+        <p:nvSpPr>
+          <p:cNvPr id="2" name="Slide Image Placeholder 1"/>
+          <p:cNvSpPr>
+            <a:spLocks noGrp="1" noRot="1" noChangeAspect="1"/>
+          </p:cNvSpPr>
+          <p:nvPr>
+            <p:ph type="sldImg"/>
+          </p:nvPr>
+        </p:nvSpPr>
+        <p:spPr/>
+      </p:sp>
+      <p:sp>
+        <p:nvSpPr>
+          <p:cNvPr id="3" name="Notes Placeholder 2"/>
+          <p:cNvSpPr>
+            <a:spLocks noGrp="1"/>
+          </p:cNvSpPr>
+          <p:nvPr>
+            <p:ph type="body" idx="1"/>
+          </p:nvPr>
+        </p:nvSpPr>
+        <p:spPr/>
+        <p:txBody>
+          <a:bodyPr/>
+          <a:lstStyle/>
+          <a:p>
+            <a:endParaRPr lang="de-DE"/>
+          </a:p>
+        </p:txBody>
+      </p:sp>
+      <p:sp>
+        <p:nvSpPr>
+          <p:cNvPr id="4" name="Slide Number Placeholder 3"/>
+          <p:cNvSpPr>
+            <a:spLocks noGrp="1"/>
+          </p:cNvSpPr>
+          <p:nvPr>
+            <p:ph type="sldNum" sz="quarter" idx="10"/>
+          </p:nvPr>
+        </p:nvSpPr>
+        <p:spPr/>
+        <p:txBody>
+          <a:bodyPr/>
+          <a:lstStyle/>
+          <a:p>
+            <a:fld id="{09177962-0B6C-4A60-8A0A-9A648941852D}" type="slidenum">
+              <a:rPr lang="de-DE" smtClean="0"/>
+              <a:t>14</a:t>
+            </a:fld>
+            <a:endParaRPr lang="de-DE"/>
+          </a:p>
+        </p:txBody>
+      </p:sp>
+    </p:spTree>
+    <p:extLst>
+      <p:ext uri="{BB962C8B-B14F-4D97-AF65-F5344CB8AC3E}">
+        <p14:creationId xmlns:p14="http://schemas.microsoft.com/office/powerpoint/2010/main" val="1745259130"/>
       </p:ext>
     </p:extLst>
   </p:cSld>
@@ -17471,7 +17555,7 @@
               <a:avLst/>
             </a:prstGeom>
             <a:blipFill>
-              <a:blip r:embed="rId2">
+              <a:blip r:embed="rId3">
                 <a:duotone>
                   <a:schemeClr val="dk2">
                     <a:shade val="69000"/>
@@ -17764,47 +17848,6 @@
           </a:fontRef>
         </p:style>
       </p:sp>
-      <p:pic>
-        <p:nvPicPr>
-          <p:cNvPr id="36" name="Content Placeholder 35">
-            <a:extLst>
-              <a:ext uri="{FF2B5EF4-FFF2-40B4-BE49-F238E27FC236}">
-                <a16:creationId xmlns:a16="http://schemas.microsoft.com/office/drawing/2014/main" id="{F77F6DC3-66D4-49F1-ADD1-10A9DC2C83E0}"/>
-              </a:ext>
-            </a:extLst>
-          </p:cNvPr>
-          <p:cNvPicPr>
-            <a:picLocks noGrp="1" noChangeAspect="1"/>
-          </p:cNvPicPr>
-          <p:nvPr>
-            <p:ph idx="1"/>
-          </p:nvPr>
-        </p:nvPicPr>
-        <p:blipFill>
-          <a:blip r:embed="rId3"/>
-          <a:stretch>
-            <a:fillRect/>
-          </a:stretch>
-        </p:blipFill>
-        <p:spPr>
-          <a:xfrm>
-            <a:off x="2574717" y="1113063"/>
-            <a:ext cx="3540999" cy="4628758"/>
-          </a:xfrm>
-          <a:prstGeom prst="roundRect">
-            <a:avLst>
-              <a:gd name="adj" fmla="val 1858"/>
-            </a:avLst>
-          </a:prstGeom>
-          <a:effectLst>
-            <a:outerShdw blurRad="50800" dist="50800" dir="5400000" algn="tl" rotWithShape="0">
-              <a:srgbClr val="000000">
-                <a:alpha val="43000"/>
-              </a:srgbClr>
-            </a:outerShdw>
-          </a:effectLst>
-        </p:spPr>
-      </p:pic>
       <p:sp>
         <p:nvSpPr>
           <p:cNvPr id="2" name="Title 1">
@@ -17823,18 +17866,19 @@
         </p:nvSpPr>
         <p:spPr>
           <a:xfrm>
-            <a:off x="8160773" y="1113062"/>
-            <a:ext cx="3382297" cy="3281957"/>
+            <a:off x="4404852" y="859857"/>
+            <a:ext cx="3382297" cy="966019"/>
           </a:xfrm>
         </p:spPr>
         <p:txBody>
-          <a:bodyPr vert="horz" lIns="91440" tIns="45720" rIns="91440" bIns="45720" rtlCol="0" anchor="b">
+          <a:bodyPr vert="horz" lIns="91440" tIns="45720" rIns="91440" bIns="45720" rtlCol="0" anchor="ctr">
             <a:normAutofit/>
           </a:bodyPr>
           <a:lstStyle/>
           <a:p>
+            <a:pPr algn="ctr"/>
             <a:r>
-              <a:rPr lang="en-US" sz="4600" b="0" i="0" kern="1200">
+              <a:rPr lang="en-US" sz="4600" b="0" i="0" kern="1200" dirty="0" err="1">
                 <a:solidFill>
                   <a:srgbClr val="EBEBEB"/>
                 </a:solidFill>
@@ -17844,9 +17888,46 @@
               </a:rPr>
               <a:t>Architektur</a:t>
             </a:r>
+            <a:endParaRPr lang="en-US" sz="4600" b="0" i="0" kern="1200" dirty="0">
+              <a:solidFill>
+                <a:srgbClr val="EBEBEB"/>
+              </a:solidFill>
+              <a:latin typeface="+mj-lt"/>
+              <a:ea typeface="+mj-ea"/>
+              <a:cs typeface="+mj-cs"/>
+            </a:endParaRPr>
           </a:p>
         </p:txBody>
       </p:sp>
+      <p:pic>
+        <p:nvPicPr>
+          <p:cNvPr id="6" name="Content Placeholder 5">
+            <a:extLst>
+              <a:ext uri="{FF2B5EF4-FFF2-40B4-BE49-F238E27FC236}">
+                <a16:creationId xmlns:a16="http://schemas.microsoft.com/office/drawing/2014/main" id="{B6B60DC2-5B4C-4DAD-80D6-46F6E3E69A57}"/>
+              </a:ext>
+            </a:extLst>
+          </p:cNvPr>
+          <p:cNvPicPr>
+            <a:picLocks noGrp="1" noChangeAspect="1"/>
+          </p:cNvPicPr>
+          <p:nvPr>
+            <p:ph idx="1"/>
+          </p:nvPr>
+        </p:nvPicPr>
+        <p:blipFill>
+          <a:blip r:embed="rId4"/>
+          <a:stretch>
+            <a:fillRect/>
+          </a:stretch>
+        </p:blipFill>
+        <p:spPr>
+          <a:xfrm>
+            <a:off x="988671" y="2001270"/>
+            <a:ext cx="10214659" cy="4018530"/>
+          </a:xfrm>
+        </p:spPr>
+      </p:pic>
     </p:spTree>
     <p:extLst>
       <p:ext uri="{BB962C8B-B14F-4D97-AF65-F5344CB8AC3E}">

</xml_diff>

<commit_message>
added carmens notes for her slides and the Akzeptanztest slides
</commit_message>
<xml_diff>
--- a/Präsentation/YourChoice.pptx
+++ b/Präsentation/YourChoice.pptx
@@ -5,7 +5,7 @@
     <p:sldMasterId id="2147483648" r:id="rId1"/>
   </p:sldMasterIdLst>
   <p:notesMasterIdLst>
-    <p:notesMasterId r:id="rId18"/>
+    <p:notesMasterId r:id="rId19"/>
   </p:notesMasterIdLst>
   <p:sldIdLst>
     <p:sldId id="256" r:id="rId2"/>
@@ -15,15 +15,16 @@
     <p:sldId id="274" r:id="rId6"/>
     <p:sldId id="263" r:id="rId7"/>
     <p:sldId id="275" r:id="rId8"/>
-    <p:sldId id="276" r:id="rId9"/>
-    <p:sldId id="272" r:id="rId10"/>
-    <p:sldId id="259" r:id="rId11"/>
-    <p:sldId id="268" r:id="rId12"/>
-    <p:sldId id="269" r:id="rId13"/>
-    <p:sldId id="270" r:id="rId14"/>
-    <p:sldId id="261" r:id="rId15"/>
-    <p:sldId id="271" r:id="rId16"/>
-    <p:sldId id="273" r:id="rId17"/>
+    <p:sldId id="278" r:id="rId9"/>
+    <p:sldId id="277" r:id="rId10"/>
+    <p:sldId id="272" r:id="rId11"/>
+    <p:sldId id="259" r:id="rId12"/>
+    <p:sldId id="268" r:id="rId13"/>
+    <p:sldId id="269" r:id="rId14"/>
+    <p:sldId id="270" r:id="rId15"/>
+    <p:sldId id="261" r:id="rId16"/>
+    <p:sldId id="271" r:id="rId17"/>
+    <p:sldId id="273" r:id="rId18"/>
   </p:sldIdLst>
   <p:sldSz cx="12192000" cy="6858000"/>
   <p:notesSz cx="6858000" cy="9144000"/>
@@ -134,7 +135,8 @@
             <p14:sldId id="274"/>
             <p14:sldId id="263"/>
             <p14:sldId id="275"/>
-            <p14:sldId id="276"/>
+            <p14:sldId id="278"/>
+            <p14:sldId id="277"/>
             <p14:sldId id="272"/>
             <p14:sldId id="259"/>
             <p14:sldId id="268"/>
@@ -236,7 +238,7 @@
           <a:p>
             <a:fld id="{E4DEAD90-4A80-4B89-AD7F-4BDBF11CDDA5}" type="datetimeFigureOut">
               <a:rPr lang="de-DE" smtClean="0"/>
-              <a:t>21.03.2018</a:t>
+              <a:t>22.03.2018</a:t>
             </a:fld>
             <a:endParaRPr lang="de-DE"/>
           </a:p>
@@ -639,7 +641,146 @@
           <a:bodyPr/>
           <a:lstStyle/>
           <a:p>
-            <a:endParaRPr lang="de-DE" dirty="0"/>
+            <a:r>
+              <a:rPr lang="de-DE" b="1" dirty="0"/>
+              <a:t>elektronische Wahlen </a:t>
+            </a:r>
+          </a:p>
+          <a:p>
+            <a:r>
+              <a:rPr lang="de-DE" dirty="0"/>
+              <a:t>-Fingerabdruck anstatt Briefwahl </a:t>
+            </a:r>
+          </a:p>
+          <a:p>
+            <a:r>
+              <a:rPr lang="de-DE" dirty="0"/>
+              <a:t>-einfache und schnelle Stimmenauswertung </a:t>
+            </a:r>
+          </a:p>
+          <a:p>
+            <a:r>
+              <a:rPr lang="de-DE" dirty="0"/>
+              <a:t>-Wahl von überall auf der Welt möglich </a:t>
+            </a:r>
+          </a:p>
+          <a:p>
+            <a:r>
+              <a:rPr lang="de-DE" b="1" dirty="0"/>
+              <a:t>sicher</a:t>
+            </a:r>
+            <a:r>
+              <a:rPr lang="de-DE" dirty="0"/>
+              <a:t> </a:t>
+            </a:r>
+          </a:p>
+          <a:p>
+            <a:r>
+              <a:rPr lang="de-DE" dirty="0"/>
+              <a:t>-Sicherheit ist spielt sehr große Rolle, Wahlen sensibles Thema </a:t>
+            </a:r>
+          </a:p>
+          <a:p>
+            <a:r>
+              <a:rPr lang="de-DE" dirty="0"/>
+              <a:t>-wichtig: Anonymität, Schutz vor Datenverlust und Datenintegrität </a:t>
+            </a:r>
+          </a:p>
+          <a:p>
+            <a:r>
+              <a:rPr lang="de-DE" dirty="0"/>
+              <a:t>-Stimmenabgabe bei Wahl mit doppelter Bestätigung </a:t>
+            </a:r>
+          </a:p>
+          <a:p>
+            <a:r>
+              <a:rPr lang="de-DE" b="1" dirty="0"/>
+              <a:t>Web-App</a:t>
+            </a:r>
+            <a:r>
+              <a:rPr lang="de-DE" dirty="0"/>
+              <a:t> </a:t>
+            </a:r>
+          </a:p>
+          <a:p>
+            <a:r>
+              <a:rPr lang="de-DE" dirty="0"/>
+              <a:t>-Startseite mit mehreren Unterseiten </a:t>
+            </a:r>
+          </a:p>
+          <a:p>
+            <a:r>
+              <a:rPr lang="de-DE" dirty="0"/>
+              <a:t>-je nach Rolle andere Instanz der Seite</a:t>
+            </a:r>
+          </a:p>
+          <a:p>
+            <a:r>
+              <a:rPr lang="de-DE" dirty="0"/>
+              <a:t>-Wahlstimme abgeben </a:t>
+            </a:r>
+          </a:p>
+          <a:p>
+            <a:r>
+              <a:rPr lang="de-DE" dirty="0"/>
+              <a:t>-Wahlen anlegen und verwalten</a:t>
+            </a:r>
+          </a:p>
+          <a:p>
+            <a:r>
+              <a:rPr lang="de-DE" dirty="0"/>
+              <a:t>-Wahl auswerten </a:t>
+            </a:r>
+          </a:p>
+          <a:p>
+            <a:r>
+              <a:rPr lang="de-DE" b="1" dirty="0"/>
+              <a:t>DB</a:t>
+            </a:r>
+            <a:r>
+              <a:rPr lang="de-DE" dirty="0"/>
+              <a:t> </a:t>
+            </a:r>
+          </a:p>
+          <a:p>
+            <a:r>
+              <a:rPr lang="de-DE" dirty="0"/>
+              <a:t>-userbezogene Daten, mögliche Wahlen und Name mit Fingerabdruck </a:t>
+            </a:r>
+          </a:p>
+          <a:p>
+            <a:r>
+              <a:rPr lang="de-DE" dirty="0"/>
+              <a:t>-Information über Instanzen/Rollen </a:t>
+            </a:r>
+          </a:p>
+          <a:p>
+            <a:r>
+              <a:rPr lang="de-DE" dirty="0"/>
+              <a:t>-aktuelle Wahlen (angelegte und laufende) </a:t>
+            </a:r>
+          </a:p>
+          <a:p>
+            <a:r>
+              <a:rPr lang="de-DE" b="1" dirty="0"/>
+              <a:t>Serverinstanzen</a:t>
+            </a:r>
+            <a:r>
+              <a:rPr lang="de-DE" dirty="0"/>
+              <a:t> </a:t>
+            </a:r>
+          </a:p>
+          <a:p>
+            <a:r>
+              <a:rPr lang="de-DE" dirty="0"/>
+              <a:t>-Web-App und DB auf einem Server </a:t>
+            </a:r>
+          </a:p>
+          <a:p>
+            <a:r>
+              <a:rPr lang="de-DE" dirty="0"/>
+              <a:t>-Server synchronisieren sich</a:t>
+            </a:r>
           </a:p>
         </p:txBody>
       </p:sp>
@@ -964,7 +1105,7 @@
           <a:bodyPr/>
           <a:lstStyle/>
           <a:p>
-            <a:endParaRPr lang="de-DE"/>
+            <a:endParaRPr lang="de-DE" dirty="0"/>
           </a:p>
         </p:txBody>
       </p:sp>
@@ -985,7 +1126,91 @@
           <a:p>
             <a:fld id="{09177962-0B6C-4A60-8A0A-9A648941852D}" type="slidenum">
               <a:rPr lang="de-DE" smtClean="0"/>
-              <a:t>14</a:t>
+              <a:t>9</a:t>
+            </a:fld>
+            <a:endParaRPr lang="de-DE"/>
+          </a:p>
+        </p:txBody>
+      </p:sp>
+    </p:spTree>
+    <p:extLst>
+      <p:ext uri="{BB962C8B-B14F-4D97-AF65-F5344CB8AC3E}">
+        <p14:creationId xmlns:p14="http://schemas.microsoft.com/office/powerpoint/2010/main" val="1862088496"/>
+      </p:ext>
+    </p:extLst>
+  </p:cSld>
+  <p:clrMapOvr>
+    <a:masterClrMapping/>
+  </p:clrMapOvr>
+</p:notes>
+</file>
+
+<file path=ppt/notesSlides/notesSlide5.xml><?xml version="1.0" encoding="utf-8"?>
+<p:notes xmlns:a="http://schemas.openxmlformats.org/drawingml/2006/main" xmlns:r="http://schemas.openxmlformats.org/officeDocument/2006/relationships" xmlns:p="http://schemas.openxmlformats.org/presentationml/2006/main">
+  <p:cSld>
+    <p:spTree>
+      <p:nvGrpSpPr>
+        <p:cNvPr id="1" name=""/>
+        <p:cNvGrpSpPr/>
+        <p:nvPr/>
+      </p:nvGrpSpPr>
+      <p:grpSpPr>
+        <a:xfrm>
+          <a:off x="0" y="0"/>
+          <a:ext cx="0" cy="0"/>
+          <a:chOff x="0" y="0"/>
+          <a:chExt cx="0" cy="0"/>
+        </a:xfrm>
+      </p:grpSpPr>
+      <p:sp>
+        <p:nvSpPr>
+          <p:cNvPr id="2" name="Slide Image Placeholder 1"/>
+          <p:cNvSpPr>
+            <a:spLocks noGrp="1" noRot="1" noChangeAspect="1"/>
+          </p:cNvSpPr>
+          <p:nvPr>
+            <p:ph type="sldImg"/>
+          </p:nvPr>
+        </p:nvSpPr>
+        <p:spPr/>
+      </p:sp>
+      <p:sp>
+        <p:nvSpPr>
+          <p:cNvPr id="3" name="Notes Placeholder 2"/>
+          <p:cNvSpPr>
+            <a:spLocks noGrp="1"/>
+          </p:cNvSpPr>
+          <p:nvPr>
+            <p:ph type="body" idx="1"/>
+          </p:nvPr>
+        </p:nvSpPr>
+        <p:spPr/>
+        <p:txBody>
+          <a:bodyPr/>
+          <a:lstStyle/>
+          <a:p>
+            <a:endParaRPr lang="de-DE"/>
+          </a:p>
+        </p:txBody>
+      </p:sp>
+      <p:sp>
+        <p:nvSpPr>
+          <p:cNvPr id="4" name="Slide Number Placeholder 3"/>
+          <p:cNvSpPr>
+            <a:spLocks noGrp="1"/>
+          </p:cNvSpPr>
+          <p:nvPr>
+            <p:ph type="sldNum" sz="quarter" idx="10"/>
+          </p:nvPr>
+        </p:nvSpPr>
+        <p:spPr/>
+        <p:txBody>
+          <a:bodyPr/>
+          <a:lstStyle/>
+          <a:p>
+            <a:fld id="{09177962-0B6C-4A60-8A0A-9A648941852D}" type="slidenum">
+              <a:rPr lang="de-DE" smtClean="0"/>
+              <a:t>15</a:t>
             </a:fld>
             <a:endParaRPr lang="de-DE"/>
           </a:p>
@@ -1340,7 +1565,7 @@
             <a:fld id="{5923F103-BC34-4FE4-A40E-EDDEECFDA5D0}" type="datetimeFigureOut">
               <a:rPr lang="en-US" dirty="0"/>
               <a:pPr/>
-              <a:t>3/21/2018</a:t>
+              <a:t>22-Mar-18</a:t>
             </a:fld>
             <a:endParaRPr lang="en-US" dirty="0"/>
           </a:p>
@@ -2428,7 +2653,7 @@
           <a:p>
             <a:fld id="{923A1CC3-2375-41D4-9E03-427CAF2A4C1A}" type="datetimeFigureOut">
               <a:rPr lang="en-US" dirty="0"/>
-              <a:t>3/21/2018</a:t>
+              <a:t>22-Mar-18</a:t>
             </a:fld>
             <a:endParaRPr lang="en-US" dirty="0"/>
           </a:p>
@@ -3408,7 +3633,7 @@
           <a:p>
             <a:fld id="{AFF16868-8199-4C2C-A5B1-63AEE139F88E}" type="datetimeFigureOut">
               <a:rPr lang="en-US" dirty="0"/>
-              <a:t>3/21/2018</a:t>
+              <a:t>22-Mar-18</a:t>
             </a:fld>
             <a:endParaRPr lang="en-US" dirty="0"/>
           </a:p>
@@ -4542,7 +4767,7 @@
           <a:p>
             <a:fld id="{AAD9FF7F-6988-44CC-821B-644E70CD2F73}" type="datetimeFigureOut">
               <a:rPr lang="en-US" dirty="0"/>
-              <a:t>3/21/2018</a:t>
+              <a:t>22-Mar-18</a:t>
             </a:fld>
             <a:endParaRPr lang="en-US" dirty="0"/>
           </a:p>
@@ -5575,7 +5800,7 @@
           <a:p>
             <a:fld id="{5C12C299-16B2-4475-990D-751901EACC14}" type="datetimeFigureOut">
               <a:rPr lang="en-US" dirty="0"/>
-              <a:t>3/21/2018</a:t>
+              <a:t>22-Mar-18</a:t>
             </a:fld>
             <a:endParaRPr lang="en-US" dirty="0"/>
           </a:p>
@@ -6235,7 +6460,7 @@
           <a:p>
             <a:fld id="{9FE86839-B9D8-4651-8783-F325ECE74E65}" type="datetimeFigureOut">
               <a:rPr lang="en-US" dirty="0"/>
-              <a:t>3/21/2018</a:t>
+              <a:t>22-Mar-18</a:t>
             </a:fld>
             <a:endParaRPr lang="en-US" dirty="0"/>
           </a:p>
@@ -7096,7 +7321,7 @@
           <a:p>
             <a:fld id="{FD484F64-32F6-45C5-931F-ADC1662401D0}" type="datetimeFigureOut">
               <a:rPr lang="en-US" dirty="0"/>
-              <a:t>3/21/2018</a:t>
+              <a:t>22-Mar-18</a:t>
             </a:fld>
             <a:endParaRPr lang="en-US" dirty="0"/>
           </a:p>
@@ -7286,7 +7511,7 @@
           <a:p>
             <a:fld id="{53086D93-FCAC-47E0-A2EE-787E62CA814C}" type="datetimeFigureOut">
               <a:rPr lang="en-US" dirty="0"/>
-              <a:t>3/21/2018</a:t>
+              <a:t>22-Mar-18</a:t>
             </a:fld>
             <a:endParaRPr lang="en-US" dirty="0"/>
           </a:p>
@@ -8258,7 +8483,7 @@
           <a:p>
             <a:fld id="{CDA879A6-0FD0-4734-A311-86BFCA472E6E}" type="datetimeFigureOut">
               <a:rPr lang="en-US" dirty="0"/>
-              <a:t>3/21/2018</a:t>
+              <a:t>22-Mar-18</a:t>
             </a:fld>
             <a:endParaRPr lang="en-US" dirty="0"/>
           </a:p>
@@ -8469,7 +8694,7 @@
           <a:p>
             <a:fld id="{19C9CA7B-DFD4-44B5-8C60-D14B8CD1FB59}" type="datetimeFigureOut">
               <a:rPr lang="en-US" dirty="0"/>
-              <a:t>3/21/2018</a:t>
+              <a:t>22-Mar-18</a:t>
             </a:fld>
             <a:endParaRPr lang="en-US" dirty="0"/>
           </a:p>
@@ -9503,7 +9728,7 @@
           <a:p>
             <a:fld id="{F34E6425-0181-43F2-84FC-787E803FD2F8}" type="datetimeFigureOut">
               <a:rPr lang="en-US" dirty="0"/>
-              <a:t>3/21/2018</a:t>
+              <a:t>22-Mar-18</a:t>
             </a:fld>
             <a:endParaRPr lang="en-US" dirty="0"/>
           </a:p>
@@ -9775,7 +10000,7 @@
           <a:p>
             <a:fld id="{3BDB8791-F1B0-41E7-B7FD-A781E65C4266}" type="datetimeFigureOut">
               <a:rPr lang="en-US" dirty="0"/>
-              <a:t>3/21/2018</a:t>
+              <a:t>22-Mar-18</a:t>
             </a:fld>
             <a:endParaRPr lang="en-US" dirty="0"/>
           </a:p>
@@ -10185,7 +10410,7 @@
           <a:p>
             <a:fld id="{5FDD63B2-E120-4ED8-B27B-C685F510A5FE}" type="datetimeFigureOut">
               <a:rPr lang="en-US" dirty="0"/>
-              <a:t>3/21/2018</a:t>
+              <a:t>22-Mar-18</a:t>
             </a:fld>
             <a:endParaRPr lang="en-US" dirty="0"/>
           </a:p>
@@ -10312,7 +10537,7 @@
           <a:p>
             <a:fld id="{7AA18ACC-A947-437B-A130-35BD54FDF1E9}" type="datetimeFigureOut">
               <a:rPr lang="en-US" dirty="0"/>
-              <a:t>3/21/2018</a:t>
+              <a:t>22-Mar-18</a:t>
             </a:fld>
             <a:endParaRPr lang="en-US" dirty="0"/>
           </a:p>
@@ -10407,7 +10632,7 @@
           <a:p>
             <a:fld id="{7C8D7E02-BCB8-4D50-A234-369438C08659}" type="datetimeFigureOut">
               <a:rPr lang="en-US" dirty="0"/>
-              <a:t>3/21/2018</a:t>
+              <a:t>22-Mar-18</a:t>
             </a:fld>
             <a:endParaRPr lang="en-US" dirty="0"/>
           </a:p>
@@ -11488,7 +11713,7 @@
           <a:p>
             <a:fld id="{76E86A4C-8E40-4F87-A4F0-01A0687C5742}" type="datetimeFigureOut">
               <a:rPr lang="en-US" dirty="0"/>
-              <a:t>3/21/2018</a:t>
+              <a:t>22-Mar-18</a:t>
             </a:fld>
             <a:endParaRPr lang="en-US" dirty="0"/>
           </a:p>
@@ -12596,7 +12821,7 @@
           <a:p>
             <a:fld id="{35E72C73-2D91-4E12-BA25-F0AA0C03599B}" type="datetimeFigureOut">
               <a:rPr lang="en-US" dirty="0"/>
-              <a:t>3/21/2018</a:t>
+              <a:t>22-Mar-18</a:t>
             </a:fld>
             <a:endParaRPr lang="en-US" dirty="0"/>
           </a:p>
@@ -13593,7 +13818,7 @@
           <a:p>
             <a:fld id="{2BE451C3-0FF4-47C4-B829-773ADF60F88C}" type="datetimeFigureOut">
               <a:rPr lang="en-US" dirty="0"/>
-              <a:t>3/21/2018</a:t>
+              <a:t>22-Mar-18</a:t>
             </a:fld>
             <a:endParaRPr lang="en-US" dirty="0"/>
           </a:p>
@@ -14511,6 +14736,526 @@
           <a:chExt cx="0" cy="0"/>
         </a:xfrm>
       </p:grpSpPr>
+      <p:grpSp>
+        <p:nvGrpSpPr>
+          <p:cNvPr id="8" name="Group 7">
+            <a:extLst>
+              <a:ext uri="{FF2B5EF4-FFF2-40B4-BE49-F238E27FC236}">
+                <a16:creationId xmlns:a16="http://schemas.microsoft.com/office/drawing/2014/main" id="{2EAA809E-9ED4-467B-9FEA-8650166F131E}"/>
+              </a:ext>
+            </a:extLst>
+          </p:cNvPr>
+          <p:cNvGrpSpPr>
+            <a:grpSpLocks noGrp="1" noUngrp="1" noRot="1" noChangeAspect="1" noMove="1" noResize="1"/>
+          </p:cNvGrpSpPr>
+          <p:nvPr>
+            <p:extLst>
+              <p:ext uri="{386F3935-93C4-4BCD-93E2-E3B085C9AB24}">
+                <p16:designElem xmlns:p16="http://schemas.microsoft.com/office/powerpoint/2015/main" val="1"/>
+              </p:ext>
+            </p:extLst>
+          </p:nvPr>
+        </p:nvGrpSpPr>
+        <p:grpSpPr>
+          <a:xfrm>
+            <a:off x="0" y="0"/>
+            <a:ext cx="12192000" cy="6858000"/>
+            <a:chOff x="0" y="0"/>
+            <a:chExt cx="12192000" cy="6858000"/>
+          </a:xfrm>
+        </p:grpSpPr>
+        <p:sp>
+          <p:nvSpPr>
+            <p:cNvPr id="9" name="Rectangle 8">
+              <a:extLst>
+                <a:ext uri="{FF2B5EF4-FFF2-40B4-BE49-F238E27FC236}">
+                  <a16:creationId xmlns:a16="http://schemas.microsoft.com/office/drawing/2014/main" id="{AB1B2C71-9154-4F87-876B-2C5247282E7C}"/>
+                </a:ext>
+              </a:extLst>
+            </p:cNvPr>
+            <p:cNvSpPr/>
+            <p:nvPr>
+              <p:extLst>
+                <p:ext uri="{386F3935-93C4-4BCD-93E2-E3B085C9AB24}">
+                  <p16:designElem xmlns:p16="http://schemas.microsoft.com/office/powerpoint/2015/main" val="1"/>
+                </p:ext>
+              </p:extLst>
+            </p:nvPr>
+          </p:nvSpPr>
+          <p:spPr>
+            <a:xfrm>
+              <a:off x="0" y="0"/>
+              <a:ext cx="12192000" cy="6858000"/>
+            </a:xfrm>
+            <a:prstGeom prst="rect">
+              <a:avLst/>
+            </a:prstGeom>
+            <a:blipFill>
+              <a:blip r:embed="rId2">
+                <a:duotone>
+                  <a:schemeClr val="dk2">
+                    <a:shade val="69000"/>
+                    <a:hueMod val="91000"/>
+                    <a:satMod val="164000"/>
+                    <a:lumMod val="74000"/>
+                  </a:schemeClr>
+                  <a:schemeClr val="dk2">
+                    <a:hueMod val="124000"/>
+                    <a:satMod val="140000"/>
+                    <a:lumMod val="142000"/>
+                  </a:schemeClr>
+                </a:duotone>
+              </a:blip>
+              <a:stretch>
+                <a:fillRect/>
+              </a:stretch>
+            </a:blipFill>
+            <a:ln>
+              <a:noFill/>
+            </a:ln>
+          </p:spPr>
+          <p:style>
+            <a:lnRef idx="2">
+              <a:schemeClr val="accent1">
+                <a:shade val="50000"/>
+              </a:schemeClr>
+            </a:lnRef>
+            <a:fillRef idx="1">
+              <a:schemeClr val="accent1"/>
+            </a:fillRef>
+            <a:effectRef idx="0">
+              <a:schemeClr val="accent1"/>
+            </a:effectRef>
+            <a:fontRef idx="minor">
+              <a:schemeClr val="lt1"/>
+            </a:fontRef>
+          </p:style>
+        </p:sp>
+        <p:sp>
+          <p:nvSpPr>
+            <p:cNvPr id="10" name="Freeform 5">
+              <a:extLst>
+                <a:ext uri="{FF2B5EF4-FFF2-40B4-BE49-F238E27FC236}">
+                  <a16:creationId xmlns:a16="http://schemas.microsoft.com/office/drawing/2014/main" id="{166CB913-1233-494F-B1BC-03CED0745E03}"/>
+                </a:ext>
+              </a:extLst>
+            </p:cNvPr>
+            <p:cNvSpPr>
+              <a:spLocks noEditPoints="1"/>
+            </p:cNvSpPr>
+            <p:nvPr>
+              <p:extLst>
+                <p:ext uri="{386F3935-93C4-4BCD-93E2-E3B085C9AB24}">
+                  <p16:designElem xmlns:p16="http://schemas.microsoft.com/office/powerpoint/2015/main" val="1"/>
+                </p:ext>
+              </p:extLst>
+            </p:nvPr>
+          </p:nvSpPr>
+          <p:spPr bwMode="gray">
+            <a:xfrm>
+              <a:off x="0" y="1587"/>
+              <a:ext cx="12192000" cy="6856413"/>
+            </a:xfrm>
+            <a:custGeom>
+              <a:avLst/>
+              <a:gdLst/>
+              <a:ahLst/>
+              <a:cxnLst/>
+              <a:rect l="0" t="0" r="r" b="b"/>
+              <a:pathLst>
+                <a:path w="15356" h="8638">
+                  <a:moveTo>
+                    <a:pt x="0" y="0"/>
+                  </a:moveTo>
+                  <a:lnTo>
+                    <a:pt x="0" y="8638"/>
+                  </a:lnTo>
+                  <a:lnTo>
+                    <a:pt x="15356" y="8638"/>
+                  </a:lnTo>
+                  <a:lnTo>
+                    <a:pt x="15356" y="0"/>
+                  </a:lnTo>
+                  <a:lnTo>
+                    <a:pt x="0" y="0"/>
+                  </a:lnTo>
+                  <a:close/>
+                  <a:moveTo>
+                    <a:pt x="14748" y="8038"/>
+                  </a:moveTo>
+                  <a:lnTo>
+                    <a:pt x="600" y="8038"/>
+                  </a:lnTo>
+                  <a:lnTo>
+                    <a:pt x="600" y="592"/>
+                  </a:lnTo>
+                  <a:lnTo>
+                    <a:pt x="14748" y="592"/>
+                  </a:lnTo>
+                  <a:lnTo>
+                    <a:pt x="14748" y="8038"/>
+                  </a:lnTo>
+                  <a:close/>
+                </a:path>
+              </a:pathLst>
+            </a:custGeom>
+            <a:solidFill>
+              <a:schemeClr val="bg1"/>
+            </a:solidFill>
+            <a:ln>
+              <a:noFill/>
+            </a:ln>
+          </p:spPr>
+        </p:sp>
+      </p:grpSp>
+      <p:sp>
+        <p:nvSpPr>
+          <p:cNvPr id="12" name="Rectangle 11">
+            <a:extLst>
+              <a:ext uri="{FF2B5EF4-FFF2-40B4-BE49-F238E27FC236}">
+                <a16:creationId xmlns:a16="http://schemas.microsoft.com/office/drawing/2014/main" id="{899D8977-5473-482F-BDA7-24D7C5042ECA}"/>
+              </a:ext>
+            </a:extLst>
+          </p:cNvPr>
+          <p:cNvSpPr>
+            <a:spLocks noGrp="1" noRot="1" noChangeAspect="1" noMove="1" noResize="1" noEditPoints="1" noAdjustHandles="1" noChangeArrowheads="1" noChangeShapeType="1" noTextEdit="1"/>
+          </p:cNvSpPr>
+          <p:nvPr>
+            <p:extLst>
+              <p:ext uri="{386F3935-93C4-4BCD-93E2-E3B085C9AB24}">
+                <p16:designElem xmlns:p16="http://schemas.microsoft.com/office/powerpoint/2015/main" val="1"/>
+              </p:ext>
+            </p:extLst>
+          </p:nvPr>
+        </p:nvSpPr>
+        <p:spPr>
+          <a:xfrm>
+            <a:off x="10437812" y="0"/>
+            <a:ext cx="685800" cy="1143000"/>
+          </a:xfrm>
+          <a:prstGeom prst="rect">
+            <a:avLst/>
+          </a:prstGeom>
+          <a:solidFill>
+            <a:schemeClr val="accent1"/>
+          </a:solidFill>
+          <a:ln>
+            <a:noFill/>
+          </a:ln>
+        </p:spPr>
+        <p:style>
+          <a:lnRef idx="1">
+            <a:schemeClr val="accent1"/>
+          </a:lnRef>
+          <a:fillRef idx="3">
+            <a:schemeClr val="accent1"/>
+          </a:fillRef>
+          <a:effectRef idx="2">
+            <a:schemeClr val="accent1"/>
+          </a:effectRef>
+          <a:fontRef idx="minor">
+            <a:schemeClr val="lt1"/>
+          </a:fontRef>
+        </p:style>
+      </p:sp>
+      <p:grpSp>
+        <p:nvGrpSpPr>
+          <p:cNvPr id="14" name="Group 13">
+            <a:extLst>
+              <a:ext uri="{FF2B5EF4-FFF2-40B4-BE49-F238E27FC236}">
+                <a16:creationId xmlns:a16="http://schemas.microsoft.com/office/drawing/2014/main" id="{F1ECA4FE-7D2F-4576-B767-3A5F5ABFE90F}"/>
+              </a:ext>
+            </a:extLst>
+          </p:cNvPr>
+          <p:cNvGrpSpPr>
+            <a:grpSpLocks noGrp="1" noUngrp="1" noRot="1" noChangeAspect="1" noMove="1" noResize="1"/>
+          </p:cNvGrpSpPr>
+          <p:nvPr>
+            <p:extLst>
+              <p:ext uri="{386F3935-93C4-4BCD-93E2-E3B085C9AB24}">
+                <p16:designElem xmlns:p16="http://schemas.microsoft.com/office/powerpoint/2015/main" val="1"/>
+              </p:ext>
+            </p:extLst>
+          </p:nvPr>
+        </p:nvGrpSpPr>
+        <p:grpSpPr>
+          <a:xfrm>
+            <a:off x="0" y="0"/>
+            <a:ext cx="12192000" cy="6858000"/>
+            <a:chOff x="0" y="0"/>
+            <a:chExt cx="12192000" cy="6858000"/>
+          </a:xfrm>
+        </p:grpSpPr>
+        <p:sp useBgFill="1">
+          <p:nvSpPr>
+            <p:cNvPr id="15" name="Rectangle 14">
+              <a:extLst>
+                <a:ext uri="{FF2B5EF4-FFF2-40B4-BE49-F238E27FC236}">
+                  <a16:creationId xmlns:a16="http://schemas.microsoft.com/office/drawing/2014/main" id="{5969441E-5462-4859-86CD-1737FDE36046}"/>
+                </a:ext>
+              </a:extLst>
+            </p:cNvPr>
+            <p:cNvSpPr/>
+            <p:nvPr>
+              <p:extLst>
+                <p:ext uri="{386F3935-93C4-4BCD-93E2-E3B085C9AB24}">
+                  <p16:designElem xmlns:p16="http://schemas.microsoft.com/office/powerpoint/2015/main" val="1"/>
+                </p:ext>
+              </p:extLst>
+            </p:nvPr>
+          </p:nvSpPr>
+          <p:spPr>
+            <a:xfrm>
+              <a:off x="0" y="0"/>
+              <a:ext cx="12192000" cy="6858000"/>
+            </a:xfrm>
+            <a:prstGeom prst="rect">
+              <a:avLst/>
+            </a:prstGeom>
+            <a:ln>
+              <a:noFill/>
+            </a:ln>
+          </p:spPr>
+          <p:style>
+            <a:lnRef idx="2">
+              <a:schemeClr val="accent1">
+                <a:shade val="50000"/>
+              </a:schemeClr>
+            </a:lnRef>
+            <a:fillRef idx="1">
+              <a:schemeClr val="accent1"/>
+            </a:fillRef>
+            <a:effectRef idx="0">
+              <a:schemeClr val="accent1"/>
+            </a:effectRef>
+            <a:fontRef idx="minor">
+              <a:schemeClr val="lt1"/>
+            </a:fontRef>
+          </p:style>
+        </p:sp>
+        <p:sp>
+          <p:nvSpPr>
+            <p:cNvPr id="16" name="Freeform 5">
+              <a:extLst>
+                <a:ext uri="{FF2B5EF4-FFF2-40B4-BE49-F238E27FC236}">
+                  <a16:creationId xmlns:a16="http://schemas.microsoft.com/office/drawing/2014/main" id="{596BD4B5-6833-40CC-96FE-EDC675634264}"/>
+                </a:ext>
+              </a:extLst>
+            </p:cNvPr>
+            <p:cNvSpPr>
+              <a:spLocks noEditPoints="1"/>
+            </p:cNvSpPr>
+            <p:nvPr>
+              <p:extLst>
+                <p:ext uri="{386F3935-93C4-4BCD-93E2-E3B085C9AB24}">
+                  <p16:designElem xmlns:p16="http://schemas.microsoft.com/office/powerpoint/2015/main" val="1"/>
+                </p:ext>
+              </p:extLst>
+            </p:nvPr>
+          </p:nvSpPr>
+          <p:spPr bwMode="gray">
+            <a:xfrm>
+              <a:off x="0" y="1587"/>
+              <a:ext cx="12192000" cy="6856413"/>
+            </a:xfrm>
+            <a:custGeom>
+              <a:avLst/>
+              <a:gdLst/>
+              <a:ahLst/>
+              <a:cxnLst/>
+              <a:rect l="0" t="0" r="r" b="b"/>
+              <a:pathLst>
+                <a:path w="15356" h="8638">
+                  <a:moveTo>
+                    <a:pt x="0" y="0"/>
+                  </a:moveTo>
+                  <a:lnTo>
+                    <a:pt x="0" y="8638"/>
+                  </a:lnTo>
+                  <a:lnTo>
+                    <a:pt x="15356" y="8638"/>
+                  </a:lnTo>
+                  <a:lnTo>
+                    <a:pt x="15356" y="0"/>
+                  </a:lnTo>
+                  <a:lnTo>
+                    <a:pt x="0" y="0"/>
+                  </a:lnTo>
+                  <a:close/>
+                  <a:moveTo>
+                    <a:pt x="14748" y="8038"/>
+                  </a:moveTo>
+                  <a:lnTo>
+                    <a:pt x="600" y="8038"/>
+                  </a:lnTo>
+                  <a:lnTo>
+                    <a:pt x="600" y="592"/>
+                  </a:lnTo>
+                  <a:lnTo>
+                    <a:pt x="14748" y="592"/>
+                  </a:lnTo>
+                  <a:lnTo>
+                    <a:pt x="14748" y="8038"/>
+                  </a:lnTo>
+                  <a:close/>
+                </a:path>
+              </a:pathLst>
+            </a:custGeom>
+            <a:solidFill>
+              <a:srgbClr val="FFFFFF"/>
+            </a:solidFill>
+            <a:ln>
+              <a:noFill/>
+            </a:ln>
+          </p:spPr>
+        </p:sp>
+      </p:grpSp>
+      <p:cxnSp>
+        <p:nvCxnSpPr>
+          <p:cNvPr id="18" name="Straight Connector 17">
+            <a:extLst>
+              <a:ext uri="{FF2B5EF4-FFF2-40B4-BE49-F238E27FC236}">
+                <a16:creationId xmlns:a16="http://schemas.microsoft.com/office/drawing/2014/main" id="{E81F53E2-F556-42FA-8D24-113839EE19F8}"/>
+              </a:ext>
+            </a:extLst>
+          </p:cNvPr>
+          <p:cNvCxnSpPr>
+            <a:cxnSpLocks noGrp="1" noRot="1" noChangeAspect="1" noMove="1" noResize="1" noEditPoints="1" noAdjustHandles="1" noChangeArrowheads="1" noChangeShapeType="1"/>
+          </p:cNvCxnSpPr>
+          <p:nvPr>
+            <p:extLst>
+              <p:ext uri="{386F3935-93C4-4BCD-93E2-E3B085C9AB24}">
+                <p16:designElem xmlns:p16="http://schemas.microsoft.com/office/powerpoint/2015/main" val="1"/>
+              </p:ext>
+            </p:extLst>
+          </p:nvPr>
+        </p:nvCxnSpPr>
+        <p:spPr>
+          <a:xfrm>
+            <a:off x="5758249" y="4166888"/>
+            <a:ext cx="675502" cy="0"/>
+          </a:xfrm>
+          <a:prstGeom prst="line">
+            <a:avLst/>
+          </a:prstGeom>
+          <a:ln w="12700">
+            <a:solidFill>
+              <a:schemeClr val="accent1">
+                <a:lumMod val="60000"/>
+                <a:lumOff val="40000"/>
+              </a:schemeClr>
+            </a:solidFill>
+          </a:ln>
+        </p:spPr>
+        <p:style>
+          <a:lnRef idx="1">
+            <a:schemeClr val="accent1"/>
+          </a:lnRef>
+          <a:fillRef idx="0">
+            <a:schemeClr val="accent1"/>
+          </a:fillRef>
+          <a:effectRef idx="0">
+            <a:schemeClr val="accent1"/>
+          </a:effectRef>
+          <a:fontRef idx="minor">
+            <a:schemeClr val="tx1"/>
+          </a:fontRef>
+        </p:style>
+      </p:cxnSp>
+      <p:sp>
+        <p:nvSpPr>
+          <p:cNvPr id="2" name="Title 1">
+            <a:extLst>
+              <a:ext uri="{FF2B5EF4-FFF2-40B4-BE49-F238E27FC236}">
+                <a16:creationId xmlns:a16="http://schemas.microsoft.com/office/drawing/2014/main" id="{BC60BBCF-41EE-4613-A99C-81485CFA4582}"/>
+              </a:ext>
+            </a:extLst>
+          </p:cNvPr>
+          <p:cNvSpPr>
+            <a:spLocks noGrp="1"/>
+          </p:cNvSpPr>
+          <p:nvPr>
+            <p:ph type="title"/>
+          </p:nvPr>
+        </p:nvSpPr>
+        <p:spPr>
+          <a:xfrm>
+            <a:off x="1683171" y="1169773"/>
+            <a:ext cx="8825658" cy="2870161"/>
+          </a:xfrm>
+        </p:spPr>
+        <p:txBody>
+          <a:bodyPr vert="horz" lIns="91440" tIns="45720" rIns="91440" bIns="45720" rtlCol="0" anchor="b">
+            <a:normAutofit/>
+          </a:bodyPr>
+          <a:lstStyle/>
+          <a:p>
+            <a:pPr algn="ctr"/>
+            <a:r>
+              <a:rPr lang="en-US" sz="5400">
+                <a:solidFill>
+                  <a:schemeClr val="tx1"/>
+                </a:solidFill>
+              </a:rPr>
+              <a:t>Tools</a:t>
+            </a:r>
+          </a:p>
+        </p:txBody>
+      </p:sp>
+    </p:spTree>
+    <p:extLst>
+      <p:ext uri="{BB962C8B-B14F-4D97-AF65-F5344CB8AC3E}">
+        <p14:creationId xmlns:p14="http://schemas.microsoft.com/office/powerpoint/2010/main" val="475045924"/>
+      </p:ext>
+    </p:extLst>
+  </p:cSld>
+  <p:clrMapOvr>
+    <a:overrideClrMapping bg1="dk1" tx1="lt1" bg2="dk2" tx2="lt2" accent1="accent1" accent2="accent2" accent3="accent3" accent4="accent4" accent5="accent5" accent6="accent6" hlink="hlink" folHlink="folHlink"/>
+  </p:clrMapOvr>
+</p:sld>
+</file>
+
+<file path=ppt/slides/slide11.xml><?xml version="1.0" encoding="utf-8"?>
+<p:sld xmlns:a="http://schemas.openxmlformats.org/drawingml/2006/main" xmlns:r="http://schemas.openxmlformats.org/officeDocument/2006/relationships" xmlns:p="http://schemas.openxmlformats.org/presentationml/2006/main">
+  <p:cSld>
+    <p:bg>
+      <p:bgPr>
+        <a:blipFill rotWithShape="1">
+          <a:blip r:embed="rId2">
+            <a:duotone>
+              <a:schemeClr val="bg2">
+                <a:shade val="69000"/>
+                <a:hueMod val="91000"/>
+                <a:satMod val="164000"/>
+                <a:lumMod val="74000"/>
+              </a:schemeClr>
+              <a:schemeClr val="bg2">
+                <a:hueMod val="124000"/>
+                <a:satMod val="140000"/>
+                <a:lumMod val="142000"/>
+              </a:schemeClr>
+            </a:duotone>
+            <a:extLst/>
+          </a:blip>
+          <a:stretch/>
+        </a:blipFill>
+        <a:effectLst/>
+      </p:bgPr>
+    </p:bg>
+    <p:spTree>
+      <p:nvGrpSpPr>
+        <p:cNvPr id="1" name=""/>
+        <p:cNvGrpSpPr/>
+        <p:nvPr/>
+      </p:nvGrpSpPr>
+      <p:grpSpPr>
+        <a:xfrm>
+          <a:off x="0" y="0"/>
+          <a:ext cx="0" cy="0"/>
+          <a:chOff x="0" y="0"/>
+          <a:chExt cx="0" cy="0"/>
+        </a:xfrm>
+      </p:grpSpPr>
       <p:sp useBgFill="1">
         <p:nvSpPr>
           <p:cNvPr id="8" name="Rectangle 7">
@@ -15227,7 +15972,7 @@
 </p:sld>
 </file>
 
-<file path=ppt/slides/slide11.xml><?xml version="1.0" encoding="utf-8"?>
+<file path=ppt/slides/slide12.xml><?xml version="1.0" encoding="utf-8"?>
 <p:sld xmlns:a="http://schemas.openxmlformats.org/drawingml/2006/main" xmlns:r="http://schemas.openxmlformats.org/officeDocument/2006/relationships" xmlns:p="http://schemas.openxmlformats.org/presentationml/2006/main">
   <p:cSld>
     <p:bg>
@@ -15981,7 +16726,7 @@
 </p:sld>
 </file>
 
-<file path=ppt/slides/slide12.xml><?xml version="1.0" encoding="utf-8"?>
+<file path=ppt/slides/slide13.xml><?xml version="1.0" encoding="utf-8"?>
 <p:sld xmlns:a="http://schemas.openxmlformats.org/drawingml/2006/main" xmlns:r="http://schemas.openxmlformats.org/officeDocument/2006/relationships" xmlns:p="http://schemas.openxmlformats.org/presentationml/2006/main">
   <p:cSld>
     <p:bg>
@@ -16736,7 +17481,7 @@
 </p:sld>
 </file>
 
-<file path=ppt/slides/slide13.xml><?xml version="1.0" encoding="utf-8"?>
+<file path=ppt/slides/slide14.xml><?xml version="1.0" encoding="utf-8"?>
 <p:sld xmlns:a="http://schemas.openxmlformats.org/drawingml/2006/main" xmlns:r="http://schemas.openxmlformats.org/officeDocument/2006/relationships" xmlns:p="http://schemas.openxmlformats.org/presentationml/2006/main">
   <p:cSld>
     <p:bg>
@@ -17475,7 +18220,7 @@
 </p:sld>
 </file>
 
-<file path=ppt/slides/slide14.xml><?xml version="1.0" encoding="utf-8"?>
+<file path=ppt/slides/slide15.xml><?xml version="1.0" encoding="utf-8"?>
 <p:sld xmlns:a="http://schemas.openxmlformats.org/drawingml/2006/main" xmlns:r="http://schemas.openxmlformats.org/officeDocument/2006/relationships" xmlns:p="http://schemas.openxmlformats.org/presentationml/2006/main">
   <p:cSld>
     <p:bg>
@@ -17941,7 +18686,7 @@
 </p:sld>
 </file>
 
-<file path=ppt/slides/slide15.xml><?xml version="1.0" encoding="utf-8"?>
+<file path=ppt/slides/slide16.xml><?xml version="1.0" encoding="utf-8"?>
 <p:sld xmlns:a="http://schemas.openxmlformats.org/drawingml/2006/main" xmlns:r="http://schemas.openxmlformats.org/officeDocument/2006/relationships" xmlns:p="http://schemas.openxmlformats.org/presentationml/2006/main">
   <p:cSld>
     <p:bg>
@@ -18461,7 +19206,7 @@
 </p:sld>
 </file>
 
-<file path=ppt/slides/slide16.xml><?xml version="1.0" encoding="utf-8"?>
+<file path=ppt/slides/slide17.xml><?xml version="1.0" encoding="utf-8"?>
 <p:sld xmlns:a="http://schemas.openxmlformats.org/drawingml/2006/main" xmlns:r="http://schemas.openxmlformats.org/officeDocument/2006/relationships" xmlns:p="http://schemas.openxmlformats.org/presentationml/2006/main">
   <p:cSld>
     <p:bg>
@@ -22548,12 +23293,69 @@
           <a:chExt cx="0" cy="0"/>
         </a:xfrm>
       </p:grpSpPr>
+      <p:sp useBgFill="1">
+        <p:nvSpPr>
+          <p:cNvPr id="8" name="Rectangle 7">
+            <a:extLst>
+              <a:ext uri="{FF2B5EF4-FFF2-40B4-BE49-F238E27FC236}">
+                <a16:creationId xmlns:a16="http://schemas.microsoft.com/office/drawing/2014/main" id="{C314C310-850D-4491-AA52-C75BEA68B68C}"/>
+              </a:ext>
+            </a:extLst>
+          </p:cNvPr>
+          <p:cNvSpPr>
+            <a:spLocks noGrp="1" noRot="1" noChangeAspect="1" noMove="1" noResize="1" noEditPoints="1" noAdjustHandles="1" noChangeArrowheads="1" noChangeShapeType="1" noTextEdit="1"/>
+          </p:cNvSpPr>
+          <p:nvPr>
+            <p:extLst>
+              <p:ext uri="{386F3935-93C4-4BCD-93E2-E3B085C9AB24}">
+                <p16:designElem xmlns:p16="http://schemas.microsoft.com/office/powerpoint/2015/main" val="1"/>
+              </p:ext>
+            </p:extLst>
+          </p:nvPr>
+        </p:nvSpPr>
+        <p:spPr>
+          <a:xfrm>
+            <a:off x="0" y="0"/>
+            <a:ext cx="12192000" cy="6858000"/>
+          </a:xfrm>
+          <a:prstGeom prst="rect">
+            <a:avLst/>
+          </a:prstGeom>
+          <a:ln>
+            <a:noFill/>
+          </a:ln>
+        </p:spPr>
+        <p:style>
+          <a:lnRef idx="2">
+            <a:schemeClr val="accent1">
+              <a:shade val="50000"/>
+            </a:schemeClr>
+          </a:lnRef>
+          <a:fillRef idx="1">
+            <a:schemeClr val="accent1"/>
+          </a:fillRef>
+          <a:effectRef idx="0">
+            <a:schemeClr val="accent1"/>
+          </a:effectRef>
+          <a:fontRef idx="minor">
+            <a:schemeClr val="lt1"/>
+          </a:fontRef>
+        </p:style>
+        <p:txBody>
+          <a:bodyPr rtlCol="0" anchor="ctr"/>
+          <a:lstStyle/>
+          <a:p>
+            <a:pPr algn="ctr"/>
+            <a:endParaRPr lang="en-US"/>
+          </a:p>
+        </p:txBody>
+      </p:sp>
       <p:grpSp>
         <p:nvGrpSpPr>
-          <p:cNvPr id="8" name="Group 7">
+          <p:cNvPr id="10" name="Group 9">
             <a:extLst>
               <a:ext uri="{FF2B5EF4-FFF2-40B4-BE49-F238E27FC236}">
-                <a16:creationId xmlns:a16="http://schemas.microsoft.com/office/drawing/2014/main" id="{2EAA809E-9ED4-467B-9FEA-8650166F131E}"/>
+                <a16:creationId xmlns:a16="http://schemas.microsoft.com/office/drawing/2014/main" id="{D4EC3799-3F52-48CE-85CC-83AED368EB42}"/>
               </a:ext>
             </a:extLst>
           </p:cNvPr>
@@ -22578,10 +23380,632 @@
         </p:grpSpPr>
         <p:sp>
           <p:nvSpPr>
-            <p:cNvPr id="9" name="Rectangle 8">
+            <p:cNvPr id="11" name="Rectangle 10">
               <a:extLst>
                 <a:ext uri="{FF2B5EF4-FFF2-40B4-BE49-F238E27FC236}">
-                  <a16:creationId xmlns:a16="http://schemas.microsoft.com/office/drawing/2014/main" id="{AB1B2C71-9154-4F87-876B-2C5247282E7C}"/>
+                  <a16:creationId xmlns:a16="http://schemas.microsoft.com/office/drawing/2014/main" id="{F3FC2939-BF10-4CBC-904B-74A17D4B9C35}"/>
+                </a:ext>
+              </a:extLst>
+            </p:cNvPr>
+            <p:cNvSpPr/>
+            <p:nvPr>
+              <p:extLst>
+                <p:ext uri="{386F3935-93C4-4BCD-93E2-E3B085C9AB24}">
+                  <p16:designElem xmlns:p16="http://schemas.microsoft.com/office/powerpoint/2015/main" val="1"/>
+                </p:ext>
+              </p:extLst>
+            </p:nvPr>
+          </p:nvSpPr>
+          <p:spPr>
+            <a:xfrm>
+              <a:off x="0" y="0"/>
+              <a:ext cx="12192000" cy="6858000"/>
+            </a:xfrm>
+            <a:prstGeom prst="rect">
+              <a:avLst/>
+            </a:prstGeom>
+            <a:noFill/>
+            <a:ln>
+              <a:noFill/>
+            </a:ln>
+          </p:spPr>
+          <p:style>
+            <a:lnRef idx="2">
+              <a:schemeClr val="accent1">
+                <a:shade val="50000"/>
+              </a:schemeClr>
+            </a:lnRef>
+            <a:fillRef idx="1">
+              <a:schemeClr val="accent1"/>
+            </a:fillRef>
+            <a:effectRef idx="0">
+              <a:schemeClr val="accent1"/>
+            </a:effectRef>
+            <a:fontRef idx="minor">
+              <a:schemeClr val="lt1"/>
+            </a:fontRef>
+          </p:style>
+        </p:sp>
+        <p:sp>
+          <p:nvSpPr>
+            <p:cNvPr id="12" name="Freeform 5">
+              <a:extLst>
+                <a:ext uri="{FF2B5EF4-FFF2-40B4-BE49-F238E27FC236}">
+                  <a16:creationId xmlns:a16="http://schemas.microsoft.com/office/drawing/2014/main" id="{266B6D5D-11B6-40A6-9CEF-F0B0D104C5C6}"/>
+                </a:ext>
+              </a:extLst>
+            </p:cNvPr>
+            <p:cNvSpPr>
+              <a:spLocks noEditPoints="1"/>
+            </p:cNvSpPr>
+            <p:nvPr>
+              <p:extLst>
+                <p:ext uri="{386F3935-93C4-4BCD-93E2-E3B085C9AB24}">
+                  <p16:designElem xmlns:p16="http://schemas.microsoft.com/office/powerpoint/2015/main" val="1"/>
+                </p:ext>
+              </p:extLst>
+            </p:nvPr>
+          </p:nvSpPr>
+          <p:spPr bwMode="gray">
+            <a:xfrm>
+              <a:off x="0" y="1587"/>
+              <a:ext cx="12192000" cy="6856413"/>
+            </a:xfrm>
+            <a:custGeom>
+              <a:avLst/>
+              <a:gdLst/>
+              <a:ahLst/>
+              <a:cxnLst/>
+              <a:rect l="0" t="0" r="r" b="b"/>
+              <a:pathLst>
+                <a:path w="15356" h="8638">
+                  <a:moveTo>
+                    <a:pt x="0" y="0"/>
+                  </a:moveTo>
+                  <a:lnTo>
+                    <a:pt x="0" y="8638"/>
+                  </a:lnTo>
+                  <a:lnTo>
+                    <a:pt x="15356" y="8638"/>
+                  </a:lnTo>
+                  <a:lnTo>
+                    <a:pt x="15356" y="0"/>
+                  </a:lnTo>
+                  <a:lnTo>
+                    <a:pt x="0" y="0"/>
+                  </a:lnTo>
+                  <a:close/>
+                  <a:moveTo>
+                    <a:pt x="14748" y="8038"/>
+                  </a:moveTo>
+                  <a:lnTo>
+                    <a:pt x="600" y="8038"/>
+                  </a:lnTo>
+                  <a:lnTo>
+                    <a:pt x="600" y="592"/>
+                  </a:lnTo>
+                  <a:lnTo>
+                    <a:pt x="14748" y="592"/>
+                  </a:lnTo>
+                  <a:lnTo>
+                    <a:pt x="14748" y="8038"/>
+                  </a:lnTo>
+                  <a:close/>
+                </a:path>
+              </a:pathLst>
+            </a:custGeom>
+            <a:solidFill>
+              <a:srgbClr val="FFFFFF"/>
+            </a:solidFill>
+            <a:ln>
+              <a:noFill/>
+            </a:ln>
+          </p:spPr>
+        </p:sp>
+      </p:grpSp>
+      <p:cxnSp>
+        <p:nvCxnSpPr>
+          <p:cNvPr id="14" name="Straight Connector 13">
+            <a:extLst>
+              <a:ext uri="{FF2B5EF4-FFF2-40B4-BE49-F238E27FC236}">
+                <a16:creationId xmlns:a16="http://schemas.microsoft.com/office/drawing/2014/main" id="{789E20C7-BB50-4317-93C7-90C8ED80B275}"/>
+              </a:ext>
+            </a:extLst>
+          </p:cNvPr>
+          <p:cNvCxnSpPr>
+            <a:cxnSpLocks noGrp="1" noRot="1" noChangeAspect="1" noMove="1" noResize="1" noEditPoints="1" noAdjustHandles="1" noChangeArrowheads="1" noChangeShapeType="1"/>
+          </p:cNvCxnSpPr>
+          <p:nvPr>
+            <p:extLst>
+              <p:ext uri="{386F3935-93C4-4BCD-93E2-E3B085C9AB24}">
+                <p16:designElem xmlns:p16="http://schemas.microsoft.com/office/powerpoint/2015/main" val="1"/>
+              </p:ext>
+            </p:extLst>
+          </p:nvPr>
+        </p:nvCxnSpPr>
+        <p:spPr>
+          <a:xfrm>
+            <a:off x="4356687" y="1930986"/>
+            <a:ext cx="0" cy="3200400"/>
+          </a:xfrm>
+          <a:prstGeom prst="line">
+            <a:avLst/>
+          </a:prstGeom>
+          <a:ln w="15875" cap="sq">
+            <a:solidFill>
+              <a:schemeClr val="tx1"/>
+            </a:solidFill>
+            <a:miter lim="800000"/>
+          </a:ln>
+        </p:spPr>
+        <p:style>
+          <a:lnRef idx="1">
+            <a:schemeClr val="accent1"/>
+          </a:lnRef>
+          <a:fillRef idx="0">
+            <a:schemeClr val="accent1"/>
+          </a:fillRef>
+          <a:effectRef idx="0">
+            <a:schemeClr val="accent1"/>
+          </a:effectRef>
+          <a:fontRef idx="minor">
+            <a:schemeClr val="tx1"/>
+          </a:fontRef>
+        </p:style>
+      </p:cxnSp>
+      <p:sp>
+        <p:nvSpPr>
+          <p:cNvPr id="16" name="Date Placeholder 3">
+            <a:extLst>
+              <a:ext uri="{FF2B5EF4-FFF2-40B4-BE49-F238E27FC236}">
+                <a16:creationId xmlns:a16="http://schemas.microsoft.com/office/drawing/2014/main" id="{95B8172D-A4C8-41B4-8991-78BBEC4039D5}"/>
+              </a:ext>
+            </a:extLst>
+          </p:cNvPr>
+          <p:cNvSpPr txBox="1">
+            <a:spLocks noGrp="1" noRot="1" noChangeAspect="1" noMove="1" noResize="1" noEditPoints="1" noAdjustHandles="1" noChangeArrowheads="1" noChangeShapeType="1" noTextEdit="1"/>
+          </p:cNvSpPr>
+          <p:nvPr>
+            <p:extLst>
+              <p:ext uri="{386F3935-93C4-4BCD-93E2-E3B085C9AB24}">
+                <p16:designElem xmlns:p16="http://schemas.microsoft.com/office/powerpoint/2015/main" val="1"/>
+              </p:ext>
+            </p:extLst>
+          </p:nvPr>
+        </p:nvSpPr>
+        <p:spPr bwMode="gray">
+          <a:xfrm>
+            <a:off x="7718854" y="6391839"/>
+            <a:ext cx="2997637" cy="304798"/>
+          </a:xfrm>
+          <a:prstGeom prst="rect">
+            <a:avLst/>
+          </a:prstGeom>
+        </p:spPr>
+        <p:txBody>
+          <a:bodyPr vert="horz" lIns="91440" tIns="45720" rIns="91440" bIns="45720" rtlCol="0" anchor="t"/>
+          <a:lstStyle>
+            <a:defPPr>
+              <a:defRPr lang="en-US"/>
+            </a:defPPr>
+            <a:lvl1pPr marL="0" algn="l" defTabSz="457200" rtl="0" eaLnBrk="1" latinLnBrk="0" hangingPunct="1">
+              <a:defRPr sz="1000" b="0" i="0" kern="1200">
+                <a:solidFill>
+                  <a:schemeClr val="bg1">
+                    <a:alpha val="60000"/>
+                  </a:schemeClr>
+                </a:solidFill>
+                <a:latin typeface="+mn-lt"/>
+                <a:ea typeface="+mn-ea"/>
+                <a:cs typeface="+mn-cs"/>
+              </a:defRPr>
+            </a:lvl1pPr>
+            <a:lvl2pPr marL="457200" algn="l" defTabSz="457200" rtl="0" eaLnBrk="1" latinLnBrk="0" hangingPunct="1">
+              <a:defRPr sz="1800" kern="1200">
+                <a:solidFill>
+                  <a:schemeClr val="tx1"/>
+                </a:solidFill>
+                <a:latin typeface="+mn-lt"/>
+                <a:ea typeface="+mn-ea"/>
+                <a:cs typeface="+mn-cs"/>
+              </a:defRPr>
+            </a:lvl2pPr>
+            <a:lvl3pPr marL="914400" algn="l" defTabSz="457200" rtl="0" eaLnBrk="1" latinLnBrk="0" hangingPunct="1">
+              <a:defRPr sz="1800" kern="1200">
+                <a:solidFill>
+                  <a:schemeClr val="tx1"/>
+                </a:solidFill>
+                <a:latin typeface="+mn-lt"/>
+                <a:ea typeface="+mn-ea"/>
+                <a:cs typeface="+mn-cs"/>
+              </a:defRPr>
+            </a:lvl3pPr>
+            <a:lvl4pPr marL="1371600" algn="l" defTabSz="457200" rtl="0" eaLnBrk="1" latinLnBrk="0" hangingPunct="1">
+              <a:defRPr sz="1800" kern="1200">
+                <a:solidFill>
+                  <a:schemeClr val="tx1"/>
+                </a:solidFill>
+                <a:latin typeface="+mn-lt"/>
+                <a:ea typeface="+mn-ea"/>
+                <a:cs typeface="+mn-cs"/>
+              </a:defRPr>
+            </a:lvl4pPr>
+            <a:lvl5pPr marL="1828800" algn="l" defTabSz="457200" rtl="0" eaLnBrk="1" latinLnBrk="0" hangingPunct="1">
+              <a:defRPr sz="1800" kern="1200">
+                <a:solidFill>
+                  <a:schemeClr val="tx1"/>
+                </a:solidFill>
+                <a:latin typeface="+mn-lt"/>
+                <a:ea typeface="+mn-ea"/>
+                <a:cs typeface="+mn-cs"/>
+              </a:defRPr>
+            </a:lvl5pPr>
+            <a:lvl6pPr marL="2286000" algn="l" defTabSz="457200" rtl="0" eaLnBrk="1" latinLnBrk="0" hangingPunct="1">
+              <a:defRPr sz="1800" kern="1200">
+                <a:solidFill>
+                  <a:schemeClr val="tx1"/>
+                </a:solidFill>
+                <a:latin typeface="+mn-lt"/>
+                <a:ea typeface="+mn-ea"/>
+                <a:cs typeface="+mn-cs"/>
+              </a:defRPr>
+            </a:lvl6pPr>
+            <a:lvl7pPr marL="2743200" algn="l" defTabSz="457200" rtl="0" eaLnBrk="1" latinLnBrk="0" hangingPunct="1">
+              <a:defRPr sz="1800" kern="1200">
+                <a:solidFill>
+                  <a:schemeClr val="tx1"/>
+                </a:solidFill>
+                <a:latin typeface="+mn-lt"/>
+                <a:ea typeface="+mn-ea"/>
+                <a:cs typeface="+mn-cs"/>
+              </a:defRPr>
+            </a:lvl7pPr>
+            <a:lvl8pPr marL="3200400" algn="l" defTabSz="457200" rtl="0" eaLnBrk="1" latinLnBrk="0" hangingPunct="1">
+              <a:defRPr sz="1800" kern="1200">
+                <a:solidFill>
+                  <a:schemeClr val="tx1"/>
+                </a:solidFill>
+                <a:latin typeface="+mn-lt"/>
+                <a:ea typeface="+mn-ea"/>
+                <a:cs typeface="+mn-cs"/>
+              </a:defRPr>
+            </a:lvl8pPr>
+            <a:lvl9pPr marL="3657600" algn="l" defTabSz="457200" rtl="0" eaLnBrk="1" latinLnBrk="0" hangingPunct="1">
+              <a:defRPr sz="1800" kern="1200">
+                <a:solidFill>
+                  <a:schemeClr val="tx1"/>
+                </a:solidFill>
+                <a:latin typeface="+mn-lt"/>
+                <a:ea typeface="+mn-ea"/>
+                <a:cs typeface="+mn-cs"/>
+              </a:defRPr>
+            </a:lvl9pPr>
+          </a:lstStyle>
+          <a:p>
+            <a:pPr algn="r"/>
+            <a:endParaRPr lang="en-US" b="1" dirty="0">
+              <a:solidFill>
+                <a:srgbClr val="B31166"/>
+              </a:solidFill>
+            </a:endParaRPr>
+          </a:p>
+        </p:txBody>
+      </p:sp>
+      <p:sp>
+        <p:nvSpPr>
+          <p:cNvPr id="18" name="Footer Placeholder 4">
+            <a:extLst>
+              <a:ext uri="{FF2B5EF4-FFF2-40B4-BE49-F238E27FC236}">
+                <a16:creationId xmlns:a16="http://schemas.microsoft.com/office/drawing/2014/main" id="{0308D749-5984-4BB8-A788-A85D24304A0A}"/>
+              </a:ext>
+            </a:extLst>
+          </p:cNvPr>
+          <p:cNvSpPr txBox="1">
+            <a:spLocks noGrp="1" noRot="1" noChangeAspect="1" noMove="1" noResize="1" noEditPoints="1" noAdjustHandles="1" noChangeArrowheads="1" noChangeShapeType="1" noTextEdit="1"/>
+          </p:cNvSpPr>
+          <p:nvPr>
+            <p:extLst>
+              <p:ext uri="{386F3935-93C4-4BCD-93E2-E3B085C9AB24}">
+                <p16:designElem xmlns:p16="http://schemas.microsoft.com/office/powerpoint/2015/main" val="1"/>
+              </p:ext>
+            </p:extLst>
+          </p:nvPr>
+        </p:nvSpPr>
+        <p:spPr bwMode="gray">
+          <a:xfrm>
+            <a:off x="561110" y="6391838"/>
+            <a:ext cx="3859795" cy="304801"/>
+          </a:xfrm>
+          <a:prstGeom prst="rect">
+            <a:avLst/>
+          </a:prstGeom>
+        </p:spPr>
+        <p:txBody>
+          <a:bodyPr vert="horz" lIns="91440" tIns="45720" rIns="91440" bIns="45720" rtlCol="0" anchor="ctr"/>
+          <a:lstStyle>
+            <a:defPPr>
+              <a:defRPr lang="en-US"/>
+            </a:defPPr>
+            <a:lvl1pPr marL="0" algn="l" defTabSz="457200" rtl="0" eaLnBrk="1" latinLnBrk="0" hangingPunct="1">
+              <a:defRPr sz="1000" b="0" i="0" kern="1200">
+                <a:solidFill>
+                  <a:schemeClr val="bg1">
+                    <a:alpha val="60000"/>
+                  </a:schemeClr>
+                </a:solidFill>
+                <a:latin typeface="+mn-lt"/>
+                <a:ea typeface="+mn-ea"/>
+                <a:cs typeface="+mn-cs"/>
+              </a:defRPr>
+            </a:lvl1pPr>
+            <a:lvl2pPr marL="457200" algn="l" defTabSz="457200" rtl="0" eaLnBrk="1" latinLnBrk="0" hangingPunct="1">
+              <a:defRPr sz="1800" kern="1200">
+                <a:solidFill>
+                  <a:schemeClr val="tx1"/>
+                </a:solidFill>
+                <a:latin typeface="+mn-lt"/>
+                <a:ea typeface="+mn-ea"/>
+                <a:cs typeface="+mn-cs"/>
+              </a:defRPr>
+            </a:lvl2pPr>
+            <a:lvl3pPr marL="914400" algn="l" defTabSz="457200" rtl="0" eaLnBrk="1" latinLnBrk="0" hangingPunct="1">
+              <a:defRPr sz="1800" kern="1200">
+                <a:solidFill>
+                  <a:schemeClr val="tx1"/>
+                </a:solidFill>
+                <a:latin typeface="+mn-lt"/>
+                <a:ea typeface="+mn-ea"/>
+                <a:cs typeface="+mn-cs"/>
+              </a:defRPr>
+            </a:lvl3pPr>
+            <a:lvl4pPr marL="1371600" algn="l" defTabSz="457200" rtl="0" eaLnBrk="1" latinLnBrk="0" hangingPunct="1">
+              <a:defRPr sz="1800" kern="1200">
+                <a:solidFill>
+                  <a:schemeClr val="tx1"/>
+                </a:solidFill>
+                <a:latin typeface="+mn-lt"/>
+                <a:ea typeface="+mn-ea"/>
+                <a:cs typeface="+mn-cs"/>
+              </a:defRPr>
+            </a:lvl4pPr>
+            <a:lvl5pPr marL="1828800" algn="l" defTabSz="457200" rtl="0" eaLnBrk="1" latinLnBrk="0" hangingPunct="1">
+              <a:defRPr sz="1800" kern="1200">
+                <a:solidFill>
+                  <a:schemeClr val="tx1"/>
+                </a:solidFill>
+                <a:latin typeface="+mn-lt"/>
+                <a:ea typeface="+mn-ea"/>
+                <a:cs typeface="+mn-cs"/>
+              </a:defRPr>
+            </a:lvl5pPr>
+            <a:lvl6pPr marL="2286000" algn="l" defTabSz="457200" rtl="0" eaLnBrk="1" latinLnBrk="0" hangingPunct="1">
+              <a:defRPr sz="1800" kern="1200">
+                <a:solidFill>
+                  <a:schemeClr val="tx1"/>
+                </a:solidFill>
+                <a:latin typeface="+mn-lt"/>
+                <a:ea typeface="+mn-ea"/>
+                <a:cs typeface="+mn-cs"/>
+              </a:defRPr>
+            </a:lvl6pPr>
+            <a:lvl7pPr marL="2743200" algn="l" defTabSz="457200" rtl="0" eaLnBrk="1" latinLnBrk="0" hangingPunct="1">
+              <a:defRPr sz="1800" kern="1200">
+                <a:solidFill>
+                  <a:schemeClr val="tx1"/>
+                </a:solidFill>
+                <a:latin typeface="+mn-lt"/>
+                <a:ea typeface="+mn-ea"/>
+                <a:cs typeface="+mn-cs"/>
+              </a:defRPr>
+            </a:lvl7pPr>
+            <a:lvl8pPr marL="3200400" algn="l" defTabSz="457200" rtl="0" eaLnBrk="1" latinLnBrk="0" hangingPunct="1">
+              <a:defRPr sz="1800" kern="1200">
+                <a:solidFill>
+                  <a:schemeClr val="tx1"/>
+                </a:solidFill>
+                <a:latin typeface="+mn-lt"/>
+                <a:ea typeface="+mn-ea"/>
+                <a:cs typeface="+mn-cs"/>
+              </a:defRPr>
+            </a:lvl8pPr>
+            <a:lvl9pPr marL="3657600" algn="l" defTabSz="457200" rtl="0" eaLnBrk="1" latinLnBrk="0" hangingPunct="1">
+              <a:defRPr sz="1800" kern="1200">
+                <a:solidFill>
+                  <a:schemeClr val="tx1"/>
+                </a:solidFill>
+                <a:latin typeface="+mn-lt"/>
+                <a:ea typeface="+mn-ea"/>
+                <a:cs typeface="+mn-cs"/>
+              </a:defRPr>
+            </a:lvl9pPr>
+          </a:lstStyle>
+          <a:p>
+            <a:endParaRPr lang="en-US" b="1" dirty="0">
+              <a:solidFill>
+                <a:srgbClr val="B31166"/>
+              </a:solidFill>
+            </a:endParaRPr>
+          </a:p>
+        </p:txBody>
+      </p:sp>
+      <p:sp>
+        <p:nvSpPr>
+          <p:cNvPr id="2" name="Title 1">
+            <a:extLst>
+              <a:ext uri="{FF2B5EF4-FFF2-40B4-BE49-F238E27FC236}">
+                <a16:creationId xmlns:a16="http://schemas.microsoft.com/office/drawing/2014/main" id="{7E8D2F4C-F241-49CF-9DEE-7DE1F0A8631E}"/>
+              </a:ext>
+            </a:extLst>
+          </p:cNvPr>
+          <p:cNvSpPr>
+            <a:spLocks noGrp="1"/>
+          </p:cNvSpPr>
+          <p:nvPr>
+            <p:ph type="title"/>
+          </p:nvPr>
+        </p:nvSpPr>
+        <p:spPr>
+          <a:xfrm>
+            <a:off x="1154954" y="1085549"/>
+            <a:ext cx="2879999" cy="4686903"/>
+          </a:xfrm>
+        </p:spPr>
+        <p:txBody>
+          <a:bodyPr anchor="ctr">
+            <a:normAutofit/>
+          </a:bodyPr>
+          <a:lstStyle/>
+          <a:p>
+            <a:pPr algn="r"/>
+            <a:r>
+              <a:rPr lang="de-DE" sz="3100">
+                <a:solidFill>
+                  <a:schemeClr val="tx1"/>
+                </a:solidFill>
+              </a:rPr>
+              <a:t>Akzeptanztest</a:t>
+            </a:r>
+          </a:p>
+        </p:txBody>
+      </p:sp>
+      <p:sp>
+        <p:nvSpPr>
+          <p:cNvPr id="3" name="Content Placeholder 2">
+            <a:extLst>
+              <a:ext uri="{FF2B5EF4-FFF2-40B4-BE49-F238E27FC236}">
+                <a16:creationId xmlns:a16="http://schemas.microsoft.com/office/drawing/2014/main" id="{392C927F-CEEC-41F9-8E71-2BD7C50022F2}"/>
+              </a:ext>
+            </a:extLst>
+          </p:cNvPr>
+          <p:cNvSpPr>
+            <a:spLocks noGrp="1"/>
+          </p:cNvSpPr>
+          <p:nvPr>
+            <p:ph idx="1"/>
+          </p:nvPr>
+        </p:nvSpPr>
+        <p:spPr>
+          <a:xfrm>
+            <a:off x="4691238" y="1085549"/>
+            <a:ext cx="5289376" cy="4686903"/>
+          </a:xfrm>
+        </p:spPr>
+        <p:txBody>
+          <a:bodyPr anchor="ctr">
+            <a:normAutofit/>
+          </a:bodyPr>
+          <a:lstStyle/>
+          <a:p>
+            <a:r>
+              <a:rPr lang="de-DE" sz="1600">
+                <a:solidFill>
+                  <a:schemeClr val="tx1"/>
+                </a:solidFill>
+              </a:rPr>
+              <a:t>Beispielhafter Test</a:t>
+            </a:r>
+          </a:p>
+          <a:p>
+            <a:r>
+              <a:rPr lang="de-DE" sz="1600">
+                <a:solidFill>
+                  <a:schemeClr val="tx1"/>
+                </a:solidFill>
+              </a:rPr>
+              <a:t>Black-Box-Tests</a:t>
+            </a:r>
+          </a:p>
+          <a:p>
+            <a:r>
+              <a:rPr lang="de-DE" sz="1600">
+                <a:solidFill>
+                  <a:schemeClr val="tx1"/>
+                </a:solidFill>
+              </a:rPr>
+              <a:t>Testdesign mit Vorbedingungen, Testschritten und erwartetem Resultat</a:t>
+            </a:r>
+          </a:p>
+          <a:p>
+            <a:endParaRPr lang="de-DE" sz="1600">
+              <a:solidFill>
+                <a:schemeClr val="tx1"/>
+              </a:solidFill>
+            </a:endParaRPr>
+          </a:p>
+        </p:txBody>
+      </p:sp>
+    </p:spTree>
+    <p:extLst>
+      <p:ext uri="{BB962C8B-B14F-4D97-AF65-F5344CB8AC3E}">
+        <p14:creationId xmlns:p14="http://schemas.microsoft.com/office/powerpoint/2010/main" val="134540925"/>
+      </p:ext>
+    </p:extLst>
+  </p:cSld>
+  <p:clrMapOvr>
+    <a:overrideClrMapping bg1="dk1" tx1="lt1" bg2="dk2" tx2="lt2" accent1="accent1" accent2="accent2" accent3="accent3" accent4="accent4" accent5="accent5" accent6="accent6" hlink="hlink" folHlink="folHlink"/>
+  </p:clrMapOvr>
+</p:sld>
+</file>
+
+<file path=ppt/slides/slide9.xml><?xml version="1.0" encoding="utf-8"?>
+<p:sld xmlns:a="http://schemas.openxmlformats.org/drawingml/2006/main" xmlns:r="http://schemas.openxmlformats.org/officeDocument/2006/relationships" xmlns:p="http://schemas.openxmlformats.org/presentationml/2006/main">
+  <p:cSld>
+    <p:bg>
+      <p:bgPr>
+        <a:solidFill>
+          <a:schemeClr val="bg1"/>
+        </a:solidFill>
+        <a:effectLst/>
+      </p:bgPr>
+    </p:bg>
+    <p:spTree>
+      <p:nvGrpSpPr>
+        <p:cNvPr id="1" name=""/>
+        <p:cNvGrpSpPr/>
+        <p:nvPr/>
+      </p:nvGrpSpPr>
+      <p:grpSpPr>
+        <a:xfrm>
+          <a:off x="0" y="0"/>
+          <a:ext cx="0" cy="0"/>
+          <a:chOff x="0" y="0"/>
+          <a:chExt cx="0" cy="0"/>
+        </a:xfrm>
+      </p:grpSpPr>
+      <p:grpSp>
+        <p:nvGrpSpPr>
+          <p:cNvPr id="11" name="Group 10">
+            <a:extLst>
+              <a:ext uri="{FF2B5EF4-FFF2-40B4-BE49-F238E27FC236}">
+                <a16:creationId xmlns:a16="http://schemas.microsoft.com/office/drawing/2014/main" id="{15DECA11-8F23-4BFB-819D-1C5A97840DE0}"/>
+              </a:ext>
+            </a:extLst>
+          </p:cNvPr>
+          <p:cNvGrpSpPr>
+            <a:grpSpLocks noGrp="1" noUngrp="1" noRot="1" noChangeAspect="1" noMove="1" noResize="1"/>
+          </p:cNvGrpSpPr>
+          <p:nvPr>
+            <p:extLst>
+              <p:ext uri="{386F3935-93C4-4BCD-93E2-E3B085C9AB24}">
+                <p16:designElem xmlns:p16="http://schemas.microsoft.com/office/powerpoint/2015/main" val="1"/>
+              </p:ext>
+            </p:extLst>
+          </p:nvPr>
+        </p:nvGrpSpPr>
+        <p:grpSpPr>
+          <a:xfrm>
+            <a:off x="0" y="0"/>
+            <a:ext cx="12192000" cy="6858000"/>
+            <a:chOff x="0" y="0"/>
+            <a:chExt cx="12192000" cy="6858000"/>
+          </a:xfrm>
+        </p:grpSpPr>
+        <p:sp>
+          <p:nvSpPr>
+            <p:cNvPr id="12" name="Rectangle 11">
+              <a:extLst>
+                <a:ext uri="{FF2B5EF4-FFF2-40B4-BE49-F238E27FC236}">
+                  <a16:creationId xmlns:a16="http://schemas.microsoft.com/office/drawing/2014/main" id="{24DBF623-F256-43E8-93AC-B5467A91FD2D}"/>
                 </a:ext>
               </a:extLst>
             </p:cNvPr>
@@ -22603,7 +24027,7 @@
               <a:avLst/>
             </a:prstGeom>
             <a:blipFill>
-              <a:blip r:embed="rId2">
+              <a:blip r:embed="rId3">
                 <a:duotone>
                   <a:schemeClr val="dk2">
                     <a:shade val="69000"/>
@@ -22643,12 +24067,12 @@
             </a:fontRef>
           </p:style>
         </p:sp>
-        <p:sp>
+        <p:sp useBgFill="1">
           <p:nvSpPr>
-            <p:cNvPr id="10" name="Freeform 5">
+            <p:cNvPr id="13" name="Freeform 5">
               <a:extLst>
                 <a:ext uri="{FF2B5EF4-FFF2-40B4-BE49-F238E27FC236}">
-                  <a16:creationId xmlns:a16="http://schemas.microsoft.com/office/drawing/2014/main" id="{166CB913-1233-494F-B1BC-03CED0745E03}"/>
+                  <a16:creationId xmlns:a16="http://schemas.microsoft.com/office/drawing/2014/main" id="{B6AB7373-B022-4BA1-B8E7-D2C342475F59}"/>
                 </a:ext>
               </a:extLst>
             </p:cNvPr>
@@ -22711,9 +24135,6 @@
                 </a:path>
               </a:pathLst>
             </a:custGeom>
-            <a:solidFill>
-              <a:schemeClr val="bg1"/>
-            </a:solidFill>
             <a:ln>
               <a:noFill/>
             </a:ln>
@@ -22722,10 +24143,10 @@
       </p:grpSp>
       <p:sp>
         <p:nvSpPr>
-          <p:cNvPr id="12" name="Rectangle 11">
+          <p:cNvPr id="15" name="Freeform: Shape 14">
             <a:extLst>
               <a:ext uri="{FF2B5EF4-FFF2-40B4-BE49-F238E27FC236}">
-                <a16:creationId xmlns:a16="http://schemas.microsoft.com/office/drawing/2014/main" id="{899D8977-5473-482F-BDA7-24D7C5042ECA}"/>
+                <a16:creationId xmlns:a16="http://schemas.microsoft.com/office/drawing/2014/main" id="{E0BFF7C8-A0F2-492C-AD80-E74CED0D1B82}"/>
               </a:ext>
             </a:extLst>
           </p:cNvPr>
@@ -22740,512 +24161,334 @@
             </p:extLst>
           </p:nvPr>
         </p:nvSpPr>
-        <p:spPr>
-          <a:xfrm>
-            <a:off x="10437812" y="0"/>
-            <a:ext cx="685800" cy="1143000"/>
+        <p:spPr bwMode="gray">
+          <a:xfrm rot="15838669">
+            <a:off x="2884218" y="1683278"/>
+            <a:ext cx="2934265" cy="437897"/>
           </a:xfrm>
-          <a:prstGeom prst="rect">
+          <a:custGeom>
             <a:avLst/>
-          </a:prstGeom>
+            <a:gdLst>
+              <a:gd name="connsiteX0" fmla="*/ 2934265 w 2934265"/>
+              <a:gd name="connsiteY0" fmla="*/ 0 h 437897"/>
+              <a:gd name="connsiteX1" fmla="*/ 2888069 w 2934265"/>
+              <a:gd name="connsiteY1" fmla="*/ 437897 h 437897"/>
+              <a:gd name="connsiteX2" fmla="*/ 2791337 w 2934265"/>
+              <a:gd name="connsiteY2" fmla="*/ 437084 h 437897"/>
+              <a:gd name="connsiteX3" fmla="*/ 25070 w 2934265"/>
+              <a:gd name="connsiteY3" fmla="*/ 208388 h 437897"/>
+              <a:gd name="connsiteX4" fmla="*/ 0 w 2934265"/>
+              <a:gd name="connsiteY4" fmla="*/ 141220 h 437897"/>
+              <a:gd name="connsiteX5" fmla="*/ 157202 w 2934265"/>
+              <a:gd name="connsiteY5" fmla="*/ 150137 h 437897"/>
+              <a:gd name="connsiteX6" fmla="*/ 237720 w 2934265"/>
+              <a:gd name="connsiteY6" fmla="*/ 153470 h 437897"/>
+              <a:gd name="connsiteX7" fmla="*/ 320008 w 2934265"/>
+              <a:gd name="connsiteY7" fmla="*/ 156970 h 437897"/>
+              <a:gd name="connsiteX8" fmla="*/ 403475 w 2934265"/>
+              <a:gd name="connsiteY8" fmla="*/ 160304 h 437897"/>
+              <a:gd name="connsiteX9" fmla="*/ 487532 w 2934265"/>
+              <a:gd name="connsiteY9" fmla="*/ 162387 h 437897"/>
+              <a:gd name="connsiteX10" fmla="*/ 573065 w 2934265"/>
+              <a:gd name="connsiteY10" fmla="*/ 164387 h 437897"/>
+              <a:gd name="connsiteX11" fmla="*/ 660071 w 2934265"/>
+              <a:gd name="connsiteY11" fmla="*/ 166470 h 437897"/>
+              <a:gd name="connsiteX12" fmla="*/ 748258 w 2934265"/>
+              <a:gd name="connsiteY12" fmla="*/ 167887 h 437897"/>
+              <a:gd name="connsiteX13" fmla="*/ 837329 w 2934265"/>
+              <a:gd name="connsiteY13" fmla="*/ 167887 h 437897"/>
+              <a:gd name="connsiteX14" fmla="*/ 927580 w 2934265"/>
+              <a:gd name="connsiteY14" fmla="*/ 168470 h 437897"/>
+              <a:gd name="connsiteX15" fmla="*/ 1018716 w 2934265"/>
+              <a:gd name="connsiteY15" fmla="*/ 167887 h 437897"/>
+              <a:gd name="connsiteX16" fmla="*/ 1110736 w 2934265"/>
+              <a:gd name="connsiteY16" fmla="*/ 166470 h 437897"/>
+              <a:gd name="connsiteX17" fmla="*/ 1203052 w 2934265"/>
+              <a:gd name="connsiteY17" fmla="*/ 165137 h 437897"/>
+              <a:gd name="connsiteX18" fmla="*/ 1296547 w 2934265"/>
+              <a:gd name="connsiteY18" fmla="*/ 162387 h 437897"/>
+              <a:gd name="connsiteX19" fmla="*/ 1391222 w 2934265"/>
+              <a:gd name="connsiteY19" fmla="*/ 159720 h 437897"/>
+              <a:gd name="connsiteX20" fmla="*/ 1485308 w 2934265"/>
+              <a:gd name="connsiteY20" fmla="*/ 156220 h 437897"/>
+              <a:gd name="connsiteX21" fmla="*/ 1580573 w 2934265"/>
+              <a:gd name="connsiteY21" fmla="*/ 151553 h 437897"/>
+              <a:gd name="connsiteX22" fmla="*/ 1677017 w 2934265"/>
+              <a:gd name="connsiteY22" fmla="*/ 146053 h 437897"/>
+              <a:gd name="connsiteX23" fmla="*/ 1773462 w 2934265"/>
+              <a:gd name="connsiteY23" fmla="*/ 140636 h 437897"/>
+              <a:gd name="connsiteX24" fmla="*/ 1869907 w 2934265"/>
+              <a:gd name="connsiteY24" fmla="*/ 133720 h 437897"/>
+              <a:gd name="connsiteX25" fmla="*/ 1968121 w 2934265"/>
+              <a:gd name="connsiteY25" fmla="*/ 125553 h 437897"/>
+              <a:gd name="connsiteX26" fmla="*/ 2064566 w 2934265"/>
+              <a:gd name="connsiteY26" fmla="*/ 117386 h 437897"/>
+              <a:gd name="connsiteX27" fmla="*/ 2162780 w 2934265"/>
+              <a:gd name="connsiteY27" fmla="*/ 107802 h 437897"/>
+              <a:gd name="connsiteX28" fmla="*/ 2261880 w 2934265"/>
+              <a:gd name="connsiteY28" fmla="*/ 97552 h 437897"/>
+              <a:gd name="connsiteX29" fmla="*/ 2359209 w 2934265"/>
+              <a:gd name="connsiteY29" fmla="*/ 86635 h 437897"/>
+              <a:gd name="connsiteX30" fmla="*/ 2457718 w 2934265"/>
+              <a:gd name="connsiteY30" fmla="*/ 73802 h 437897"/>
+              <a:gd name="connsiteX31" fmla="*/ 2556228 w 2934265"/>
+              <a:gd name="connsiteY31" fmla="*/ 60135 h 437897"/>
+              <a:gd name="connsiteX32" fmla="*/ 2654737 w 2934265"/>
+              <a:gd name="connsiteY32" fmla="*/ 46552 h 437897"/>
+              <a:gd name="connsiteX33" fmla="*/ 2752951 w 2934265"/>
+              <a:gd name="connsiteY33" fmla="*/ 30718 h 437897"/>
+              <a:gd name="connsiteX34" fmla="*/ 2851166 w 2934265"/>
+              <a:gd name="connsiteY34" fmla="*/ 14384 h 437897"/>
+            </a:gdLst>
+            <a:ahLst/>
+            <a:cxnLst>
+              <a:cxn ang="0">
+                <a:pos x="connsiteX0" y="connsiteY0"/>
+              </a:cxn>
+              <a:cxn ang="0">
+                <a:pos x="connsiteX1" y="connsiteY1"/>
+              </a:cxn>
+              <a:cxn ang="0">
+                <a:pos x="connsiteX2" y="connsiteY2"/>
+              </a:cxn>
+              <a:cxn ang="0">
+                <a:pos x="connsiteX3" y="connsiteY3"/>
+              </a:cxn>
+              <a:cxn ang="0">
+                <a:pos x="connsiteX4" y="connsiteY4"/>
+              </a:cxn>
+              <a:cxn ang="0">
+                <a:pos x="connsiteX5" y="connsiteY5"/>
+              </a:cxn>
+              <a:cxn ang="0">
+                <a:pos x="connsiteX6" y="connsiteY6"/>
+              </a:cxn>
+              <a:cxn ang="0">
+                <a:pos x="connsiteX7" y="connsiteY7"/>
+              </a:cxn>
+              <a:cxn ang="0">
+                <a:pos x="connsiteX8" y="connsiteY8"/>
+              </a:cxn>
+              <a:cxn ang="0">
+                <a:pos x="connsiteX9" y="connsiteY9"/>
+              </a:cxn>
+              <a:cxn ang="0">
+                <a:pos x="connsiteX10" y="connsiteY10"/>
+              </a:cxn>
+              <a:cxn ang="0">
+                <a:pos x="connsiteX11" y="connsiteY11"/>
+              </a:cxn>
+              <a:cxn ang="0">
+                <a:pos x="connsiteX12" y="connsiteY12"/>
+              </a:cxn>
+              <a:cxn ang="0">
+                <a:pos x="connsiteX13" y="connsiteY13"/>
+              </a:cxn>
+              <a:cxn ang="0">
+                <a:pos x="connsiteX14" y="connsiteY14"/>
+              </a:cxn>
+              <a:cxn ang="0">
+                <a:pos x="connsiteX15" y="connsiteY15"/>
+              </a:cxn>
+              <a:cxn ang="0">
+                <a:pos x="connsiteX16" y="connsiteY16"/>
+              </a:cxn>
+              <a:cxn ang="0">
+                <a:pos x="connsiteX17" y="connsiteY17"/>
+              </a:cxn>
+              <a:cxn ang="0">
+                <a:pos x="connsiteX18" y="connsiteY18"/>
+              </a:cxn>
+              <a:cxn ang="0">
+                <a:pos x="connsiteX19" y="connsiteY19"/>
+              </a:cxn>
+              <a:cxn ang="0">
+                <a:pos x="connsiteX20" y="connsiteY20"/>
+              </a:cxn>
+              <a:cxn ang="0">
+                <a:pos x="connsiteX21" y="connsiteY21"/>
+              </a:cxn>
+              <a:cxn ang="0">
+                <a:pos x="connsiteX22" y="connsiteY22"/>
+              </a:cxn>
+              <a:cxn ang="0">
+                <a:pos x="connsiteX23" y="connsiteY23"/>
+              </a:cxn>
+              <a:cxn ang="0">
+                <a:pos x="connsiteX24" y="connsiteY24"/>
+              </a:cxn>
+              <a:cxn ang="0">
+                <a:pos x="connsiteX25" y="connsiteY25"/>
+              </a:cxn>
+              <a:cxn ang="0">
+                <a:pos x="connsiteX26" y="connsiteY26"/>
+              </a:cxn>
+              <a:cxn ang="0">
+                <a:pos x="connsiteX27" y="connsiteY27"/>
+              </a:cxn>
+              <a:cxn ang="0">
+                <a:pos x="connsiteX28" y="connsiteY28"/>
+              </a:cxn>
+              <a:cxn ang="0">
+                <a:pos x="connsiteX29" y="connsiteY29"/>
+              </a:cxn>
+              <a:cxn ang="0">
+                <a:pos x="connsiteX30" y="connsiteY30"/>
+              </a:cxn>
+              <a:cxn ang="0">
+                <a:pos x="connsiteX31" y="connsiteY31"/>
+              </a:cxn>
+              <a:cxn ang="0">
+                <a:pos x="connsiteX32" y="connsiteY32"/>
+              </a:cxn>
+              <a:cxn ang="0">
+                <a:pos x="connsiteX33" y="connsiteY33"/>
+              </a:cxn>
+              <a:cxn ang="0">
+                <a:pos x="connsiteX34" y="connsiteY34"/>
+              </a:cxn>
+            </a:cxnLst>
+            <a:rect l="l" t="t" r="r" b="b"/>
+            <a:pathLst>
+              <a:path w="2934265" h="437897">
+                <a:moveTo>
+                  <a:pt x="2934265" y="0"/>
+                </a:moveTo>
+                <a:lnTo>
+                  <a:pt x="2888069" y="437897"/>
+                </a:lnTo>
+                <a:lnTo>
+                  <a:pt x="2791337" y="437084"/>
+                </a:lnTo>
+                <a:cubicBezTo>
+                  <a:pt x="2010492" y="424446"/>
+                  <a:pt x="481578" y="316124"/>
+                  <a:pt x="25070" y="208388"/>
+                </a:cubicBezTo>
+                <a:cubicBezTo>
+                  <a:pt x="16811" y="185970"/>
+                  <a:pt x="8258" y="163637"/>
+                  <a:pt x="0" y="141220"/>
+                </a:cubicBezTo>
+                <a:lnTo>
+                  <a:pt x="157202" y="150137"/>
+                </a:lnTo>
+                <a:lnTo>
+                  <a:pt x="237720" y="153470"/>
+                </a:lnTo>
+                <a:lnTo>
+                  <a:pt x="320008" y="156970"/>
+                </a:lnTo>
+                <a:lnTo>
+                  <a:pt x="403475" y="160304"/>
+                </a:lnTo>
+                <a:lnTo>
+                  <a:pt x="487532" y="162387"/>
+                </a:lnTo>
+                <a:lnTo>
+                  <a:pt x="573065" y="164387"/>
+                </a:lnTo>
+                <a:lnTo>
+                  <a:pt x="660071" y="166470"/>
+                </a:lnTo>
+                <a:lnTo>
+                  <a:pt x="748258" y="167887"/>
+                </a:lnTo>
+                <a:lnTo>
+                  <a:pt x="837329" y="167887"/>
+                </a:lnTo>
+                <a:lnTo>
+                  <a:pt x="927580" y="168470"/>
+                </a:lnTo>
+                <a:lnTo>
+                  <a:pt x="1018716" y="167887"/>
+                </a:lnTo>
+                <a:lnTo>
+                  <a:pt x="1110736" y="166470"/>
+                </a:lnTo>
+                <a:lnTo>
+                  <a:pt x="1203052" y="165137"/>
+                </a:lnTo>
+                <a:lnTo>
+                  <a:pt x="1296547" y="162387"/>
+                </a:lnTo>
+                <a:lnTo>
+                  <a:pt x="1391222" y="159720"/>
+                </a:lnTo>
+                <a:lnTo>
+                  <a:pt x="1485308" y="156220"/>
+                </a:lnTo>
+                <a:lnTo>
+                  <a:pt x="1580573" y="151553"/>
+                </a:lnTo>
+                <a:lnTo>
+                  <a:pt x="1677017" y="146053"/>
+                </a:lnTo>
+                <a:lnTo>
+                  <a:pt x="1773462" y="140636"/>
+                </a:lnTo>
+                <a:lnTo>
+                  <a:pt x="1869907" y="133720"/>
+                </a:lnTo>
+                <a:lnTo>
+                  <a:pt x="1968121" y="125553"/>
+                </a:lnTo>
+                <a:lnTo>
+                  <a:pt x="2064566" y="117386"/>
+                </a:lnTo>
+                <a:lnTo>
+                  <a:pt x="2162780" y="107802"/>
+                </a:lnTo>
+                <a:lnTo>
+                  <a:pt x="2261880" y="97552"/>
+                </a:lnTo>
+                <a:lnTo>
+                  <a:pt x="2359209" y="86635"/>
+                </a:lnTo>
+                <a:lnTo>
+                  <a:pt x="2457718" y="73802"/>
+                </a:lnTo>
+                <a:lnTo>
+                  <a:pt x="2556228" y="60135"/>
+                </a:lnTo>
+                <a:lnTo>
+                  <a:pt x="2654737" y="46552"/>
+                </a:lnTo>
+                <a:lnTo>
+                  <a:pt x="2752951" y="30718"/>
+                </a:lnTo>
+                <a:lnTo>
+                  <a:pt x="2851166" y="14384"/>
+                </a:lnTo>
+                <a:close/>
+              </a:path>
+            </a:pathLst>
+          </a:custGeom>
           <a:solidFill>
-            <a:schemeClr val="accent1"/>
+            <a:schemeClr val="bg1">
+              <a:alpha val="20000"/>
+            </a:schemeClr>
           </a:solidFill>
           <a:ln>
             <a:noFill/>
           </a:ln>
         </p:spPr>
-        <p:style>
-          <a:lnRef idx="1">
-            <a:schemeClr val="accent1"/>
-          </a:lnRef>
-          <a:fillRef idx="3">
-            <a:schemeClr val="accent1"/>
-          </a:fillRef>
-          <a:effectRef idx="2">
-            <a:schemeClr val="accent1"/>
-          </a:effectRef>
-          <a:fontRef idx="minor">
-            <a:schemeClr val="lt1"/>
-          </a:fontRef>
-        </p:style>
+        <p:txBody>
+          <a:bodyPr wrap="square">
+            <a:noAutofit/>
+          </a:bodyPr>
+          <a:lstStyle/>
+          <a:p>
+            <a:endParaRPr lang="en-US" dirty="0"/>
+          </a:p>
+        </p:txBody>
       </p:sp>
-      <p:grpSp>
-        <p:nvGrpSpPr>
-          <p:cNvPr id="14" name="Group 13">
+      <p:sp useBgFill="1">
+        <p:nvSpPr>
+          <p:cNvPr id="17" name="Freeform: Shape 16">
             <a:extLst>
               <a:ext uri="{FF2B5EF4-FFF2-40B4-BE49-F238E27FC236}">
-                <a16:creationId xmlns:a16="http://schemas.microsoft.com/office/drawing/2014/main" id="{F1ECA4FE-7D2F-4576-B767-3A5F5ABFE90F}"/>
-              </a:ext>
-            </a:extLst>
-          </p:cNvPr>
-          <p:cNvGrpSpPr>
-            <a:grpSpLocks noGrp="1" noUngrp="1" noRot="1" noChangeAspect="1" noMove="1" noResize="1"/>
-          </p:cNvGrpSpPr>
-          <p:nvPr>
-            <p:extLst>
-              <p:ext uri="{386F3935-93C4-4BCD-93E2-E3B085C9AB24}">
-                <p16:designElem xmlns:p16="http://schemas.microsoft.com/office/powerpoint/2015/main" val="1"/>
-              </p:ext>
-            </p:extLst>
-          </p:nvPr>
-        </p:nvGrpSpPr>
-        <p:grpSpPr>
-          <a:xfrm>
-            <a:off x="0" y="0"/>
-            <a:ext cx="12192000" cy="6858000"/>
-            <a:chOff x="0" y="0"/>
-            <a:chExt cx="12192000" cy="6858000"/>
-          </a:xfrm>
-        </p:grpSpPr>
-        <p:sp useBgFill="1">
-          <p:nvSpPr>
-            <p:cNvPr id="15" name="Rectangle 14">
-              <a:extLst>
-                <a:ext uri="{FF2B5EF4-FFF2-40B4-BE49-F238E27FC236}">
-                  <a16:creationId xmlns:a16="http://schemas.microsoft.com/office/drawing/2014/main" id="{5969441E-5462-4859-86CD-1737FDE36046}"/>
-                </a:ext>
-              </a:extLst>
-            </p:cNvPr>
-            <p:cNvSpPr/>
-            <p:nvPr>
-              <p:extLst>
-                <p:ext uri="{386F3935-93C4-4BCD-93E2-E3B085C9AB24}">
-                  <p16:designElem xmlns:p16="http://schemas.microsoft.com/office/powerpoint/2015/main" val="1"/>
-                </p:ext>
-              </p:extLst>
-            </p:nvPr>
-          </p:nvSpPr>
-          <p:spPr>
-            <a:xfrm>
-              <a:off x="0" y="0"/>
-              <a:ext cx="12192000" cy="6858000"/>
-            </a:xfrm>
-            <a:prstGeom prst="rect">
-              <a:avLst/>
-            </a:prstGeom>
-            <a:ln>
-              <a:noFill/>
-            </a:ln>
-          </p:spPr>
-          <p:style>
-            <a:lnRef idx="2">
-              <a:schemeClr val="accent1">
-                <a:shade val="50000"/>
-              </a:schemeClr>
-            </a:lnRef>
-            <a:fillRef idx="1">
-              <a:schemeClr val="accent1"/>
-            </a:fillRef>
-            <a:effectRef idx="0">
-              <a:schemeClr val="accent1"/>
-            </a:effectRef>
-            <a:fontRef idx="minor">
-              <a:schemeClr val="lt1"/>
-            </a:fontRef>
-          </p:style>
-        </p:sp>
-        <p:sp>
-          <p:nvSpPr>
-            <p:cNvPr id="16" name="Freeform 5">
-              <a:extLst>
-                <a:ext uri="{FF2B5EF4-FFF2-40B4-BE49-F238E27FC236}">
-                  <a16:creationId xmlns:a16="http://schemas.microsoft.com/office/drawing/2014/main" id="{596BD4B5-6833-40CC-96FE-EDC675634264}"/>
-                </a:ext>
-              </a:extLst>
-            </p:cNvPr>
-            <p:cNvSpPr>
-              <a:spLocks noEditPoints="1"/>
-            </p:cNvSpPr>
-            <p:nvPr>
-              <p:extLst>
-                <p:ext uri="{386F3935-93C4-4BCD-93E2-E3B085C9AB24}">
-                  <p16:designElem xmlns:p16="http://schemas.microsoft.com/office/powerpoint/2015/main" val="1"/>
-                </p:ext>
-              </p:extLst>
-            </p:nvPr>
-          </p:nvSpPr>
-          <p:spPr bwMode="gray">
-            <a:xfrm>
-              <a:off x="0" y="1587"/>
-              <a:ext cx="12192000" cy="6856413"/>
-            </a:xfrm>
-            <a:custGeom>
-              <a:avLst/>
-              <a:gdLst/>
-              <a:ahLst/>
-              <a:cxnLst/>
-              <a:rect l="0" t="0" r="r" b="b"/>
-              <a:pathLst>
-                <a:path w="15356" h="8638">
-                  <a:moveTo>
-                    <a:pt x="0" y="0"/>
-                  </a:moveTo>
-                  <a:lnTo>
-                    <a:pt x="0" y="8638"/>
-                  </a:lnTo>
-                  <a:lnTo>
-                    <a:pt x="15356" y="8638"/>
-                  </a:lnTo>
-                  <a:lnTo>
-                    <a:pt x="15356" y="0"/>
-                  </a:lnTo>
-                  <a:lnTo>
-                    <a:pt x="0" y="0"/>
-                  </a:lnTo>
-                  <a:close/>
-                  <a:moveTo>
-                    <a:pt x="14748" y="8038"/>
-                  </a:moveTo>
-                  <a:lnTo>
-                    <a:pt x="600" y="8038"/>
-                  </a:lnTo>
-                  <a:lnTo>
-                    <a:pt x="600" y="592"/>
-                  </a:lnTo>
-                  <a:lnTo>
-                    <a:pt x="14748" y="592"/>
-                  </a:lnTo>
-                  <a:lnTo>
-                    <a:pt x="14748" y="8038"/>
-                  </a:lnTo>
-                  <a:close/>
-                </a:path>
-              </a:pathLst>
-            </a:custGeom>
-            <a:solidFill>
-              <a:srgbClr val="FFFFFF"/>
-            </a:solidFill>
-            <a:ln>
-              <a:noFill/>
-            </a:ln>
-          </p:spPr>
-        </p:sp>
-      </p:grpSp>
-      <p:cxnSp>
-        <p:nvCxnSpPr>
-          <p:cNvPr id="18" name="Straight Connector 17">
-            <a:extLst>
-              <a:ext uri="{FF2B5EF4-FFF2-40B4-BE49-F238E27FC236}">
-                <a16:creationId xmlns:a16="http://schemas.microsoft.com/office/drawing/2014/main" id="{E81F53E2-F556-42FA-8D24-113839EE19F8}"/>
-              </a:ext>
-            </a:extLst>
-          </p:cNvPr>
-          <p:cNvCxnSpPr>
-            <a:cxnSpLocks noGrp="1" noRot="1" noChangeAspect="1" noMove="1" noResize="1" noEditPoints="1" noAdjustHandles="1" noChangeArrowheads="1" noChangeShapeType="1"/>
-          </p:cNvCxnSpPr>
-          <p:nvPr>
-            <p:extLst>
-              <p:ext uri="{386F3935-93C4-4BCD-93E2-E3B085C9AB24}">
-                <p16:designElem xmlns:p16="http://schemas.microsoft.com/office/powerpoint/2015/main" val="1"/>
-              </p:ext>
-            </p:extLst>
-          </p:nvPr>
-        </p:nvCxnSpPr>
-        <p:spPr>
-          <a:xfrm>
-            <a:off x="5758249" y="4166888"/>
-            <a:ext cx="675502" cy="0"/>
-          </a:xfrm>
-          <a:prstGeom prst="line">
-            <a:avLst/>
-          </a:prstGeom>
-          <a:ln w="12700">
-            <a:solidFill>
-              <a:schemeClr val="accent1">
-                <a:lumMod val="60000"/>
-                <a:lumOff val="40000"/>
-              </a:schemeClr>
-            </a:solidFill>
-          </a:ln>
-        </p:spPr>
-        <p:style>
-          <a:lnRef idx="1">
-            <a:schemeClr val="accent1"/>
-          </a:lnRef>
-          <a:fillRef idx="0">
-            <a:schemeClr val="accent1"/>
-          </a:fillRef>
-          <a:effectRef idx="0">
-            <a:schemeClr val="accent1"/>
-          </a:effectRef>
-          <a:fontRef idx="minor">
-            <a:schemeClr val="tx1"/>
-          </a:fontRef>
-        </p:style>
-      </p:cxnSp>
-      <p:sp>
-        <p:nvSpPr>
-          <p:cNvPr id="2" name="Title 1">
-            <a:extLst>
-              <a:ext uri="{FF2B5EF4-FFF2-40B4-BE49-F238E27FC236}">
-                <a16:creationId xmlns:a16="http://schemas.microsoft.com/office/drawing/2014/main" id="{AE4FF69D-1F98-458B-B382-77E14563A182}"/>
-              </a:ext>
-            </a:extLst>
-          </p:cNvPr>
-          <p:cNvSpPr>
-            <a:spLocks noGrp="1"/>
-          </p:cNvSpPr>
-          <p:nvPr>
-            <p:ph type="title"/>
-          </p:nvPr>
-        </p:nvSpPr>
-        <p:spPr>
-          <a:xfrm>
-            <a:off x="1683171" y="1169773"/>
-            <a:ext cx="8825658" cy="2870161"/>
-          </a:xfrm>
-        </p:spPr>
-        <p:txBody>
-          <a:bodyPr vert="horz" lIns="91440" tIns="45720" rIns="91440" bIns="45720" rtlCol="0" anchor="b">
-            <a:normAutofit/>
-          </a:bodyPr>
-          <a:lstStyle/>
-          <a:p>
-            <a:pPr algn="ctr"/>
-            <a:r>
-              <a:rPr lang="en-US" sz="5400">
-                <a:solidFill>
-                  <a:schemeClr val="tx1"/>
-                </a:solidFill>
-              </a:rPr>
-              <a:t>Funktionaler Test</a:t>
-            </a:r>
-          </a:p>
-        </p:txBody>
-      </p:sp>
-    </p:spTree>
-    <p:extLst>
-      <p:ext uri="{BB962C8B-B14F-4D97-AF65-F5344CB8AC3E}">
-        <p14:creationId xmlns:p14="http://schemas.microsoft.com/office/powerpoint/2010/main" val="1446471651"/>
-      </p:ext>
-    </p:extLst>
-  </p:cSld>
-  <p:clrMapOvr>
-    <a:overrideClrMapping bg1="dk1" tx1="lt1" bg2="dk2" tx2="lt2" accent1="accent1" accent2="accent2" accent3="accent3" accent4="accent4" accent5="accent5" accent6="accent6" hlink="hlink" folHlink="folHlink"/>
-  </p:clrMapOvr>
-</p:sld>
-</file>
-
-<file path=ppt/slides/slide9.xml><?xml version="1.0" encoding="utf-8"?>
-<p:sld xmlns:a="http://schemas.openxmlformats.org/drawingml/2006/main" xmlns:r="http://schemas.openxmlformats.org/officeDocument/2006/relationships" xmlns:p="http://schemas.openxmlformats.org/presentationml/2006/main">
-  <p:cSld>
-    <p:bg>
-      <p:bgPr>
-        <a:blipFill rotWithShape="1">
-          <a:blip r:embed="rId2">
-            <a:duotone>
-              <a:schemeClr val="bg2">
-                <a:shade val="69000"/>
-                <a:hueMod val="91000"/>
-                <a:satMod val="164000"/>
-                <a:lumMod val="74000"/>
-              </a:schemeClr>
-              <a:schemeClr val="bg2">
-                <a:hueMod val="124000"/>
-                <a:satMod val="140000"/>
-                <a:lumMod val="142000"/>
-              </a:schemeClr>
-            </a:duotone>
-            <a:extLst/>
-          </a:blip>
-          <a:stretch/>
-        </a:blipFill>
-        <a:effectLst/>
-      </p:bgPr>
-    </p:bg>
-    <p:spTree>
-      <p:nvGrpSpPr>
-        <p:cNvPr id="1" name=""/>
-        <p:cNvGrpSpPr/>
-        <p:nvPr/>
-      </p:nvGrpSpPr>
-      <p:grpSpPr>
-        <a:xfrm>
-          <a:off x="0" y="0"/>
-          <a:ext cx="0" cy="0"/>
-          <a:chOff x="0" y="0"/>
-          <a:chExt cx="0" cy="0"/>
-        </a:xfrm>
-      </p:grpSpPr>
-      <p:grpSp>
-        <p:nvGrpSpPr>
-          <p:cNvPr id="8" name="Group 7">
-            <a:extLst>
-              <a:ext uri="{FF2B5EF4-FFF2-40B4-BE49-F238E27FC236}">
-                <a16:creationId xmlns:a16="http://schemas.microsoft.com/office/drawing/2014/main" id="{2EAA809E-9ED4-467B-9FEA-8650166F131E}"/>
-              </a:ext>
-            </a:extLst>
-          </p:cNvPr>
-          <p:cNvGrpSpPr>
-            <a:grpSpLocks noGrp="1" noUngrp="1" noRot="1" noChangeAspect="1" noMove="1" noResize="1"/>
-          </p:cNvGrpSpPr>
-          <p:nvPr>
-            <p:extLst>
-              <p:ext uri="{386F3935-93C4-4BCD-93E2-E3B085C9AB24}">
-                <p16:designElem xmlns:p16="http://schemas.microsoft.com/office/powerpoint/2015/main" val="1"/>
-              </p:ext>
-            </p:extLst>
-          </p:nvPr>
-        </p:nvGrpSpPr>
-        <p:grpSpPr>
-          <a:xfrm>
-            <a:off x="0" y="0"/>
-            <a:ext cx="12192000" cy="6858000"/>
-            <a:chOff x="0" y="0"/>
-            <a:chExt cx="12192000" cy="6858000"/>
-          </a:xfrm>
-        </p:grpSpPr>
-        <p:sp>
-          <p:nvSpPr>
-            <p:cNvPr id="9" name="Rectangle 8">
-              <a:extLst>
-                <a:ext uri="{FF2B5EF4-FFF2-40B4-BE49-F238E27FC236}">
-                  <a16:creationId xmlns:a16="http://schemas.microsoft.com/office/drawing/2014/main" id="{AB1B2C71-9154-4F87-876B-2C5247282E7C}"/>
-                </a:ext>
-              </a:extLst>
-            </p:cNvPr>
-            <p:cNvSpPr/>
-            <p:nvPr>
-              <p:extLst>
-                <p:ext uri="{386F3935-93C4-4BCD-93E2-E3B085C9AB24}">
-                  <p16:designElem xmlns:p16="http://schemas.microsoft.com/office/powerpoint/2015/main" val="1"/>
-                </p:ext>
-              </p:extLst>
-            </p:nvPr>
-          </p:nvSpPr>
-          <p:spPr>
-            <a:xfrm>
-              <a:off x="0" y="0"/>
-              <a:ext cx="12192000" cy="6858000"/>
-            </a:xfrm>
-            <a:prstGeom prst="rect">
-              <a:avLst/>
-            </a:prstGeom>
-            <a:blipFill>
-              <a:blip r:embed="rId2">
-                <a:duotone>
-                  <a:schemeClr val="dk2">
-                    <a:shade val="69000"/>
-                    <a:hueMod val="91000"/>
-                    <a:satMod val="164000"/>
-                    <a:lumMod val="74000"/>
-                  </a:schemeClr>
-                  <a:schemeClr val="dk2">
-                    <a:hueMod val="124000"/>
-                    <a:satMod val="140000"/>
-                    <a:lumMod val="142000"/>
-                  </a:schemeClr>
-                </a:duotone>
-              </a:blip>
-              <a:stretch>
-                <a:fillRect/>
-              </a:stretch>
-            </a:blipFill>
-            <a:ln>
-              <a:noFill/>
-            </a:ln>
-          </p:spPr>
-          <p:style>
-            <a:lnRef idx="2">
-              <a:schemeClr val="accent1">
-                <a:shade val="50000"/>
-              </a:schemeClr>
-            </a:lnRef>
-            <a:fillRef idx="1">
-              <a:schemeClr val="accent1"/>
-            </a:fillRef>
-            <a:effectRef idx="0">
-              <a:schemeClr val="accent1"/>
-            </a:effectRef>
-            <a:fontRef idx="minor">
-              <a:schemeClr val="lt1"/>
-            </a:fontRef>
-          </p:style>
-        </p:sp>
-        <p:sp>
-          <p:nvSpPr>
-            <p:cNvPr id="10" name="Freeform 5">
-              <a:extLst>
-                <a:ext uri="{FF2B5EF4-FFF2-40B4-BE49-F238E27FC236}">
-                  <a16:creationId xmlns:a16="http://schemas.microsoft.com/office/drawing/2014/main" id="{166CB913-1233-494F-B1BC-03CED0745E03}"/>
-                </a:ext>
-              </a:extLst>
-            </p:cNvPr>
-            <p:cNvSpPr>
-              <a:spLocks noEditPoints="1"/>
-            </p:cNvSpPr>
-            <p:nvPr>
-              <p:extLst>
-                <p:ext uri="{386F3935-93C4-4BCD-93E2-E3B085C9AB24}">
-                  <p16:designElem xmlns:p16="http://schemas.microsoft.com/office/powerpoint/2015/main" val="1"/>
-                </p:ext>
-              </p:extLst>
-            </p:nvPr>
-          </p:nvSpPr>
-          <p:spPr bwMode="gray">
-            <a:xfrm>
-              <a:off x="0" y="1587"/>
-              <a:ext cx="12192000" cy="6856413"/>
-            </a:xfrm>
-            <a:custGeom>
-              <a:avLst/>
-              <a:gdLst/>
-              <a:ahLst/>
-              <a:cxnLst/>
-              <a:rect l="0" t="0" r="r" b="b"/>
-              <a:pathLst>
-                <a:path w="15356" h="8638">
-                  <a:moveTo>
-                    <a:pt x="0" y="0"/>
-                  </a:moveTo>
-                  <a:lnTo>
-                    <a:pt x="0" y="8638"/>
-                  </a:lnTo>
-                  <a:lnTo>
-                    <a:pt x="15356" y="8638"/>
-                  </a:lnTo>
-                  <a:lnTo>
-                    <a:pt x="15356" y="0"/>
-                  </a:lnTo>
-                  <a:lnTo>
-                    <a:pt x="0" y="0"/>
-                  </a:lnTo>
-                  <a:close/>
-                  <a:moveTo>
-                    <a:pt x="14748" y="8038"/>
-                  </a:moveTo>
-                  <a:lnTo>
-                    <a:pt x="600" y="8038"/>
-                  </a:lnTo>
-                  <a:lnTo>
-                    <a:pt x="600" y="592"/>
-                  </a:lnTo>
-                  <a:lnTo>
-                    <a:pt x="14748" y="592"/>
-                  </a:lnTo>
-                  <a:lnTo>
-                    <a:pt x="14748" y="8038"/>
-                  </a:lnTo>
-                  <a:close/>
-                </a:path>
-              </a:pathLst>
-            </a:custGeom>
-            <a:solidFill>
-              <a:schemeClr val="bg1"/>
-            </a:solidFill>
-            <a:ln>
-              <a:noFill/>
-            </a:ln>
-          </p:spPr>
-        </p:sp>
-      </p:grpSp>
-      <p:sp>
-        <p:nvSpPr>
-          <p:cNvPr id="12" name="Rectangle 11">
-            <a:extLst>
-              <a:ext uri="{FF2B5EF4-FFF2-40B4-BE49-F238E27FC236}">
-                <a16:creationId xmlns:a16="http://schemas.microsoft.com/office/drawing/2014/main" id="{899D8977-5473-482F-BDA7-24D7C5042ECA}"/>
+                <a16:creationId xmlns:a16="http://schemas.microsoft.com/office/drawing/2014/main" id="{F8FA804E-1D25-47B6-B418-617D700B0FE9}"/>
               </a:ext>
             </a:extLst>
           </p:cNvPr>
@@ -23260,246 +24503,484 @@
             </p:extLst>
           </p:nvPr>
         </p:nvSpPr>
-        <p:spPr>
-          <a:xfrm>
-            <a:off x="10437812" y="0"/>
-            <a:ext cx="685800" cy="1143000"/>
+        <p:spPr bwMode="gray">
+          <a:xfrm rot="16200000">
+            <a:off x="4973494" y="-361419"/>
+            <a:ext cx="5982968" cy="7580834"/>
           </a:xfrm>
-          <a:prstGeom prst="rect">
+          <a:custGeom>
             <a:avLst/>
-          </a:prstGeom>
-          <a:solidFill>
-            <a:schemeClr val="accent1"/>
-          </a:solidFill>
+            <a:gdLst>
+              <a:gd name="connsiteX0" fmla="*/ 5982968 w 5982968"/>
+              <a:gd name="connsiteY0" fmla="*/ 1177 h 7521140"/>
+              <a:gd name="connsiteX1" fmla="*/ 5982968 w 5982968"/>
+              <a:gd name="connsiteY1" fmla="*/ 1344715 h 7521140"/>
+              <a:gd name="connsiteX2" fmla="*/ 5982967 w 5982968"/>
+              <a:gd name="connsiteY2" fmla="*/ 1344715 h 7521140"/>
+              <a:gd name="connsiteX3" fmla="*/ 5982967 w 5982968"/>
+              <a:gd name="connsiteY3" fmla="*/ 6152387 h 7521140"/>
+              <a:gd name="connsiteX4" fmla="*/ 5982968 w 5982968"/>
+              <a:gd name="connsiteY4" fmla="*/ 6152387 h 7521140"/>
+              <a:gd name="connsiteX5" fmla="*/ 5982968 w 5982968"/>
+              <a:gd name="connsiteY5" fmla="*/ 7521140 h 7521140"/>
+              <a:gd name="connsiteX6" fmla="*/ 0 w 5982968"/>
+              <a:gd name="connsiteY6" fmla="*/ 7521140 h 7521140"/>
+              <a:gd name="connsiteX7" fmla="*/ 0 w 5982968"/>
+              <a:gd name="connsiteY7" fmla="*/ 6152387 h 7521140"/>
+              <a:gd name="connsiteX8" fmla="*/ 2 w 5982968"/>
+              <a:gd name="connsiteY8" fmla="*/ 6152387 h 7521140"/>
+              <a:gd name="connsiteX9" fmla="*/ 2 w 5982968"/>
+              <a:gd name="connsiteY9" fmla="*/ 905354 h 7521140"/>
+              <a:gd name="connsiteX10" fmla="*/ 3 w 5982968"/>
+              <a:gd name="connsiteY10" fmla="*/ 905354 h 7521140"/>
+              <a:gd name="connsiteX11" fmla="*/ 3 w 5982968"/>
+              <a:gd name="connsiteY11" fmla="*/ 0 h 7521140"/>
+              <a:gd name="connsiteX12" fmla="*/ 35302 w 5982968"/>
+              <a:gd name="connsiteY12" fmla="*/ 5883 h 7521140"/>
+              <a:gd name="connsiteX13" fmla="*/ 138808 w 5982968"/>
+              <a:gd name="connsiteY13" fmla="*/ 23197 h 7521140"/>
+              <a:gd name="connsiteX14" fmla="*/ 214194 w 5982968"/>
+              <a:gd name="connsiteY14" fmla="*/ 35299 h 7521140"/>
+              <a:gd name="connsiteX15" fmla="*/ 303938 w 5982968"/>
+              <a:gd name="connsiteY15" fmla="*/ 48074 h 7521140"/>
+              <a:gd name="connsiteX16" fmla="*/ 410435 w 5982968"/>
+              <a:gd name="connsiteY16" fmla="*/ 63370 h 7521140"/>
+              <a:gd name="connsiteX17" fmla="*/ 528299 w 5982968"/>
+              <a:gd name="connsiteY17" fmla="*/ 79507 h 7521140"/>
+              <a:gd name="connsiteX18" fmla="*/ 661121 w 5982968"/>
+              <a:gd name="connsiteY18" fmla="*/ 96484 h 7521140"/>
+              <a:gd name="connsiteX19" fmla="*/ 805909 w 5982968"/>
+              <a:gd name="connsiteY19" fmla="*/ 114469 h 7521140"/>
+              <a:gd name="connsiteX20" fmla="*/ 963260 w 5982968"/>
+              <a:gd name="connsiteY20" fmla="*/ 132455 h 7521140"/>
+              <a:gd name="connsiteX21" fmla="*/ 1130783 w 5982968"/>
+              <a:gd name="connsiteY21" fmla="*/ 150776 h 7521140"/>
+              <a:gd name="connsiteX22" fmla="*/ 1311469 w 5982968"/>
+              <a:gd name="connsiteY22" fmla="*/ 167753 h 7521140"/>
+              <a:gd name="connsiteX23" fmla="*/ 1500531 w 5982968"/>
+              <a:gd name="connsiteY23" fmla="*/ 184058 h 7521140"/>
+              <a:gd name="connsiteX24" fmla="*/ 1700362 w 5982968"/>
+              <a:gd name="connsiteY24" fmla="*/ 198850 h 7521140"/>
+              <a:gd name="connsiteX25" fmla="*/ 1908569 w 5982968"/>
+              <a:gd name="connsiteY25" fmla="*/ 212969 h 7521140"/>
+              <a:gd name="connsiteX26" fmla="*/ 2125751 w 5982968"/>
+              <a:gd name="connsiteY26" fmla="*/ 226249 h 7521140"/>
+              <a:gd name="connsiteX27" fmla="*/ 2237034 w 5982968"/>
+              <a:gd name="connsiteY27" fmla="*/ 230955 h 7521140"/>
+              <a:gd name="connsiteX28" fmla="*/ 2350710 w 5982968"/>
+              <a:gd name="connsiteY28" fmla="*/ 236166 h 7521140"/>
+              <a:gd name="connsiteX29" fmla="*/ 2466181 w 5982968"/>
+              <a:gd name="connsiteY29" fmla="*/ 241040 h 7521140"/>
+              <a:gd name="connsiteX30" fmla="*/ 2582251 w 5982968"/>
+              <a:gd name="connsiteY30" fmla="*/ 244234 h 7521140"/>
+              <a:gd name="connsiteX31" fmla="*/ 2700713 w 5982968"/>
+              <a:gd name="connsiteY31" fmla="*/ 247092 h 7521140"/>
+              <a:gd name="connsiteX32" fmla="*/ 2820373 w 5982968"/>
+              <a:gd name="connsiteY32" fmla="*/ 250117 h 7521140"/>
+              <a:gd name="connsiteX33" fmla="*/ 2942425 w 5982968"/>
+              <a:gd name="connsiteY33" fmla="*/ 252134 h 7521140"/>
+              <a:gd name="connsiteX34" fmla="*/ 3065674 w 5982968"/>
+              <a:gd name="connsiteY34" fmla="*/ 252134 h 7521140"/>
+              <a:gd name="connsiteX35" fmla="*/ 3190119 w 5982968"/>
+              <a:gd name="connsiteY35" fmla="*/ 253143 h 7521140"/>
+              <a:gd name="connsiteX36" fmla="*/ 3315762 w 5982968"/>
+              <a:gd name="connsiteY36" fmla="*/ 252134 h 7521140"/>
+              <a:gd name="connsiteX37" fmla="*/ 3443199 w 5982968"/>
+              <a:gd name="connsiteY37" fmla="*/ 250117 h 7521140"/>
+              <a:gd name="connsiteX38" fmla="*/ 3570636 w 5982968"/>
+              <a:gd name="connsiteY38" fmla="*/ 248268 h 7521140"/>
+              <a:gd name="connsiteX39" fmla="*/ 3699868 w 5982968"/>
+              <a:gd name="connsiteY39" fmla="*/ 244234 h 7521140"/>
+              <a:gd name="connsiteX40" fmla="*/ 3830297 w 5982968"/>
+              <a:gd name="connsiteY40" fmla="*/ 240032 h 7521140"/>
+              <a:gd name="connsiteX41" fmla="*/ 3960726 w 5982968"/>
+              <a:gd name="connsiteY41" fmla="*/ 235157 h 7521140"/>
+              <a:gd name="connsiteX42" fmla="*/ 4092351 w 5982968"/>
+              <a:gd name="connsiteY42" fmla="*/ 228266 h 7521140"/>
+              <a:gd name="connsiteX43" fmla="*/ 4225173 w 5982968"/>
+              <a:gd name="connsiteY43" fmla="*/ 220029 h 7521140"/>
+              <a:gd name="connsiteX44" fmla="*/ 4358593 w 5982968"/>
+              <a:gd name="connsiteY44" fmla="*/ 212129 h 7521140"/>
+              <a:gd name="connsiteX45" fmla="*/ 4492012 w 5982968"/>
+              <a:gd name="connsiteY45" fmla="*/ 202044 h 7521140"/>
+              <a:gd name="connsiteX46" fmla="*/ 4627228 w 5982968"/>
+              <a:gd name="connsiteY46" fmla="*/ 189941 h 7521140"/>
+              <a:gd name="connsiteX47" fmla="*/ 4760647 w 5982968"/>
+              <a:gd name="connsiteY47" fmla="*/ 177839 h 7521140"/>
+              <a:gd name="connsiteX48" fmla="*/ 4896461 w 5982968"/>
+              <a:gd name="connsiteY48" fmla="*/ 163887 h 7521140"/>
+              <a:gd name="connsiteX49" fmla="*/ 5032872 w 5982968"/>
+              <a:gd name="connsiteY49" fmla="*/ 148591 h 7521140"/>
+              <a:gd name="connsiteX50" fmla="*/ 5167489 w 5982968"/>
+              <a:gd name="connsiteY50" fmla="*/ 132455 h 7521140"/>
+              <a:gd name="connsiteX51" fmla="*/ 5303902 w 5982968"/>
+              <a:gd name="connsiteY51" fmla="*/ 113629 h 7521140"/>
+              <a:gd name="connsiteX52" fmla="*/ 5439714 w 5982968"/>
+              <a:gd name="connsiteY52" fmla="*/ 93458 h 7521140"/>
+              <a:gd name="connsiteX53" fmla="*/ 5576126 w 5982968"/>
+              <a:gd name="connsiteY53" fmla="*/ 73455 h 7521140"/>
+              <a:gd name="connsiteX54" fmla="*/ 5711939 w 5982968"/>
+              <a:gd name="connsiteY54" fmla="*/ 50091 h 7521140"/>
+              <a:gd name="connsiteX55" fmla="*/ 5847154 w 5982968"/>
+              <a:gd name="connsiteY55" fmla="*/ 26222 h 7521140"/>
+            </a:gdLst>
+            <a:ahLst/>
+            <a:cxnLst>
+              <a:cxn ang="0">
+                <a:pos x="connsiteX0" y="connsiteY0"/>
+              </a:cxn>
+              <a:cxn ang="0">
+                <a:pos x="connsiteX1" y="connsiteY1"/>
+              </a:cxn>
+              <a:cxn ang="0">
+                <a:pos x="connsiteX2" y="connsiteY2"/>
+              </a:cxn>
+              <a:cxn ang="0">
+                <a:pos x="connsiteX3" y="connsiteY3"/>
+              </a:cxn>
+              <a:cxn ang="0">
+                <a:pos x="connsiteX4" y="connsiteY4"/>
+              </a:cxn>
+              <a:cxn ang="0">
+                <a:pos x="connsiteX5" y="connsiteY5"/>
+              </a:cxn>
+              <a:cxn ang="0">
+                <a:pos x="connsiteX6" y="connsiteY6"/>
+              </a:cxn>
+              <a:cxn ang="0">
+                <a:pos x="connsiteX7" y="connsiteY7"/>
+              </a:cxn>
+              <a:cxn ang="0">
+                <a:pos x="connsiteX8" y="connsiteY8"/>
+              </a:cxn>
+              <a:cxn ang="0">
+                <a:pos x="connsiteX9" y="connsiteY9"/>
+              </a:cxn>
+              <a:cxn ang="0">
+                <a:pos x="connsiteX10" y="connsiteY10"/>
+              </a:cxn>
+              <a:cxn ang="0">
+                <a:pos x="connsiteX11" y="connsiteY11"/>
+              </a:cxn>
+              <a:cxn ang="0">
+                <a:pos x="connsiteX12" y="connsiteY12"/>
+              </a:cxn>
+              <a:cxn ang="0">
+                <a:pos x="connsiteX13" y="connsiteY13"/>
+              </a:cxn>
+              <a:cxn ang="0">
+                <a:pos x="connsiteX14" y="connsiteY14"/>
+              </a:cxn>
+              <a:cxn ang="0">
+                <a:pos x="connsiteX15" y="connsiteY15"/>
+              </a:cxn>
+              <a:cxn ang="0">
+                <a:pos x="connsiteX16" y="connsiteY16"/>
+              </a:cxn>
+              <a:cxn ang="0">
+                <a:pos x="connsiteX17" y="connsiteY17"/>
+              </a:cxn>
+              <a:cxn ang="0">
+                <a:pos x="connsiteX18" y="connsiteY18"/>
+              </a:cxn>
+              <a:cxn ang="0">
+                <a:pos x="connsiteX19" y="connsiteY19"/>
+              </a:cxn>
+              <a:cxn ang="0">
+                <a:pos x="connsiteX20" y="connsiteY20"/>
+              </a:cxn>
+              <a:cxn ang="0">
+                <a:pos x="connsiteX21" y="connsiteY21"/>
+              </a:cxn>
+              <a:cxn ang="0">
+                <a:pos x="connsiteX22" y="connsiteY22"/>
+              </a:cxn>
+              <a:cxn ang="0">
+                <a:pos x="connsiteX23" y="connsiteY23"/>
+              </a:cxn>
+              <a:cxn ang="0">
+                <a:pos x="connsiteX24" y="connsiteY24"/>
+              </a:cxn>
+              <a:cxn ang="0">
+                <a:pos x="connsiteX25" y="connsiteY25"/>
+              </a:cxn>
+              <a:cxn ang="0">
+                <a:pos x="connsiteX26" y="connsiteY26"/>
+              </a:cxn>
+              <a:cxn ang="0">
+                <a:pos x="connsiteX27" y="connsiteY27"/>
+              </a:cxn>
+              <a:cxn ang="0">
+                <a:pos x="connsiteX28" y="connsiteY28"/>
+              </a:cxn>
+              <a:cxn ang="0">
+                <a:pos x="connsiteX29" y="connsiteY29"/>
+              </a:cxn>
+              <a:cxn ang="0">
+                <a:pos x="connsiteX30" y="connsiteY30"/>
+              </a:cxn>
+              <a:cxn ang="0">
+                <a:pos x="connsiteX31" y="connsiteY31"/>
+              </a:cxn>
+              <a:cxn ang="0">
+                <a:pos x="connsiteX32" y="connsiteY32"/>
+              </a:cxn>
+              <a:cxn ang="0">
+                <a:pos x="connsiteX33" y="connsiteY33"/>
+              </a:cxn>
+              <a:cxn ang="0">
+                <a:pos x="connsiteX34" y="connsiteY34"/>
+              </a:cxn>
+              <a:cxn ang="0">
+                <a:pos x="connsiteX35" y="connsiteY35"/>
+              </a:cxn>
+              <a:cxn ang="0">
+                <a:pos x="connsiteX36" y="connsiteY36"/>
+              </a:cxn>
+              <a:cxn ang="0">
+                <a:pos x="connsiteX37" y="connsiteY37"/>
+              </a:cxn>
+              <a:cxn ang="0">
+                <a:pos x="connsiteX38" y="connsiteY38"/>
+              </a:cxn>
+              <a:cxn ang="0">
+                <a:pos x="connsiteX39" y="connsiteY39"/>
+              </a:cxn>
+              <a:cxn ang="0">
+                <a:pos x="connsiteX40" y="connsiteY40"/>
+              </a:cxn>
+              <a:cxn ang="0">
+                <a:pos x="connsiteX41" y="connsiteY41"/>
+              </a:cxn>
+              <a:cxn ang="0">
+                <a:pos x="connsiteX42" y="connsiteY42"/>
+              </a:cxn>
+              <a:cxn ang="0">
+                <a:pos x="connsiteX43" y="connsiteY43"/>
+              </a:cxn>
+              <a:cxn ang="0">
+                <a:pos x="connsiteX44" y="connsiteY44"/>
+              </a:cxn>
+              <a:cxn ang="0">
+                <a:pos x="connsiteX45" y="connsiteY45"/>
+              </a:cxn>
+              <a:cxn ang="0">
+                <a:pos x="connsiteX46" y="connsiteY46"/>
+              </a:cxn>
+              <a:cxn ang="0">
+                <a:pos x="connsiteX47" y="connsiteY47"/>
+              </a:cxn>
+              <a:cxn ang="0">
+                <a:pos x="connsiteX48" y="connsiteY48"/>
+              </a:cxn>
+              <a:cxn ang="0">
+                <a:pos x="connsiteX49" y="connsiteY49"/>
+              </a:cxn>
+              <a:cxn ang="0">
+                <a:pos x="connsiteX50" y="connsiteY50"/>
+              </a:cxn>
+              <a:cxn ang="0">
+                <a:pos x="connsiteX51" y="connsiteY51"/>
+              </a:cxn>
+              <a:cxn ang="0">
+                <a:pos x="connsiteX52" y="connsiteY52"/>
+              </a:cxn>
+              <a:cxn ang="0">
+                <a:pos x="connsiteX53" y="connsiteY53"/>
+              </a:cxn>
+              <a:cxn ang="0">
+                <a:pos x="connsiteX54" y="connsiteY54"/>
+              </a:cxn>
+              <a:cxn ang="0">
+                <a:pos x="connsiteX55" y="connsiteY55"/>
+              </a:cxn>
+            </a:cxnLst>
+            <a:rect l="l" t="t" r="r" b="b"/>
+            <a:pathLst>
+              <a:path w="5982968" h="7521140">
+                <a:moveTo>
+                  <a:pt x="5982968" y="1177"/>
+                </a:moveTo>
+                <a:lnTo>
+                  <a:pt x="5982968" y="1344715"/>
+                </a:lnTo>
+                <a:lnTo>
+                  <a:pt x="5982967" y="1344715"/>
+                </a:lnTo>
+                <a:lnTo>
+                  <a:pt x="5982967" y="6152387"/>
+                </a:lnTo>
+                <a:lnTo>
+                  <a:pt x="5982968" y="6152387"/>
+                </a:lnTo>
+                <a:lnTo>
+                  <a:pt x="5982968" y="7521140"/>
+                </a:lnTo>
+                <a:lnTo>
+                  <a:pt x="0" y="7521140"/>
+                </a:lnTo>
+                <a:lnTo>
+                  <a:pt x="0" y="6152387"/>
+                </a:lnTo>
+                <a:lnTo>
+                  <a:pt x="2" y="6152387"/>
+                </a:lnTo>
+                <a:lnTo>
+                  <a:pt x="2" y="905354"/>
+                </a:lnTo>
+                <a:lnTo>
+                  <a:pt x="3" y="905354"/>
+                </a:lnTo>
+                <a:lnTo>
+                  <a:pt x="3" y="0"/>
+                </a:lnTo>
+                <a:lnTo>
+                  <a:pt x="35302" y="5883"/>
+                </a:lnTo>
+                <a:lnTo>
+                  <a:pt x="138808" y="23197"/>
+                </a:lnTo>
+                <a:lnTo>
+                  <a:pt x="214194" y="35299"/>
+                </a:lnTo>
+                <a:lnTo>
+                  <a:pt x="303938" y="48074"/>
+                </a:lnTo>
+                <a:lnTo>
+                  <a:pt x="410435" y="63370"/>
+                </a:lnTo>
+                <a:lnTo>
+                  <a:pt x="528299" y="79507"/>
+                </a:lnTo>
+                <a:lnTo>
+                  <a:pt x="661121" y="96484"/>
+                </a:lnTo>
+                <a:lnTo>
+                  <a:pt x="805909" y="114469"/>
+                </a:lnTo>
+                <a:lnTo>
+                  <a:pt x="963260" y="132455"/>
+                </a:lnTo>
+                <a:lnTo>
+                  <a:pt x="1130783" y="150776"/>
+                </a:lnTo>
+                <a:lnTo>
+                  <a:pt x="1311469" y="167753"/>
+                </a:lnTo>
+                <a:lnTo>
+                  <a:pt x="1500531" y="184058"/>
+                </a:lnTo>
+                <a:lnTo>
+                  <a:pt x="1700362" y="198850"/>
+                </a:lnTo>
+                <a:lnTo>
+                  <a:pt x="1908569" y="212969"/>
+                </a:lnTo>
+                <a:lnTo>
+                  <a:pt x="2125751" y="226249"/>
+                </a:lnTo>
+                <a:lnTo>
+                  <a:pt x="2237034" y="230955"/>
+                </a:lnTo>
+                <a:lnTo>
+                  <a:pt x="2350710" y="236166"/>
+                </a:lnTo>
+                <a:lnTo>
+                  <a:pt x="2466181" y="241040"/>
+                </a:lnTo>
+                <a:lnTo>
+                  <a:pt x="2582251" y="244234"/>
+                </a:lnTo>
+                <a:lnTo>
+                  <a:pt x="2700713" y="247092"/>
+                </a:lnTo>
+                <a:lnTo>
+                  <a:pt x="2820373" y="250117"/>
+                </a:lnTo>
+                <a:lnTo>
+                  <a:pt x="2942425" y="252134"/>
+                </a:lnTo>
+                <a:lnTo>
+                  <a:pt x="3065674" y="252134"/>
+                </a:lnTo>
+                <a:lnTo>
+                  <a:pt x="3190119" y="253143"/>
+                </a:lnTo>
+                <a:lnTo>
+                  <a:pt x="3315762" y="252134"/>
+                </a:lnTo>
+                <a:lnTo>
+                  <a:pt x="3443199" y="250117"/>
+                </a:lnTo>
+                <a:lnTo>
+                  <a:pt x="3570636" y="248268"/>
+                </a:lnTo>
+                <a:lnTo>
+                  <a:pt x="3699868" y="244234"/>
+                </a:lnTo>
+                <a:lnTo>
+                  <a:pt x="3830297" y="240032"/>
+                </a:lnTo>
+                <a:lnTo>
+                  <a:pt x="3960726" y="235157"/>
+                </a:lnTo>
+                <a:lnTo>
+                  <a:pt x="4092351" y="228266"/>
+                </a:lnTo>
+                <a:lnTo>
+                  <a:pt x="4225173" y="220029"/>
+                </a:lnTo>
+                <a:lnTo>
+                  <a:pt x="4358593" y="212129"/>
+                </a:lnTo>
+                <a:lnTo>
+                  <a:pt x="4492012" y="202044"/>
+                </a:lnTo>
+                <a:lnTo>
+                  <a:pt x="4627228" y="189941"/>
+                </a:lnTo>
+                <a:lnTo>
+                  <a:pt x="4760647" y="177839"/>
+                </a:lnTo>
+                <a:lnTo>
+                  <a:pt x="4896461" y="163887"/>
+                </a:lnTo>
+                <a:lnTo>
+                  <a:pt x="5032872" y="148591"/>
+                </a:lnTo>
+                <a:lnTo>
+                  <a:pt x="5167489" y="132455"/>
+                </a:lnTo>
+                <a:lnTo>
+                  <a:pt x="5303902" y="113629"/>
+                </a:lnTo>
+                <a:lnTo>
+                  <a:pt x="5439714" y="93458"/>
+                </a:lnTo>
+                <a:lnTo>
+                  <a:pt x="5576126" y="73455"/>
+                </a:lnTo>
+                <a:lnTo>
+                  <a:pt x="5711939" y="50091"/>
+                </a:lnTo>
+                <a:lnTo>
+                  <a:pt x="5847154" y="26222"/>
+                </a:lnTo>
+                <a:close/>
+              </a:path>
+            </a:pathLst>
+          </a:custGeom>
           <a:ln>
             <a:noFill/>
           </a:ln>
         </p:spPr>
-        <p:style>
-          <a:lnRef idx="1">
-            <a:schemeClr val="accent1"/>
-          </a:lnRef>
-          <a:fillRef idx="3">
-            <a:schemeClr val="accent1"/>
-          </a:fillRef>
-          <a:effectRef idx="2">
-            <a:schemeClr val="accent1"/>
-          </a:effectRef>
-          <a:fontRef idx="minor">
-            <a:schemeClr val="lt1"/>
-          </a:fontRef>
-        </p:style>
       </p:sp>
-      <p:grpSp>
-        <p:nvGrpSpPr>
-          <p:cNvPr id="14" name="Group 13">
+      <p:sp>
+        <p:nvSpPr>
+          <p:cNvPr id="6" name="Content Placeholder 5">
             <a:extLst>
               <a:ext uri="{FF2B5EF4-FFF2-40B4-BE49-F238E27FC236}">
-                <a16:creationId xmlns:a16="http://schemas.microsoft.com/office/drawing/2014/main" id="{F1ECA4FE-7D2F-4576-B767-3A5F5ABFE90F}"/>
-              </a:ext>
-            </a:extLst>
-          </p:cNvPr>
-          <p:cNvGrpSpPr>
-            <a:grpSpLocks noGrp="1" noUngrp="1" noRot="1" noChangeAspect="1" noMove="1" noResize="1"/>
-          </p:cNvGrpSpPr>
-          <p:nvPr>
-            <p:extLst>
-              <p:ext uri="{386F3935-93C4-4BCD-93E2-E3B085C9AB24}">
-                <p16:designElem xmlns:p16="http://schemas.microsoft.com/office/powerpoint/2015/main" val="1"/>
-              </p:ext>
-            </p:extLst>
-          </p:nvPr>
-        </p:nvGrpSpPr>
-        <p:grpSpPr>
-          <a:xfrm>
-            <a:off x="0" y="0"/>
-            <a:ext cx="12192000" cy="6858000"/>
-            <a:chOff x="0" y="0"/>
-            <a:chExt cx="12192000" cy="6858000"/>
-          </a:xfrm>
-        </p:grpSpPr>
-        <p:sp useBgFill="1">
-          <p:nvSpPr>
-            <p:cNvPr id="15" name="Rectangle 14">
-              <a:extLst>
-                <a:ext uri="{FF2B5EF4-FFF2-40B4-BE49-F238E27FC236}">
-                  <a16:creationId xmlns:a16="http://schemas.microsoft.com/office/drawing/2014/main" id="{5969441E-5462-4859-86CD-1737FDE36046}"/>
-                </a:ext>
-              </a:extLst>
-            </p:cNvPr>
-            <p:cNvSpPr/>
-            <p:nvPr>
-              <p:extLst>
-                <p:ext uri="{386F3935-93C4-4BCD-93E2-E3B085C9AB24}">
-                  <p16:designElem xmlns:p16="http://schemas.microsoft.com/office/powerpoint/2015/main" val="1"/>
-                </p:ext>
-              </p:extLst>
-            </p:nvPr>
-          </p:nvSpPr>
-          <p:spPr>
-            <a:xfrm>
-              <a:off x="0" y="0"/>
-              <a:ext cx="12192000" cy="6858000"/>
-            </a:xfrm>
-            <a:prstGeom prst="rect">
-              <a:avLst/>
-            </a:prstGeom>
-            <a:ln>
-              <a:noFill/>
-            </a:ln>
-          </p:spPr>
-          <p:style>
-            <a:lnRef idx="2">
-              <a:schemeClr val="accent1">
-                <a:shade val="50000"/>
-              </a:schemeClr>
-            </a:lnRef>
-            <a:fillRef idx="1">
-              <a:schemeClr val="accent1"/>
-            </a:fillRef>
-            <a:effectRef idx="0">
-              <a:schemeClr val="accent1"/>
-            </a:effectRef>
-            <a:fontRef idx="minor">
-              <a:schemeClr val="lt1"/>
-            </a:fontRef>
-          </p:style>
-        </p:sp>
-        <p:sp>
-          <p:nvSpPr>
-            <p:cNvPr id="16" name="Freeform 5">
-              <a:extLst>
-                <a:ext uri="{FF2B5EF4-FFF2-40B4-BE49-F238E27FC236}">
-                  <a16:creationId xmlns:a16="http://schemas.microsoft.com/office/drawing/2014/main" id="{596BD4B5-6833-40CC-96FE-EDC675634264}"/>
-                </a:ext>
-              </a:extLst>
-            </p:cNvPr>
-            <p:cNvSpPr>
-              <a:spLocks noEditPoints="1"/>
-            </p:cNvSpPr>
-            <p:nvPr>
-              <p:extLst>
-                <p:ext uri="{386F3935-93C4-4BCD-93E2-E3B085C9AB24}">
-                  <p16:designElem xmlns:p16="http://schemas.microsoft.com/office/powerpoint/2015/main" val="1"/>
-                </p:ext>
-              </p:extLst>
-            </p:nvPr>
-          </p:nvSpPr>
-          <p:spPr bwMode="gray">
-            <a:xfrm>
-              <a:off x="0" y="1587"/>
-              <a:ext cx="12192000" cy="6856413"/>
-            </a:xfrm>
-            <a:custGeom>
-              <a:avLst/>
-              <a:gdLst/>
-              <a:ahLst/>
-              <a:cxnLst/>
-              <a:rect l="0" t="0" r="r" b="b"/>
-              <a:pathLst>
-                <a:path w="15356" h="8638">
-                  <a:moveTo>
-                    <a:pt x="0" y="0"/>
-                  </a:moveTo>
-                  <a:lnTo>
-                    <a:pt x="0" y="8638"/>
-                  </a:lnTo>
-                  <a:lnTo>
-                    <a:pt x="15356" y="8638"/>
-                  </a:lnTo>
-                  <a:lnTo>
-                    <a:pt x="15356" y="0"/>
-                  </a:lnTo>
-                  <a:lnTo>
-                    <a:pt x="0" y="0"/>
-                  </a:lnTo>
-                  <a:close/>
-                  <a:moveTo>
-                    <a:pt x="14748" y="8038"/>
-                  </a:moveTo>
-                  <a:lnTo>
-                    <a:pt x="600" y="8038"/>
-                  </a:lnTo>
-                  <a:lnTo>
-                    <a:pt x="600" y="592"/>
-                  </a:lnTo>
-                  <a:lnTo>
-                    <a:pt x="14748" y="592"/>
-                  </a:lnTo>
-                  <a:lnTo>
-                    <a:pt x="14748" y="8038"/>
-                  </a:lnTo>
-                  <a:close/>
-                </a:path>
-              </a:pathLst>
-            </a:custGeom>
-            <a:solidFill>
-              <a:srgbClr val="FFFFFF"/>
-            </a:solidFill>
-            <a:ln>
-              <a:noFill/>
-            </a:ln>
-          </p:spPr>
-        </p:sp>
-      </p:grpSp>
-      <p:cxnSp>
-        <p:nvCxnSpPr>
-          <p:cNvPr id="18" name="Straight Connector 17">
-            <a:extLst>
-              <a:ext uri="{FF2B5EF4-FFF2-40B4-BE49-F238E27FC236}">
-                <a16:creationId xmlns:a16="http://schemas.microsoft.com/office/drawing/2014/main" id="{E81F53E2-F556-42FA-8D24-113839EE19F8}"/>
-              </a:ext>
-            </a:extLst>
-          </p:cNvPr>
-          <p:cNvCxnSpPr>
-            <a:cxnSpLocks noGrp="1" noRot="1" noChangeAspect="1" noMove="1" noResize="1" noEditPoints="1" noAdjustHandles="1" noChangeArrowheads="1" noChangeShapeType="1"/>
-          </p:cNvCxnSpPr>
-          <p:nvPr>
-            <p:extLst>
-              <p:ext uri="{386F3935-93C4-4BCD-93E2-E3B085C9AB24}">
-                <p16:designElem xmlns:p16="http://schemas.microsoft.com/office/powerpoint/2015/main" val="1"/>
-              </p:ext>
-            </p:extLst>
-          </p:nvPr>
-        </p:nvCxnSpPr>
-        <p:spPr>
-          <a:xfrm>
-            <a:off x="5758249" y="4166888"/>
-            <a:ext cx="675502" cy="0"/>
-          </a:xfrm>
-          <a:prstGeom prst="line">
-            <a:avLst/>
-          </a:prstGeom>
-          <a:ln w="12700">
-            <a:solidFill>
-              <a:schemeClr val="accent1">
-                <a:lumMod val="60000"/>
-                <a:lumOff val="40000"/>
-              </a:schemeClr>
-            </a:solidFill>
-          </a:ln>
-        </p:spPr>
-        <p:style>
-          <a:lnRef idx="1">
-            <a:schemeClr val="accent1"/>
-          </a:lnRef>
-          <a:fillRef idx="0">
-            <a:schemeClr val="accent1"/>
-          </a:fillRef>
-          <a:effectRef idx="0">
-            <a:schemeClr val="accent1"/>
-          </a:effectRef>
-          <a:fontRef idx="minor">
-            <a:schemeClr val="tx1"/>
-          </a:fontRef>
-        </p:style>
-      </p:cxnSp>
-      <p:sp>
-        <p:nvSpPr>
-          <p:cNvPr id="2" name="Title 1">
-            <a:extLst>
-              <a:ext uri="{FF2B5EF4-FFF2-40B4-BE49-F238E27FC236}">
-                <a16:creationId xmlns:a16="http://schemas.microsoft.com/office/drawing/2014/main" id="{BC60BBCF-41EE-4613-A99C-81485CFA4582}"/>
+                <a16:creationId xmlns:a16="http://schemas.microsoft.com/office/drawing/2014/main" id="{18310910-057D-49CC-9253-F8EB7D909AAA}"/>
               </a:ext>
             </a:extLst>
           </p:cNvPr>
@@ -23507,42 +24988,1588 @@
             <a:spLocks noGrp="1"/>
           </p:cNvSpPr>
           <p:nvPr>
-            <p:ph type="title"/>
+            <p:ph idx="1"/>
           </p:nvPr>
         </p:nvSpPr>
         <p:spPr>
           <a:xfrm>
-            <a:off x="1683171" y="1169773"/>
-            <a:ext cx="8825658" cy="2870161"/>
+            <a:off x="4808376" y="437513"/>
+            <a:ext cx="5984315" cy="5954325"/>
           </a:xfrm>
         </p:spPr>
         <p:txBody>
-          <a:bodyPr vert="horz" lIns="91440" tIns="45720" rIns="91440" bIns="45720" rtlCol="0" anchor="b">
+          <a:bodyPr anchor="ctr">
             <a:normAutofit/>
           </a:bodyPr>
           <a:lstStyle/>
           <a:p>
-            <a:pPr algn="ctr"/>
-            <a:r>
-              <a:rPr lang="en-US" sz="5400">
+            <a:endParaRPr lang="de-DE" sz="2000" dirty="0"/>
+          </a:p>
+        </p:txBody>
+      </p:sp>
+      <p:graphicFrame>
+        <p:nvGraphicFramePr>
+          <p:cNvPr id="14" name="Tabelle 1">
+            <a:extLst>
+              <a:ext uri="{FF2B5EF4-FFF2-40B4-BE49-F238E27FC236}">
+                <a16:creationId xmlns:a16="http://schemas.microsoft.com/office/drawing/2014/main" id="{994DE951-EC8A-4C05-9313-4E9222039367}"/>
+              </a:ext>
+            </a:extLst>
+          </p:cNvPr>
+          <p:cNvGraphicFramePr>
+            <a:graphicFrameLocks noGrp="1"/>
+          </p:cNvGraphicFramePr>
+          <p:nvPr>
+            <p:extLst>
+              <p:ext uri="{D42A27DB-BD31-4B8C-83A1-F6EECF244321}">
+                <p14:modId xmlns:p14="http://schemas.microsoft.com/office/powerpoint/2010/main" val="2971048762"/>
+              </p:ext>
+            </p:extLst>
+          </p:nvPr>
+        </p:nvGraphicFramePr>
+        <p:xfrm>
+          <a:off x="4695273" y="675284"/>
+          <a:ext cx="7015208" cy="5478781"/>
+        </p:xfrm>
+        <a:graphic>
+          <a:graphicData uri="http://schemas.openxmlformats.org/drawingml/2006/table">
+            <a:tbl>
+              <a:tblPr firstRow="1" firstCol="1" bandRow="1">
+                <a:tableStyleId>{5C22544A-7EE6-4342-B048-85BDC9FD1C3A}</a:tableStyleId>
+              </a:tblPr>
+              <a:tblGrid>
+                <a:gridCol w="314928">
+                  <a:extLst>
+                    <a:ext uri="{9D8B030D-6E8A-4147-A177-3AD203B41FA5}">
+                      <a16:colId xmlns:a16="http://schemas.microsoft.com/office/drawing/2014/main" val="3288258713"/>
+                    </a:ext>
+                  </a:extLst>
+                </a:gridCol>
+                <a:gridCol w="2017170">
+                  <a:extLst>
+                    <a:ext uri="{9D8B030D-6E8A-4147-A177-3AD203B41FA5}">
+                      <a16:colId xmlns:a16="http://schemas.microsoft.com/office/drawing/2014/main" val="2867290163"/>
+                    </a:ext>
+                  </a:extLst>
+                </a:gridCol>
+                <a:gridCol w="2008509">
+                  <a:extLst>
+                    <a:ext uri="{9D8B030D-6E8A-4147-A177-3AD203B41FA5}">
+                      <a16:colId xmlns:a16="http://schemas.microsoft.com/office/drawing/2014/main" val="3204685979"/>
+                    </a:ext>
+                  </a:extLst>
+                </a:gridCol>
+                <a:gridCol w="1897494">
+                  <a:extLst>
+                    <a:ext uri="{9D8B030D-6E8A-4147-A177-3AD203B41FA5}">
+                      <a16:colId xmlns:a16="http://schemas.microsoft.com/office/drawing/2014/main" val="2549289383"/>
+                    </a:ext>
+                  </a:extLst>
+                </a:gridCol>
+                <a:gridCol w="777107">
+                  <a:extLst>
+                    <a:ext uri="{9D8B030D-6E8A-4147-A177-3AD203B41FA5}">
+                      <a16:colId xmlns:a16="http://schemas.microsoft.com/office/drawing/2014/main" val="2208314005"/>
+                    </a:ext>
+                  </a:extLst>
+                </a:gridCol>
+              </a:tblGrid>
+              <a:tr h="207445">
+                <a:tc>
+                  <a:txBody>
+                    <a:bodyPr/>
+                    <a:lstStyle/>
+                    <a:p>
+                      <a:pPr>
+                        <a:lnSpc>
+                          <a:spcPct val="107000"/>
+                        </a:lnSpc>
+                        <a:spcAft>
+                          <a:spcPts val="0"/>
+                        </a:spcAft>
+                      </a:pPr>
+                      <a:r>
+                        <a:rPr lang="de-DE" sz="1400" dirty="0" err="1">
+                          <a:effectLst/>
+                        </a:rPr>
+                        <a:t>Nr</a:t>
+                      </a:r>
+                      <a:endParaRPr lang="de-DE" sz="1400" dirty="0">
+                        <a:effectLst/>
+                        <a:latin typeface="Calibri" panose="020F0502020204030204" pitchFamily="34" charset="0"/>
+                        <a:ea typeface="Calibri" panose="020F0502020204030204" pitchFamily="34" charset="0"/>
+                        <a:cs typeface="Times New Roman" panose="02020603050405020304" pitchFamily="18" charset="0"/>
+                      </a:endParaRPr>
+                    </a:p>
+                  </a:txBody>
+                  <a:tcPr marL="68580" marR="68580" marT="0" marB="0"/>
+                </a:tc>
+                <a:tc>
+                  <a:txBody>
+                    <a:bodyPr/>
+                    <a:lstStyle/>
+                    <a:p>
+                      <a:pPr>
+                        <a:lnSpc>
+                          <a:spcPct val="107000"/>
+                        </a:lnSpc>
+                        <a:spcAft>
+                          <a:spcPts val="0"/>
+                        </a:spcAft>
+                      </a:pPr>
+                      <a:r>
+                        <a:rPr lang="de-DE" sz="1400">
+                          <a:effectLst/>
+                        </a:rPr>
+                        <a:t>Testschritt</a:t>
+                      </a:r>
+                      <a:endParaRPr lang="de-DE" sz="1400">
+                        <a:effectLst/>
+                        <a:latin typeface="Calibri" panose="020F0502020204030204" pitchFamily="34" charset="0"/>
+                        <a:ea typeface="Calibri" panose="020F0502020204030204" pitchFamily="34" charset="0"/>
+                        <a:cs typeface="Times New Roman" panose="02020603050405020304" pitchFamily="18" charset="0"/>
+                      </a:endParaRPr>
+                    </a:p>
+                  </a:txBody>
+                  <a:tcPr marL="68580" marR="68580" marT="0" marB="0"/>
+                </a:tc>
+                <a:tc>
+                  <a:txBody>
+                    <a:bodyPr/>
+                    <a:lstStyle/>
+                    <a:p>
+                      <a:pPr>
+                        <a:lnSpc>
+                          <a:spcPct val="107000"/>
+                        </a:lnSpc>
+                        <a:spcAft>
+                          <a:spcPts val="0"/>
+                        </a:spcAft>
+                      </a:pPr>
+                      <a:r>
+                        <a:rPr lang="de-DE" sz="1400" dirty="0">
+                          <a:effectLst/>
+                        </a:rPr>
+                        <a:t>Erwartetes Resultat</a:t>
+                      </a:r>
+                      <a:endParaRPr lang="de-DE" sz="1400" dirty="0">
+                        <a:effectLst/>
+                        <a:latin typeface="Calibri" panose="020F0502020204030204" pitchFamily="34" charset="0"/>
+                        <a:ea typeface="Calibri" panose="020F0502020204030204" pitchFamily="34" charset="0"/>
+                        <a:cs typeface="Times New Roman" panose="02020603050405020304" pitchFamily="18" charset="0"/>
+                      </a:endParaRPr>
+                    </a:p>
+                  </a:txBody>
+                  <a:tcPr marL="68580" marR="68580" marT="0" marB="0"/>
+                </a:tc>
+                <a:tc>
+                  <a:txBody>
+                    <a:bodyPr/>
+                    <a:lstStyle/>
+                    <a:p>
+                      <a:pPr>
+                        <a:lnSpc>
+                          <a:spcPct val="107000"/>
+                        </a:lnSpc>
+                        <a:spcAft>
+                          <a:spcPts val="0"/>
+                        </a:spcAft>
+                      </a:pPr>
+                      <a:r>
+                        <a:rPr lang="de-DE" sz="1400" dirty="0">
+                          <a:effectLst/>
+                        </a:rPr>
+                        <a:t>Testresultat</a:t>
+                      </a:r>
+                      <a:endParaRPr lang="de-DE" sz="1400" dirty="0">
+                        <a:effectLst/>
+                        <a:latin typeface="Calibri" panose="020F0502020204030204" pitchFamily="34" charset="0"/>
+                        <a:ea typeface="Calibri" panose="020F0502020204030204" pitchFamily="34" charset="0"/>
+                        <a:cs typeface="Times New Roman" panose="02020603050405020304" pitchFamily="18" charset="0"/>
+                      </a:endParaRPr>
+                    </a:p>
+                  </a:txBody>
+                  <a:tcPr marL="68580" marR="68580" marT="0" marB="0"/>
+                </a:tc>
+                <a:tc>
+                  <a:txBody>
+                    <a:bodyPr/>
+                    <a:lstStyle/>
+                    <a:p>
+                      <a:pPr>
+                        <a:lnSpc>
+                          <a:spcPct val="107000"/>
+                        </a:lnSpc>
+                        <a:spcAft>
+                          <a:spcPts val="0"/>
+                        </a:spcAft>
+                      </a:pPr>
+                      <a:r>
+                        <a:rPr lang="de-DE" sz="1400">
+                          <a:effectLst/>
+                        </a:rPr>
+                        <a:t>Erfüllt?</a:t>
+                      </a:r>
+                      <a:endParaRPr lang="de-DE" sz="1400">
+                        <a:effectLst/>
+                        <a:latin typeface="Calibri" panose="020F0502020204030204" pitchFamily="34" charset="0"/>
+                        <a:ea typeface="Calibri" panose="020F0502020204030204" pitchFamily="34" charset="0"/>
+                        <a:cs typeface="Times New Roman" panose="02020603050405020304" pitchFamily="18" charset="0"/>
+                      </a:endParaRPr>
+                    </a:p>
+                  </a:txBody>
+                  <a:tcPr marL="68580" marR="68580" marT="0" marB="0"/>
+                </a:tc>
+                <a:extLst>
+                  <a:ext uri="{0D108BD9-81ED-4DB2-BD59-A6C34878D82A}">
+                    <a16:rowId xmlns:a16="http://schemas.microsoft.com/office/drawing/2014/main" val="3161854765"/>
+                  </a:ext>
+                </a:extLst>
+              </a:tr>
+              <a:tr h="622333">
+                <a:tc>
+                  <a:txBody>
+                    <a:bodyPr/>
+                    <a:lstStyle/>
+                    <a:p>
+                      <a:pPr>
+                        <a:lnSpc>
+                          <a:spcPct val="107000"/>
+                        </a:lnSpc>
+                        <a:spcAft>
+                          <a:spcPts val="0"/>
+                        </a:spcAft>
+                      </a:pPr>
+                      <a:r>
+                        <a:rPr lang="de-DE" sz="1400">
+                          <a:effectLst/>
+                        </a:rPr>
+                        <a:t>1</a:t>
+                      </a:r>
+                      <a:endParaRPr lang="de-DE" sz="1400">
+                        <a:effectLst/>
+                        <a:latin typeface="Calibri" panose="020F0502020204030204" pitchFamily="34" charset="0"/>
+                        <a:ea typeface="Calibri" panose="020F0502020204030204" pitchFamily="34" charset="0"/>
+                        <a:cs typeface="Times New Roman" panose="02020603050405020304" pitchFamily="18" charset="0"/>
+                      </a:endParaRPr>
+                    </a:p>
+                  </a:txBody>
+                  <a:tcPr marL="68580" marR="68580" marT="0" marB="0"/>
+                </a:tc>
+                <a:tc>
+                  <a:txBody>
+                    <a:bodyPr/>
+                    <a:lstStyle/>
+                    <a:p>
+                      <a:pPr>
+                        <a:lnSpc>
+                          <a:spcPct val="107000"/>
+                        </a:lnSpc>
+                        <a:spcAft>
+                          <a:spcPts val="0"/>
+                        </a:spcAft>
+                      </a:pPr>
+                      <a:r>
+                        <a:rPr lang="de-DE" sz="1400">
+                          <a:effectLst/>
+                        </a:rPr>
+                        <a:t>Aufrufen der Startseite als Wähler </a:t>
+                      </a:r>
+                      <a:endParaRPr lang="de-DE" sz="1400">
+                        <a:effectLst/>
+                        <a:latin typeface="Calibri" panose="020F0502020204030204" pitchFamily="34" charset="0"/>
+                        <a:ea typeface="Calibri" panose="020F0502020204030204" pitchFamily="34" charset="0"/>
+                        <a:cs typeface="Times New Roman" panose="02020603050405020304" pitchFamily="18" charset="0"/>
+                      </a:endParaRPr>
+                    </a:p>
+                  </a:txBody>
+                  <a:tcPr marL="68580" marR="68580" marT="0" marB="0"/>
+                </a:tc>
+                <a:tc>
+                  <a:txBody>
+                    <a:bodyPr/>
+                    <a:lstStyle/>
+                    <a:p>
+                      <a:pPr>
+                        <a:lnSpc>
+                          <a:spcPct val="107000"/>
+                        </a:lnSpc>
+                        <a:spcAft>
+                          <a:spcPts val="0"/>
+                        </a:spcAft>
+                      </a:pPr>
+                      <a:r>
+                        <a:rPr lang="de-DE" sz="1400">
+                          <a:effectLst/>
+                        </a:rPr>
+                        <a:t>Aufforderung zum Scannen des Fingerabdrucks</a:t>
+                      </a:r>
+                      <a:endParaRPr lang="de-DE" sz="1400">
+                        <a:effectLst/>
+                        <a:latin typeface="Calibri" panose="020F0502020204030204" pitchFamily="34" charset="0"/>
+                        <a:ea typeface="Calibri" panose="020F0502020204030204" pitchFamily="34" charset="0"/>
+                        <a:cs typeface="Times New Roman" panose="02020603050405020304" pitchFamily="18" charset="0"/>
+                      </a:endParaRPr>
+                    </a:p>
+                  </a:txBody>
+                  <a:tcPr marL="68580" marR="68580" marT="0" marB="0"/>
+                </a:tc>
+                <a:tc>
+                  <a:txBody>
+                    <a:bodyPr/>
+                    <a:lstStyle/>
+                    <a:p>
+                      <a:pPr>
+                        <a:lnSpc>
+                          <a:spcPct val="107000"/>
+                        </a:lnSpc>
+                        <a:spcAft>
+                          <a:spcPts val="0"/>
+                        </a:spcAft>
+                      </a:pPr>
+                      <a:r>
+                        <a:rPr lang="de-DE" sz="1400">
+                          <a:effectLst/>
+                        </a:rPr>
+                        <a:t> </a:t>
+                      </a:r>
+                      <a:endParaRPr lang="de-DE" sz="1400">
+                        <a:effectLst/>
+                        <a:latin typeface="Calibri" panose="020F0502020204030204" pitchFamily="34" charset="0"/>
+                        <a:ea typeface="Calibri" panose="020F0502020204030204" pitchFamily="34" charset="0"/>
+                        <a:cs typeface="Times New Roman" panose="02020603050405020304" pitchFamily="18" charset="0"/>
+                      </a:endParaRPr>
+                    </a:p>
+                  </a:txBody>
+                  <a:tcPr marL="68580" marR="68580" marT="0" marB="0"/>
+                </a:tc>
+                <a:tc>
+                  <a:txBody>
+                    <a:bodyPr/>
+                    <a:lstStyle/>
+                    <a:p>
+                      <a:pPr>
+                        <a:lnSpc>
+                          <a:spcPct val="107000"/>
+                        </a:lnSpc>
+                        <a:spcAft>
+                          <a:spcPts val="0"/>
+                        </a:spcAft>
+                      </a:pPr>
+                      <a:r>
+                        <a:rPr lang="de-DE" sz="1400">
+                          <a:effectLst/>
+                        </a:rPr>
+                        <a:t> </a:t>
+                      </a:r>
+                      <a:endParaRPr lang="de-DE" sz="1400">
+                        <a:effectLst/>
+                        <a:latin typeface="Calibri" panose="020F0502020204030204" pitchFamily="34" charset="0"/>
+                        <a:ea typeface="Calibri" panose="020F0502020204030204" pitchFamily="34" charset="0"/>
+                        <a:cs typeface="Times New Roman" panose="02020603050405020304" pitchFamily="18" charset="0"/>
+                      </a:endParaRPr>
+                    </a:p>
+                  </a:txBody>
+                  <a:tcPr marL="68580" marR="68580" marT="0" marB="0"/>
+                </a:tc>
+                <a:extLst>
+                  <a:ext uri="{0D108BD9-81ED-4DB2-BD59-A6C34878D82A}">
+                    <a16:rowId xmlns:a16="http://schemas.microsoft.com/office/drawing/2014/main" val="1153301624"/>
+                  </a:ext>
+                </a:extLst>
+              </a:tr>
+              <a:tr h="829777">
+                <a:tc>
+                  <a:txBody>
+                    <a:bodyPr/>
+                    <a:lstStyle/>
+                    <a:p>
+                      <a:pPr>
+                        <a:lnSpc>
+                          <a:spcPct val="107000"/>
+                        </a:lnSpc>
+                        <a:spcAft>
+                          <a:spcPts val="0"/>
+                        </a:spcAft>
+                      </a:pPr>
+                      <a:r>
+                        <a:rPr lang="de-DE" sz="1400">
+                          <a:effectLst/>
+                        </a:rPr>
+                        <a:t>2</a:t>
+                      </a:r>
+                      <a:endParaRPr lang="de-DE" sz="1400">
+                        <a:effectLst/>
+                        <a:latin typeface="Calibri" panose="020F0502020204030204" pitchFamily="34" charset="0"/>
+                        <a:ea typeface="Calibri" panose="020F0502020204030204" pitchFamily="34" charset="0"/>
+                        <a:cs typeface="Times New Roman" panose="02020603050405020304" pitchFamily="18" charset="0"/>
+                      </a:endParaRPr>
+                    </a:p>
+                  </a:txBody>
+                  <a:tcPr marL="68580" marR="68580" marT="0" marB="0"/>
+                </a:tc>
+                <a:tc>
+                  <a:txBody>
+                    <a:bodyPr/>
+                    <a:lstStyle/>
+                    <a:p>
+                      <a:pPr>
+                        <a:lnSpc>
+                          <a:spcPct val="107000"/>
+                        </a:lnSpc>
+                        <a:spcAft>
+                          <a:spcPts val="0"/>
+                        </a:spcAft>
+                      </a:pPr>
+                      <a:r>
+                        <a:rPr lang="de-DE" sz="1400" dirty="0">
+                          <a:effectLst/>
+                        </a:rPr>
+                        <a:t>Fingerabdruck korrekt scannen</a:t>
+                      </a:r>
+                      <a:endParaRPr lang="de-DE" sz="1400" dirty="0">
+                        <a:effectLst/>
+                        <a:latin typeface="Calibri" panose="020F0502020204030204" pitchFamily="34" charset="0"/>
+                        <a:ea typeface="Calibri" panose="020F0502020204030204" pitchFamily="34" charset="0"/>
+                        <a:cs typeface="Times New Roman" panose="02020603050405020304" pitchFamily="18" charset="0"/>
+                      </a:endParaRPr>
+                    </a:p>
+                  </a:txBody>
+                  <a:tcPr marL="68580" marR="68580" marT="0" marB="0"/>
+                </a:tc>
+                <a:tc>
+                  <a:txBody>
+                    <a:bodyPr/>
+                    <a:lstStyle/>
+                    <a:p>
+                      <a:pPr>
+                        <a:lnSpc>
+                          <a:spcPct val="107000"/>
+                        </a:lnSpc>
+                        <a:spcAft>
+                          <a:spcPts val="0"/>
+                        </a:spcAft>
+                      </a:pPr>
+                      <a:r>
+                        <a:rPr lang="de-DE" sz="1400" dirty="0">
+                          <a:effectLst/>
+                        </a:rPr>
+                        <a:t>Übersichtseite des Wählers mit allen verfügbaren Wahlen erscheint.</a:t>
+                      </a:r>
+                      <a:endParaRPr lang="de-DE" sz="1400" dirty="0">
+                        <a:effectLst/>
+                        <a:latin typeface="Calibri" panose="020F0502020204030204" pitchFamily="34" charset="0"/>
+                        <a:ea typeface="Calibri" panose="020F0502020204030204" pitchFamily="34" charset="0"/>
+                        <a:cs typeface="Times New Roman" panose="02020603050405020304" pitchFamily="18" charset="0"/>
+                      </a:endParaRPr>
+                    </a:p>
+                  </a:txBody>
+                  <a:tcPr marL="68580" marR="68580" marT="0" marB="0"/>
+                </a:tc>
+                <a:tc>
+                  <a:txBody>
+                    <a:bodyPr/>
+                    <a:lstStyle/>
+                    <a:p>
+                      <a:pPr>
+                        <a:lnSpc>
+                          <a:spcPct val="107000"/>
+                        </a:lnSpc>
+                        <a:spcAft>
+                          <a:spcPts val="0"/>
+                        </a:spcAft>
+                      </a:pPr>
+                      <a:r>
+                        <a:rPr lang="de-DE" sz="1400" dirty="0">
+                          <a:effectLst/>
+                        </a:rPr>
+                        <a:t> </a:t>
+                      </a:r>
+                      <a:endParaRPr lang="de-DE" sz="1400" dirty="0">
+                        <a:effectLst/>
+                        <a:latin typeface="Calibri" panose="020F0502020204030204" pitchFamily="34" charset="0"/>
+                        <a:ea typeface="Calibri" panose="020F0502020204030204" pitchFamily="34" charset="0"/>
+                        <a:cs typeface="Times New Roman" panose="02020603050405020304" pitchFamily="18" charset="0"/>
+                      </a:endParaRPr>
+                    </a:p>
+                  </a:txBody>
+                  <a:tcPr marL="68580" marR="68580" marT="0" marB="0"/>
+                </a:tc>
+                <a:tc>
+                  <a:txBody>
+                    <a:bodyPr/>
+                    <a:lstStyle/>
+                    <a:p>
+                      <a:pPr>
+                        <a:lnSpc>
+                          <a:spcPct val="107000"/>
+                        </a:lnSpc>
+                        <a:spcAft>
+                          <a:spcPts val="0"/>
+                        </a:spcAft>
+                      </a:pPr>
+                      <a:r>
+                        <a:rPr lang="de-DE" sz="1400" dirty="0">
+                          <a:effectLst/>
+                        </a:rPr>
+                        <a:t> </a:t>
+                      </a:r>
+                      <a:endParaRPr lang="de-DE" sz="1400" dirty="0">
+                        <a:effectLst/>
+                        <a:latin typeface="Calibri" panose="020F0502020204030204" pitchFamily="34" charset="0"/>
+                        <a:ea typeface="Calibri" panose="020F0502020204030204" pitchFamily="34" charset="0"/>
+                        <a:cs typeface="Times New Roman" panose="02020603050405020304" pitchFamily="18" charset="0"/>
+                      </a:endParaRPr>
+                    </a:p>
+                  </a:txBody>
+                  <a:tcPr marL="68580" marR="68580" marT="0" marB="0"/>
+                </a:tc>
+                <a:extLst>
+                  <a:ext uri="{0D108BD9-81ED-4DB2-BD59-A6C34878D82A}">
+                    <a16:rowId xmlns:a16="http://schemas.microsoft.com/office/drawing/2014/main" val="1154934793"/>
+                  </a:ext>
+                </a:extLst>
+              </a:tr>
+              <a:tr h="414888">
+                <a:tc>
+                  <a:txBody>
+                    <a:bodyPr/>
+                    <a:lstStyle/>
+                    <a:p>
+                      <a:pPr>
+                        <a:lnSpc>
+                          <a:spcPct val="107000"/>
+                        </a:lnSpc>
+                        <a:spcAft>
+                          <a:spcPts val="0"/>
+                        </a:spcAft>
+                      </a:pPr>
+                      <a:r>
+                        <a:rPr lang="de-DE" sz="1400">
+                          <a:effectLst/>
+                        </a:rPr>
+                        <a:t>3</a:t>
+                      </a:r>
+                      <a:endParaRPr lang="de-DE" sz="1400">
+                        <a:effectLst/>
+                        <a:latin typeface="Calibri" panose="020F0502020204030204" pitchFamily="34" charset="0"/>
+                        <a:ea typeface="Calibri" panose="020F0502020204030204" pitchFamily="34" charset="0"/>
+                        <a:cs typeface="Times New Roman" panose="02020603050405020304" pitchFamily="18" charset="0"/>
+                      </a:endParaRPr>
+                    </a:p>
+                  </a:txBody>
+                  <a:tcPr marL="68580" marR="68580" marT="0" marB="0"/>
+                </a:tc>
+                <a:tc>
+                  <a:txBody>
+                    <a:bodyPr/>
+                    <a:lstStyle/>
+                    <a:p>
+                      <a:pPr>
+                        <a:lnSpc>
+                          <a:spcPct val="107000"/>
+                        </a:lnSpc>
+                        <a:spcAft>
+                          <a:spcPts val="0"/>
+                        </a:spcAft>
+                      </a:pPr>
+                      <a:r>
+                        <a:rPr lang="de-DE" sz="1400">
+                          <a:effectLst/>
+                        </a:rPr>
+                        <a:t>Eine Wahl auswählen</a:t>
+                      </a:r>
+                      <a:endParaRPr lang="de-DE" sz="1400">
+                        <a:effectLst/>
+                        <a:latin typeface="Calibri" panose="020F0502020204030204" pitchFamily="34" charset="0"/>
+                        <a:ea typeface="Calibri" panose="020F0502020204030204" pitchFamily="34" charset="0"/>
+                        <a:cs typeface="Times New Roman" panose="02020603050405020304" pitchFamily="18" charset="0"/>
+                      </a:endParaRPr>
+                    </a:p>
+                  </a:txBody>
+                  <a:tcPr marL="68580" marR="68580" marT="0" marB="0"/>
+                </a:tc>
+                <a:tc>
+                  <a:txBody>
+                    <a:bodyPr/>
+                    <a:lstStyle/>
+                    <a:p>
+                      <a:pPr>
+                        <a:lnSpc>
+                          <a:spcPct val="107000"/>
+                        </a:lnSpc>
+                        <a:spcAft>
+                          <a:spcPts val="0"/>
+                        </a:spcAft>
+                      </a:pPr>
+                      <a:r>
+                        <a:rPr lang="de-DE" sz="1400">
+                          <a:effectLst/>
+                        </a:rPr>
+                        <a:t>Digitaler Stimmzettel erscheint.</a:t>
+                      </a:r>
+                      <a:endParaRPr lang="de-DE" sz="1400">
+                        <a:effectLst/>
+                        <a:latin typeface="Calibri" panose="020F0502020204030204" pitchFamily="34" charset="0"/>
+                        <a:ea typeface="Calibri" panose="020F0502020204030204" pitchFamily="34" charset="0"/>
+                        <a:cs typeface="Times New Roman" panose="02020603050405020304" pitchFamily="18" charset="0"/>
+                      </a:endParaRPr>
+                    </a:p>
+                  </a:txBody>
+                  <a:tcPr marL="68580" marR="68580" marT="0" marB="0"/>
+                </a:tc>
+                <a:tc>
+                  <a:txBody>
+                    <a:bodyPr/>
+                    <a:lstStyle/>
+                    <a:p>
+                      <a:pPr>
+                        <a:lnSpc>
+                          <a:spcPct val="107000"/>
+                        </a:lnSpc>
+                        <a:spcAft>
+                          <a:spcPts val="0"/>
+                        </a:spcAft>
+                      </a:pPr>
+                      <a:r>
+                        <a:rPr lang="de-DE" sz="1400" dirty="0">
+                          <a:effectLst/>
+                        </a:rPr>
+                        <a:t> </a:t>
+                      </a:r>
+                      <a:endParaRPr lang="de-DE" sz="1400" dirty="0">
+                        <a:effectLst/>
+                        <a:latin typeface="Calibri" panose="020F0502020204030204" pitchFamily="34" charset="0"/>
+                        <a:ea typeface="Calibri" panose="020F0502020204030204" pitchFamily="34" charset="0"/>
+                        <a:cs typeface="Times New Roman" panose="02020603050405020304" pitchFamily="18" charset="0"/>
+                      </a:endParaRPr>
+                    </a:p>
+                  </a:txBody>
+                  <a:tcPr marL="68580" marR="68580" marT="0" marB="0"/>
+                </a:tc>
+                <a:tc>
+                  <a:txBody>
+                    <a:bodyPr/>
+                    <a:lstStyle/>
+                    <a:p>
+                      <a:pPr>
+                        <a:lnSpc>
+                          <a:spcPct val="107000"/>
+                        </a:lnSpc>
+                        <a:spcAft>
+                          <a:spcPts val="0"/>
+                        </a:spcAft>
+                      </a:pPr>
+                      <a:r>
+                        <a:rPr lang="de-DE" sz="1400">
+                          <a:effectLst/>
+                        </a:rPr>
+                        <a:t> </a:t>
+                      </a:r>
+                      <a:endParaRPr lang="de-DE" sz="1400">
+                        <a:effectLst/>
+                        <a:latin typeface="Calibri" panose="020F0502020204030204" pitchFamily="34" charset="0"/>
+                        <a:ea typeface="Calibri" panose="020F0502020204030204" pitchFamily="34" charset="0"/>
+                        <a:cs typeface="Times New Roman" panose="02020603050405020304" pitchFamily="18" charset="0"/>
+                      </a:endParaRPr>
+                    </a:p>
+                  </a:txBody>
+                  <a:tcPr marL="68580" marR="68580" marT="0" marB="0"/>
+                </a:tc>
+                <a:extLst>
+                  <a:ext uri="{0D108BD9-81ED-4DB2-BD59-A6C34878D82A}">
+                    <a16:rowId xmlns:a16="http://schemas.microsoft.com/office/drawing/2014/main" val="1477843011"/>
+                  </a:ext>
+                </a:extLst>
+              </a:tr>
+              <a:tr h="622333">
+                <a:tc>
+                  <a:txBody>
+                    <a:bodyPr/>
+                    <a:lstStyle/>
+                    <a:p>
+                      <a:pPr>
+                        <a:lnSpc>
+                          <a:spcPct val="107000"/>
+                        </a:lnSpc>
+                        <a:spcAft>
+                          <a:spcPts val="0"/>
+                        </a:spcAft>
+                      </a:pPr>
+                      <a:r>
+                        <a:rPr lang="de-DE" sz="1400">
+                          <a:effectLst/>
+                        </a:rPr>
+                        <a:t>4</a:t>
+                      </a:r>
+                      <a:endParaRPr lang="de-DE" sz="1400">
+                        <a:effectLst/>
+                        <a:latin typeface="Calibri" panose="020F0502020204030204" pitchFamily="34" charset="0"/>
+                        <a:ea typeface="Calibri" panose="020F0502020204030204" pitchFamily="34" charset="0"/>
+                        <a:cs typeface="Times New Roman" panose="02020603050405020304" pitchFamily="18" charset="0"/>
+                      </a:endParaRPr>
+                    </a:p>
+                  </a:txBody>
+                  <a:tcPr marL="68580" marR="68580" marT="0" marB="0"/>
+                </a:tc>
+                <a:tc>
+                  <a:txBody>
+                    <a:bodyPr/>
+                    <a:lstStyle/>
+                    <a:p>
+                      <a:pPr>
+                        <a:lnSpc>
+                          <a:spcPct val="107000"/>
+                        </a:lnSpc>
+                        <a:spcAft>
+                          <a:spcPts val="0"/>
+                        </a:spcAft>
+                      </a:pPr>
+                      <a:r>
+                        <a:rPr lang="de-DE" sz="1400" dirty="0">
+                          <a:effectLst/>
+                        </a:rPr>
+                        <a:t>Gewünschte Auswahl treffen und absenden</a:t>
+                      </a:r>
+                      <a:endParaRPr lang="de-DE" sz="1400" dirty="0">
+                        <a:effectLst/>
+                        <a:latin typeface="Calibri" panose="020F0502020204030204" pitchFamily="34" charset="0"/>
+                        <a:ea typeface="Calibri" panose="020F0502020204030204" pitchFamily="34" charset="0"/>
+                        <a:cs typeface="Times New Roman" panose="02020603050405020304" pitchFamily="18" charset="0"/>
+                      </a:endParaRPr>
+                    </a:p>
+                  </a:txBody>
+                  <a:tcPr marL="68580" marR="68580" marT="0" marB="0"/>
+                </a:tc>
+                <a:tc>
+                  <a:txBody>
+                    <a:bodyPr/>
+                    <a:lstStyle/>
+                    <a:p>
+                      <a:pPr>
+                        <a:lnSpc>
+                          <a:spcPct val="107000"/>
+                        </a:lnSpc>
+                        <a:spcAft>
+                          <a:spcPts val="0"/>
+                        </a:spcAft>
+                      </a:pPr>
+                      <a:r>
+                        <a:rPr lang="de-DE" sz="1400">
+                          <a:effectLst/>
+                        </a:rPr>
+                        <a:t>Aufforderung zum Scannen des Fingerabdrucks </a:t>
+                      </a:r>
+                      <a:endParaRPr lang="de-DE" sz="1400">
+                        <a:effectLst/>
+                        <a:latin typeface="Calibri" panose="020F0502020204030204" pitchFamily="34" charset="0"/>
+                        <a:ea typeface="Calibri" panose="020F0502020204030204" pitchFamily="34" charset="0"/>
+                        <a:cs typeface="Times New Roman" panose="02020603050405020304" pitchFamily="18" charset="0"/>
+                      </a:endParaRPr>
+                    </a:p>
+                  </a:txBody>
+                  <a:tcPr marL="68580" marR="68580" marT="0" marB="0"/>
+                </a:tc>
+                <a:tc>
+                  <a:txBody>
+                    <a:bodyPr/>
+                    <a:lstStyle/>
+                    <a:p>
+                      <a:pPr>
+                        <a:lnSpc>
+                          <a:spcPct val="107000"/>
+                        </a:lnSpc>
+                        <a:spcAft>
+                          <a:spcPts val="0"/>
+                        </a:spcAft>
+                      </a:pPr>
+                      <a:r>
+                        <a:rPr lang="de-DE" sz="1400">
+                          <a:effectLst/>
+                        </a:rPr>
+                        <a:t> </a:t>
+                      </a:r>
+                      <a:endParaRPr lang="de-DE" sz="1400">
+                        <a:effectLst/>
+                        <a:latin typeface="Calibri" panose="020F0502020204030204" pitchFamily="34" charset="0"/>
+                        <a:ea typeface="Calibri" panose="020F0502020204030204" pitchFamily="34" charset="0"/>
+                        <a:cs typeface="Times New Roman" panose="02020603050405020304" pitchFamily="18" charset="0"/>
+                      </a:endParaRPr>
+                    </a:p>
+                  </a:txBody>
+                  <a:tcPr marL="68580" marR="68580" marT="0" marB="0"/>
+                </a:tc>
+                <a:tc>
+                  <a:txBody>
+                    <a:bodyPr/>
+                    <a:lstStyle/>
+                    <a:p>
+                      <a:pPr>
+                        <a:lnSpc>
+                          <a:spcPct val="107000"/>
+                        </a:lnSpc>
+                        <a:spcAft>
+                          <a:spcPts val="0"/>
+                        </a:spcAft>
+                      </a:pPr>
+                      <a:r>
+                        <a:rPr lang="de-DE" sz="1400">
+                          <a:effectLst/>
+                        </a:rPr>
+                        <a:t> </a:t>
+                      </a:r>
+                      <a:endParaRPr lang="de-DE" sz="1400">
+                        <a:effectLst/>
+                        <a:latin typeface="Calibri" panose="020F0502020204030204" pitchFamily="34" charset="0"/>
+                        <a:ea typeface="Calibri" panose="020F0502020204030204" pitchFamily="34" charset="0"/>
+                        <a:cs typeface="Times New Roman" panose="02020603050405020304" pitchFamily="18" charset="0"/>
+                      </a:endParaRPr>
+                    </a:p>
+                  </a:txBody>
+                  <a:tcPr marL="68580" marR="68580" marT="0" marB="0"/>
+                </a:tc>
+                <a:extLst>
+                  <a:ext uri="{0D108BD9-81ED-4DB2-BD59-A6C34878D82A}">
+                    <a16:rowId xmlns:a16="http://schemas.microsoft.com/office/drawing/2014/main" val="285010453"/>
+                  </a:ext>
+                </a:extLst>
+              </a:tr>
+              <a:tr h="414888">
+                <a:tc>
+                  <a:txBody>
+                    <a:bodyPr/>
+                    <a:lstStyle/>
+                    <a:p>
+                      <a:pPr>
+                        <a:lnSpc>
+                          <a:spcPct val="107000"/>
+                        </a:lnSpc>
+                        <a:spcAft>
+                          <a:spcPts val="0"/>
+                        </a:spcAft>
+                      </a:pPr>
+                      <a:r>
+                        <a:rPr lang="de-DE" sz="1400">
+                          <a:effectLst/>
+                        </a:rPr>
+                        <a:t>5</a:t>
+                      </a:r>
+                      <a:endParaRPr lang="de-DE" sz="1400">
+                        <a:effectLst/>
+                        <a:latin typeface="Calibri" panose="020F0502020204030204" pitchFamily="34" charset="0"/>
+                        <a:ea typeface="Calibri" panose="020F0502020204030204" pitchFamily="34" charset="0"/>
+                        <a:cs typeface="Times New Roman" panose="02020603050405020304" pitchFamily="18" charset="0"/>
+                      </a:endParaRPr>
+                    </a:p>
+                  </a:txBody>
+                  <a:tcPr marL="68580" marR="68580" marT="0" marB="0"/>
+                </a:tc>
+                <a:tc>
+                  <a:txBody>
+                    <a:bodyPr/>
+                    <a:lstStyle/>
+                    <a:p>
+                      <a:pPr>
+                        <a:lnSpc>
+                          <a:spcPct val="107000"/>
+                        </a:lnSpc>
+                        <a:spcAft>
+                          <a:spcPts val="0"/>
+                        </a:spcAft>
+                      </a:pPr>
+                      <a:r>
+                        <a:rPr lang="de-DE" sz="1400">
+                          <a:effectLst/>
+                        </a:rPr>
+                        <a:t>Fingerabdruck korrekt scannen</a:t>
+                      </a:r>
+                      <a:endParaRPr lang="de-DE" sz="1400">
+                        <a:effectLst/>
+                        <a:latin typeface="Calibri" panose="020F0502020204030204" pitchFamily="34" charset="0"/>
+                        <a:ea typeface="Calibri" panose="020F0502020204030204" pitchFamily="34" charset="0"/>
+                        <a:cs typeface="Times New Roman" panose="02020603050405020304" pitchFamily="18" charset="0"/>
+                      </a:endParaRPr>
+                    </a:p>
+                  </a:txBody>
+                  <a:tcPr marL="68580" marR="68580" marT="0" marB="0"/>
+                </a:tc>
+                <a:tc>
+                  <a:txBody>
+                    <a:bodyPr/>
+                    <a:lstStyle/>
+                    <a:p>
+                      <a:pPr>
+                        <a:lnSpc>
+                          <a:spcPct val="107000"/>
+                        </a:lnSpc>
+                        <a:spcAft>
+                          <a:spcPts val="0"/>
+                        </a:spcAft>
+                      </a:pPr>
+                      <a:r>
+                        <a:rPr lang="de-DE" sz="1400">
+                          <a:effectLst/>
+                        </a:rPr>
+                        <a:t>Bestätigungsnachfrage erscheint.</a:t>
+                      </a:r>
+                      <a:endParaRPr lang="de-DE" sz="1400">
+                        <a:effectLst/>
+                        <a:latin typeface="Calibri" panose="020F0502020204030204" pitchFamily="34" charset="0"/>
+                        <a:ea typeface="Calibri" panose="020F0502020204030204" pitchFamily="34" charset="0"/>
+                        <a:cs typeface="Times New Roman" panose="02020603050405020304" pitchFamily="18" charset="0"/>
+                      </a:endParaRPr>
+                    </a:p>
+                  </a:txBody>
+                  <a:tcPr marL="68580" marR="68580" marT="0" marB="0"/>
+                </a:tc>
+                <a:tc>
+                  <a:txBody>
+                    <a:bodyPr/>
+                    <a:lstStyle/>
+                    <a:p>
+                      <a:pPr>
+                        <a:lnSpc>
+                          <a:spcPct val="107000"/>
+                        </a:lnSpc>
+                        <a:spcAft>
+                          <a:spcPts val="0"/>
+                        </a:spcAft>
+                      </a:pPr>
+                      <a:r>
+                        <a:rPr lang="de-DE" sz="1400">
+                          <a:effectLst/>
+                        </a:rPr>
+                        <a:t> </a:t>
+                      </a:r>
+                      <a:endParaRPr lang="de-DE" sz="1400">
+                        <a:effectLst/>
+                        <a:latin typeface="Calibri" panose="020F0502020204030204" pitchFamily="34" charset="0"/>
+                        <a:ea typeface="Calibri" panose="020F0502020204030204" pitchFamily="34" charset="0"/>
+                        <a:cs typeface="Times New Roman" panose="02020603050405020304" pitchFamily="18" charset="0"/>
+                      </a:endParaRPr>
+                    </a:p>
+                  </a:txBody>
+                  <a:tcPr marL="68580" marR="68580" marT="0" marB="0"/>
+                </a:tc>
+                <a:tc>
+                  <a:txBody>
+                    <a:bodyPr/>
+                    <a:lstStyle/>
+                    <a:p>
+                      <a:pPr>
+                        <a:lnSpc>
+                          <a:spcPct val="107000"/>
+                        </a:lnSpc>
+                        <a:spcAft>
+                          <a:spcPts val="0"/>
+                        </a:spcAft>
+                      </a:pPr>
+                      <a:r>
+                        <a:rPr lang="de-DE" sz="1400">
+                          <a:effectLst/>
+                        </a:rPr>
+                        <a:t> </a:t>
+                      </a:r>
+                      <a:endParaRPr lang="de-DE" sz="1400">
+                        <a:effectLst/>
+                        <a:latin typeface="Calibri" panose="020F0502020204030204" pitchFamily="34" charset="0"/>
+                        <a:ea typeface="Calibri" panose="020F0502020204030204" pitchFamily="34" charset="0"/>
+                        <a:cs typeface="Times New Roman" panose="02020603050405020304" pitchFamily="18" charset="0"/>
+                      </a:endParaRPr>
+                    </a:p>
+                  </a:txBody>
+                  <a:tcPr marL="68580" marR="68580" marT="0" marB="0"/>
+                </a:tc>
+                <a:extLst>
+                  <a:ext uri="{0D108BD9-81ED-4DB2-BD59-A6C34878D82A}">
+                    <a16:rowId xmlns:a16="http://schemas.microsoft.com/office/drawing/2014/main" val="1245430664"/>
+                  </a:ext>
+                </a:extLst>
+              </a:tr>
+              <a:tr h="829777">
+                <a:tc>
+                  <a:txBody>
+                    <a:bodyPr/>
+                    <a:lstStyle/>
+                    <a:p>
+                      <a:pPr>
+                        <a:lnSpc>
+                          <a:spcPct val="107000"/>
+                        </a:lnSpc>
+                        <a:spcAft>
+                          <a:spcPts val="0"/>
+                        </a:spcAft>
+                      </a:pPr>
+                      <a:r>
+                        <a:rPr lang="de-DE" sz="1400">
+                          <a:effectLst/>
+                        </a:rPr>
+                        <a:t>6</a:t>
+                      </a:r>
+                      <a:endParaRPr lang="de-DE" sz="1400">
+                        <a:effectLst/>
+                        <a:latin typeface="Calibri" panose="020F0502020204030204" pitchFamily="34" charset="0"/>
+                        <a:ea typeface="Calibri" panose="020F0502020204030204" pitchFamily="34" charset="0"/>
+                        <a:cs typeface="Times New Roman" panose="02020603050405020304" pitchFamily="18" charset="0"/>
+                      </a:endParaRPr>
+                    </a:p>
+                  </a:txBody>
+                  <a:tcPr marL="68580" marR="68580" marT="0" marB="0"/>
+                </a:tc>
+                <a:tc>
+                  <a:txBody>
+                    <a:bodyPr/>
+                    <a:lstStyle/>
+                    <a:p>
+                      <a:pPr>
+                        <a:lnSpc>
+                          <a:spcPct val="107000"/>
+                        </a:lnSpc>
+                        <a:spcAft>
+                          <a:spcPts val="0"/>
+                        </a:spcAft>
+                      </a:pPr>
+                      <a:r>
+                        <a:rPr lang="de-DE" sz="1400">
+                          <a:effectLst/>
+                        </a:rPr>
+                        <a:t>Nachfrage bestätigen</a:t>
+                      </a:r>
+                      <a:endParaRPr lang="de-DE" sz="1400">
+                        <a:effectLst/>
+                        <a:latin typeface="Calibri" panose="020F0502020204030204" pitchFamily="34" charset="0"/>
+                        <a:ea typeface="Calibri" panose="020F0502020204030204" pitchFamily="34" charset="0"/>
+                        <a:cs typeface="Times New Roman" panose="02020603050405020304" pitchFamily="18" charset="0"/>
+                      </a:endParaRPr>
+                    </a:p>
+                  </a:txBody>
+                  <a:tcPr marL="68580" marR="68580" marT="0" marB="0"/>
+                </a:tc>
+                <a:tc>
+                  <a:txBody>
+                    <a:bodyPr/>
+                    <a:lstStyle/>
+                    <a:p>
+                      <a:pPr>
+                        <a:lnSpc>
+                          <a:spcPct val="107000"/>
+                        </a:lnSpc>
+                        <a:spcAft>
+                          <a:spcPts val="0"/>
+                        </a:spcAft>
+                      </a:pPr>
+                      <a:r>
+                        <a:rPr lang="de-DE" sz="1400">
+                          <a:effectLst/>
+                        </a:rPr>
+                        <a:t>Bestätigung über erfolgreiche Stimmabgabe erscheint.</a:t>
+                      </a:r>
+                      <a:endParaRPr lang="de-DE" sz="1400">
+                        <a:effectLst/>
+                        <a:latin typeface="Calibri" panose="020F0502020204030204" pitchFamily="34" charset="0"/>
+                        <a:ea typeface="Calibri" panose="020F0502020204030204" pitchFamily="34" charset="0"/>
+                        <a:cs typeface="Times New Roman" panose="02020603050405020304" pitchFamily="18" charset="0"/>
+                      </a:endParaRPr>
+                    </a:p>
+                  </a:txBody>
+                  <a:tcPr marL="68580" marR="68580" marT="0" marB="0"/>
+                </a:tc>
+                <a:tc>
+                  <a:txBody>
+                    <a:bodyPr/>
+                    <a:lstStyle/>
+                    <a:p>
+                      <a:pPr>
+                        <a:lnSpc>
+                          <a:spcPct val="107000"/>
+                        </a:lnSpc>
+                        <a:spcAft>
+                          <a:spcPts val="0"/>
+                        </a:spcAft>
+                      </a:pPr>
+                      <a:r>
+                        <a:rPr lang="de-DE" sz="1400">
+                          <a:effectLst/>
+                        </a:rPr>
+                        <a:t> </a:t>
+                      </a:r>
+                      <a:endParaRPr lang="de-DE" sz="1400">
+                        <a:effectLst/>
+                        <a:latin typeface="Calibri" panose="020F0502020204030204" pitchFamily="34" charset="0"/>
+                        <a:ea typeface="Calibri" panose="020F0502020204030204" pitchFamily="34" charset="0"/>
+                        <a:cs typeface="Times New Roman" panose="02020603050405020304" pitchFamily="18" charset="0"/>
+                      </a:endParaRPr>
+                    </a:p>
+                  </a:txBody>
+                  <a:tcPr marL="68580" marR="68580" marT="0" marB="0"/>
+                </a:tc>
+                <a:tc>
+                  <a:txBody>
+                    <a:bodyPr/>
+                    <a:lstStyle/>
+                    <a:p>
+                      <a:pPr>
+                        <a:lnSpc>
+                          <a:spcPct val="107000"/>
+                        </a:lnSpc>
+                        <a:spcAft>
+                          <a:spcPts val="0"/>
+                        </a:spcAft>
+                      </a:pPr>
+                      <a:r>
+                        <a:rPr lang="de-DE" sz="1400">
+                          <a:effectLst/>
+                        </a:rPr>
+                        <a:t> </a:t>
+                      </a:r>
+                      <a:endParaRPr lang="de-DE" sz="1400">
+                        <a:effectLst/>
+                        <a:latin typeface="Calibri" panose="020F0502020204030204" pitchFamily="34" charset="0"/>
+                        <a:ea typeface="Calibri" panose="020F0502020204030204" pitchFamily="34" charset="0"/>
+                        <a:cs typeface="Times New Roman" panose="02020603050405020304" pitchFamily="18" charset="0"/>
+                      </a:endParaRPr>
+                    </a:p>
+                  </a:txBody>
+                  <a:tcPr marL="68580" marR="68580" marT="0" marB="0"/>
+                </a:tc>
+                <a:extLst>
+                  <a:ext uri="{0D108BD9-81ED-4DB2-BD59-A6C34878D82A}">
+                    <a16:rowId xmlns:a16="http://schemas.microsoft.com/office/drawing/2014/main" val="3806733558"/>
+                  </a:ext>
+                </a:extLst>
+              </a:tr>
+              <a:tr h="829777">
+                <a:tc>
+                  <a:txBody>
+                    <a:bodyPr/>
+                    <a:lstStyle/>
+                    <a:p>
+                      <a:pPr>
+                        <a:lnSpc>
+                          <a:spcPct val="107000"/>
+                        </a:lnSpc>
+                        <a:spcAft>
+                          <a:spcPts val="0"/>
+                        </a:spcAft>
+                      </a:pPr>
+                      <a:r>
+                        <a:rPr lang="de-DE" sz="1400">
+                          <a:effectLst/>
+                        </a:rPr>
+                        <a:t>7</a:t>
+                      </a:r>
+                      <a:endParaRPr lang="de-DE" sz="1400">
+                        <a:effectLst/>
+                        <a:latin typeface="Calibri" panose="020F0502020204030204" pitchFamily="34" charset="0"/>
+                        <a:ea typeface="Calibri" panose="020F0502020204030204" pitchFamily="34" charset="0"/>
+                        <a:cs typeface="Times New Roman" panose="02020603050405020304" pitchFamily="18" charset="0"/>
+                      </a:endParaRPr>
+                    </a:p>
+                  </a:txBody>
+                  <a:tcPr marL="68580" marR="68580" marT="0" marB="0"/>
+                </a:tc>
+                <a:tc>
+                  <a:txBody>
+                    <a:bodyPr/>
+                    <a:lstStyle/>
+                    <a:p>
+                      <a:pPr>
+                        <a:lnSpc>
+                          <a:spcPct val="107000"/>
+                        </a:lnSpc>
+                        <a:spcAft>
+                          <a:spcPts val="0"/>
+                        </a:spcAft>
+                      </a:pPr>
+                      <a:r>
+                        <a:rPr lang="de-DE" sz="1400">
+                          <a:effectLst/>
+                        </a:rPr>
+                        <a:t>Bestätigung mit Ok schließen.</a:t>
+                      </a:r>
+                      <a:endParaRPr lang="de-DE" sz="1400">
+                        <a:effectLst/>
+                        <a:latin typeface="Calibri" panose="020F0502020204030204" pitchFamily="34" charset="0"/>
+                        <a:ea typeface="Calibri" panose="020F0502020204030204" pitchFamily="34" charset="0"/>
+                        <a:cs typeface="Times New Roman" panose="02020603050405020304" pitchFamily="18" charset="0"/>
+                      </a:endParaRPr>
+                    </a:p>
+                  </a:txBody>
+                  <a:tcPr marL="68580" marR="68580" marT="0" marB="0"/>
+                </a:tc>
+                <a:tc>
+                  <a:txBody>
+                    <a:bodyPr/>
+                    <a:lstStyle/>
+                    <a:p>
+                      <a:pPr>
+                        <a:lnSpc>
+                          <a:spcPct val="107000"/>
+                        </a:lnSpc>
+                        <a:spcAft>
+                          <a:spcPts val="0"/>
+                        </a:spcAft>
+                      </a:pPr>
+                      <a:r>
+                        <a:rPr lang="de-DE" sz="1400" dirty="0">
+                          <a:effectLst/>
+                        </a:rPr>
+                        <a:t>Übersicht erscheint ohne die Wahl für die gerade abgestimmt wurde.</a:t>
+                      </a:r>
+                      <a:endParaRPr lang="de-DE" sz="1400" dirty="0">
+                        <a:effectLst/>
+                        <a:latin typeface="Calibri" panose="020F0502020204030204" pitchFamily="34" charset="0"/>
+                        <a:ea typeface="Calibri" panose="020F0502020204030204" pitchFamily="34" charset="0"/>
+                        <a:cs typeface="Times New Roman" panose="02020603050405020304" pitchFamily="18" charset="0"/>
+                      </a:endParaRPr>
+                    </a:p>
+                  </a:txBody>
+                  <a:tcPr marL="68580" marR="68580" marT="0" marB="0"/>
+                </a:tc>
+                <a:tc>
+                  <a:txBody>
+                    <a:bodyPr/>
+                    <a:lstStyle/>
+                    <a:p>
+                      <a:pPr>
+                        <a:lnSpc>
+                          <a:spcPct val="107000"/>
+                        </a:lnSpc>
+                        <a:spcAft>
+                          <a:spcPts val="0"/>
+                        </a:spcAft>
+                      </a:pPr>
+                      <a:r>
+                        <a:rPr lang="de-DE" sz="1400">
+                          <a:effectLst/>
+                        </a:rPr>
+                        <a:t> </a:t>
+                      </a:r>
+                      <a:endParaRPr lang="de-DE" sz="1400">
+                        <a:effectLst/>
+                        <a:latin typeface="Calibri" panose="020F0502020204030204" pitchFamily="34" charset="0"/>
+                        <a:ea typeface="Calibri" panose="020F0502020204030204" pitchFamily="34" charset="0"/>
+                        <a:cs typeface="Times New Roman" panose="02020603050405020304" pitchFamily="18" charset="0"/>
+                      </a:endParaRPr>
+                    </a:p>
+                  </a:txBody>
+                  <a:tcPr marL="68580" marR="68580" marT="0" marB="0"/>
+                </a:tc>
+                <a:tc>
+                  <a:txBody>
+                    <a:bodyPr/>
+                    <a:lstStyle/>
+                    <a:p>
+                      <a:pPr>
+                        <a:lnSpc>
+                          <a:spcPct val="107000"/>
+                        </a:lnSpc>
+                        <a:spcAft>
+                          <a:spcPts val="0"/>
+                        </a:spcAft>
+                      </a:pPr>
+                      <a:r>
+                        <a:rPr lang="de-DE" sz="1400" dirty="0">
+                          <a:effectLst/>
+                        </a:rPr>
+                        <a:t> </a:t>
+                      </a:r>
+                      <a:endParaRPr lang="de-DE" sz="1400" dirty="0">
+                        <a:effectLst/>
+                        <a:latin typeface="Calibri" panose="020F0502020204030204" pitchFamily="34" charset="0"/>
+                        <a:ea typeface="Calibri" panose="020F0502020204030204" pitchFamily="34" charset="0"/>
+                        <a:cs typeface="Times New Roman" panose="02020603050405020304" pitchFamily="18" charset="0"/>
+                      </a:endParaRPr>
+                    </a:p>
+                  </a:txBody>
+                  <a:tcPr marL="68580" marR="68580" marT="0" marB="0"/>
+                </a:tc>
+                <a:extLst>
+                  <a:ext uri="{0D108BD9-81ED-4DB2-BD59-A6C34878D82A}">
+                    <a16:rowId xmlns:a16="http://schemas.microsoft.com/office/drawing/2014/main" val="1449983395"/>
+                  </a:ext>
+                </a:extLst>
+              </a:tr>
+            </a:tbl>
+          </a:graphicData>
+        </a:graphic>
+      </p:graphicFrame>
+      <p:sp>
+        <p:nvSpPr>
+          <p:cNvPr id="16" name="Rectangle 1">
+            <a:extLst>
+              <a:ext uri="{FF2B5EF4-FFF2-40B4-BE49-F238E27FC236}">
+                <a16:creationId xmlns:a16="http://schemas.microsoft.com/office/drawing/2014/main" id="{A2ABADA5-B6ED-4170-8B76-E30D65829EB2}"/>
+              </a:ext>
+            </a:extLst>
+          </p:cNvPr>
+          <p:cNvSpPr>
+            <a:spLocks noChangeArrowheads="1"/>
+          </p:cNvSpPr>
+          <p:nvPr/>
+        </p:nvSpPr>
+        <p:spPr bwMode="auto">
+          <a:xfrm>
+            <a:off x="731006" y="1709083"/>
+            <a:ext cx="3753973" cy="3411182"/>
+          </a:xfrm>
+          <a:prstGeom prst="rect">
+            <a:avLst/>
+          </a:prstGeom>
+          <a:noFill/>
+          <a:ln>
+            <a:noFill/>
+          </a:ln>
+          <a:effectLst/>
+          <a:extLst>
+            <a:ext uri="{909E8E84-426E-40DD-AFC4-6F175D3DCCD1}">
+              <a14:hiddenFill xmlns:a14="http://schemas.microsoft.com/office/drawing/2010/main">
+                <a:solidFill>
+                  <a:schemeClr val="accent1"/>
+                </a:solidFill>
+              </a14:hiddenFill>
+            </a:ext>
+            <a:ext uri="{91240B29-F687-4F45-9708-019B960494DF}">
+              <a14:hiddenLine xmlns:a14="http://schemas.microsoft.com/office/drawing/2010/main" w="9525">
                 <a:solidFill>
                   <a:schemeClr val="tx1"/>
                 </a:solidFill>
+                <a:miter lim="800000"/>
+                <a:headEnd/>
+                <a:tailEnd/>
+              </a14:hiddenLine>
+            </a:ext>
+            <a:ext uri="{AF507438-7753-43E0-B8FC-AC1667EBCBE1}">
+              <a14:hiddenEffects xmlns:a14="http://schemas.microsoft.com/office/drawing/2010/main">
+                <a:effectLst>
+                  <a:outerShdw dist="35921" dir="2700000" algn="ctr" rotWithShape="0">
+                    <a:schemeClr val="bg2"/>
+                  </a:outerShdw>
+                </a:effectLst>
+              </a14:hiddenEffects>
+            </a:ext>
+          </a:extLst>
+        </p:spPr>
+        <p:txBody>
+          <a:bodyPr vert="horz" wrap="square" lIns="91440" tIns="25392" rIns="91440" bIns="0" numCol="1" anchor="ctr" anchorCtr="0" compatLnSpc="1">
+            <a:prstTxWarp prst="textNoShape">
+              <a:avLst/>
+            </a:prstTxWarp>
+            <a:spAutoFit/>
+          </a:bodyPr>
+          <a:lstStyle/>
+          <a:p>
+            <a:pPr marL="0" marR="0" lvl="0" indent="0" defTabSz="914400" rtl="0" eaLnBrk="0" fontAlgn="base" latinLnBrk="0" hangingPunct="0">
+              <a:lnSpc>
+                <a:spcPct val="100000"/>
+              </a:lnSpc>
+              <a:spcBef>
+                <a:spcPct val="0"/>
+              </a:spcBef>
+              <a:spcAft>
+                <a:spcPct val="0"/>
+              </a:spcAft>
+              <a:buClrTx/>
+              <a:buSzTx/>
+              <a:buFontTx/>
+              <a:buNone/>
+              <a:tabLst/>
+            </a:pPr>
+            <a:r>
+              <a:rPr kumimoji="0" lang="de-DE" altLang="de-DE" sz="2800" b="1" i="0" u="sng" strike="noStrike" cap="none" normalizeH="0" baseline="0" dirty="0">
+                <a:ln>
+                  <a:noFill/>
+                </a:ln>
+                <a:solidFill>
+                  <a:schemeClr val="bg2">
+                    <a:lumMod val="75000"/>
+                  </a:schemeClr>
+                </a:solidFill>
+                <a:effectLst/>
+                <a:latin typeface="Calibri Light" panose="020F0302020204030204" pitchFamily="34" charset="0"/>
+                <a:ea typeface="Times New Roman" panose="02020603050405020304" pitchFamily="18" charset="0"/>
+                <a:cs typeface="Times New Roman" panose="02020603050405020304" pitchFamily="18" charset="0"/>
               </a:rPr>
-              <a:t>Tools</a:t>
+              <a:t>A</a:t>
             </a:r>
+            <a:r>
+              <a:rPr kumimoji="0" lang="de-DE" altLang="de-DE" sz="2800" b="1" i="0" u="sng" strike="noStrike" cap="none" normalizeH="0" baseline="0" dirty="0" bmk="">
+                <a:ln>
+                  <a:noFill/>
+                </a:ln>
+                <a:solidFill>
+                  <a:schemeClr val="bg2">
+                    <a:lumMod val="75000"/>
+                  </a:schemeClr>
+                </a:solidFill>
+                <a:effectLst/>
+                <a:latin typeface="Calibri Light" panose="020F0302020204030204" pitchFamily="34" charset="0"/>
+                <a:ea typeface="Times New Roman" panose="02020603050405020304" pitchFamily="18" charset="0"/>
+                <a:cs typeface="Times New Roman" panose="02020603050405020304" pitchFamily="18" charset="0"/>
+              </a:rPr>
+              <a:t>kzeptanzkriterium 7</a:t>
+            </a:r>
+            <a:r>
+              <a:rPr kumimoji="0" lang="de-DE" altLang="de-DE" sz="2800" b="1" i="0" u="none" strike="noStrike" cap="none" normalizeH="0" baseline="0" dirty="0" bmk="">
+                <a:ln>
+                  <a:noFill/>
+                </a:ln>
+                <a:solidFill>
+                  <a:schemeClr val="bg2">
+                    <a:lumMod val="75000"/>
+                  </a:schemeClr>
+                </a:solidFill>
+                <a:effectLst/>
+                <a:latin typeface="Calibri Light" panose="020F0302020204030204" pitchFamily="34" charset="0"/>
+                <a:ea typeface="Times New Roman" panose="02020603050405020304" pitchFamily="18" charset="0"/>
+                <a:cs typeface="Times New Roman" panose="02020603050405020304" pitchFamily="18" charset="0"/>
+              </a:rPr>
+              <a:t>: Identifikation doppelt verifiziert: </a:t>
+            </a:r>
+            <a:br>
+              <a:rPr kumimoji="0" lang="de-DE" altLang="de-DE" sz="2800" b="1" i="0" u="none" strike="noStrike" cap="none" normalizeH="0" baseline="0" dirty="0" bmk="">
+                <a:ln>
+                  <a:noFill/>
+                </a:ln>
+                <a:solidFill>
+                  <a:schemeClr val="bg2">
+                    <a:lumMod val="75000"/>
+                  </a:schemeClr>
+                </a:solidFill>
+                <a:effectLst/>
+                <a:latin typeface="Calibri Light" panose="020F0302020204030204" pitchFamily="34" charset="0"/>
+                <a:ea typeface="Times New Roman" panose="02020603050405020304" pitchFamily="18" charset="0"/>
+                <a:cs typeface="Times New Roman" panose="02020603050405020304" pitchFamily="18" charset="0"/>
+              </a:rPr>
+            </a:br>
+            <a:r>
+              <a:rPr kumimoji="0" lang="de-DE" altLang="de-DE" sz="2800" b="1" i="0" u="none" strike="noStrike" cap="none" normalizeH="0" baseline="0" dirty="0" bmk="">
+                <a:ln>
+                  <a:noFill/>
+                </a:ln>
+                <a:solidFill>
+                  <a:schemeClr val="bg2">
+                    <a:lumMod val="75000"/>
+                  </a:schemeClr>
+                </a:solidFill>
+                <a:effectLst/>
+                <a:latin typeface="Calibri Light" panose="020F0302020204030204" pitchFamily="34" charset="0"/>
+                <a:ea typeface="Times New Roman" panose="02020603050405020304" pitchFamily="18" charset="0"/>
+                <a:cs typeface="Times New Roman" panose="02020603050405020304" pitchFamily="18" charset="0"/>
+              </a:rPr>
+              <a:t>vor dem Login, vor jeder Stimmabgabe</a:t>
+            </a:r>
+            <a:endParaRPr kumimoji="0" lang="de-DE" altLang="de-DE" sz="2800" b="0" i="0" u="none" strike="noStrike" cap="none" normalizeH="0" baseline="0" dirty="0">
+              <a:ln>
+                <a:noFill/>
+              </a:ln>
+              <a:solidFill>
+                <a:schemeClr val="bg2">
+                  <a:lumMod val="75000"/>
+                </a:schemeClr>
+              </a:solidFill>
+              <a:effectLst/>
+              <a:latin typeface="Calibri Light" panose="020F0302020204030204" pitchFamily="34" charset="0"/>
+              <a:ea typeface="Times New Roman" panose="02020603050405020304" pitchFamily="18" charset="0"/>
+              <a:cs typeface="Times New Roman" panose="02020603050405020304" pitchFamily="18" charset="0"/>
+            </a:endParaRPr>
+          </a:p>
+          <a:p>
+            <a:pPr marL="0" marR="0" lvl="0" indent="0" algn="l" defTabSz="914400" rtl="0" eaLnBrk="0" fontAlgn="base" latinLnBrk="0" hangingPunct="0">
+              <a:lnSpc>
+                <a:spcPct val="100000"/>
+              </a:lnSpc>
+              <a:spcBef>
+                <a:spcPct val="0"/>
+              </a:spcBef>
+              <a:spcAft>
+                <a:spcPct val="0"/>
+              </a:spcAft>
+              <a:buClrTx/>
+              <a:buSzTx/>
+              <a:buFontTx/>
+              <a:buNone/>
+              <a:tabLst/>
+            </a:pPr>
+            <a:r>
+              <a:rPr kumimoji="0" lang="de-DE" altLang="de-DE" sz="2000" b="0" i="0" u="none" strike="noStrike" cap="none" normalizeH="0" baseline="0" dirty="0">
+                <a:ln>
+                  <a:noFill/>
+                </a:ln>
+                <a:solidFill>
+                  <a:schemeClr val="bg1"/>
+                </a:solidFill>
+                <a:effectLst/>
+                <a:latin typeface="Arial" panose="020B0604020202020204" pitchFamily="34" charset="0"/>
+                <a:ea typeface="Calibri" panose="020F0502020204030204" pitchFamily="34" charset="0"/>
+                <a:cs typeface="Arial" panose="020B0604020202020204" pitchFamily="34" charset="0"/>
+              </a:rPr>
+              <a:t>7.1</a:t>
+            </a:r>
+            <a:endParaRPr kumimoji="0" lang="de-DE" altLang="de-DE" sz="2000" b="0" i="0" u="none" strike="noStrike" cap="none" normalizeH="0" baseline="0" dirty="0">
+              <a:ln>
+                <a:noFill/>
+              </a:ln>
+              <a:solidFill>
+                <a:schemeClr val="bg1"/>
+              </a:solidFill>
+              <a:effectLst/>
+            </a:endParaRPr>
+          </a:p>
+          <a:p>
+            <a:pPr marL="0" marR="0" lvl="0" indent="0" algn="l" defTabSz="914400" rtl="0" eaLnBrk="0" fontAlgn="base" latinLnBrk="0" hangingPunct="0">
+              <a:lnSpc>
+                <a:spcPct val="100000"/>
+              </a:lnSpc>
+              <a:spcBef>
+                <a:spcPct val="0"/>
+              </a:spcBef>
+              <a:spcAft>
+                <a:spcPct val="0"/>
+              </a:spcAft>
+              <a:buClrTx/>
+              <a:buSzTx/>
+              <a:buFontTx/>
+              <a:buNone/>
+              <a:tabLst/>
+            </a:pPr>
+            <a:r>
+              <a:rPr kumimoji="0" lang="de-DE" altLang="de-DE" sz="2000" b="0" i="0" u="none" strike="noStrike" cap="none" normalizeH="0" baseline="0" dirty="0">
+                <a:ln>
+                  <a:noFill/>
+                </a:ln>
+                <a:solidFill>
+                  <a:schemeClr val="bg1"/>
+                </a:solidFill>
+                <a:effectLst/>
+                <a:latin typeface="Arial" panose="020B0604020202020204" pitchFamily="34" charset="0"/>
+                <a:ea typeface="Calibri" panose="020F0502020204030204" pitchFamily="34" charset="0"/>
+                <a:cs typeface="Arial" panose="020B0604020202020204" pitchFamily="34" charset="0"/>
+              </a:rPr>
+              <a:t>Vorbedingung: Es muss mindestens eine Wahl für diesen Wähler aktiv sein.</a:t>
+            </a:r>
+            <a:endParaRPr kumimoji="0" lang="de-DE" altLang="de-DE" sz="2000" b="0" i="0" u="none" strike="noStrike" cap="none" normalizeH="0" baseline="0" dirty="0">
+              <a:ln>
+                <a:noFill/>
+              </a:ln>
+              <a:solidFill>
+                <a:schemeClr val="bg1"/>
+              </a:solidFill>
+              <a:effectLst/>
+              <a:latin typeface="Arial" panose="020B0604020202020204" pitchFamily="34" charset="0"/>
+            </a:endParaRPr>
           </a:p>
         </p:txBody>
       </p:sp>
     </p:spTree>
     <p:extLst>
       <p:ext uri="{BB962C8B-B14F-4D97-AF65-F5344CB8AC3E}">
-        <p14:creationId xmlns:p14="http://schemas.microsoft.com/office/powerpoint/2010/main" val="475045924"/>
+        <p14:creationId xmlns:p14="http://schemas.microsoft.com/office/powerpoint/2010/main" val="1113762419"/>
       </p:ext>
     </p:extLst>
   </p:cSld>
   <p:clrMapOvr>
-    <a:overrideClrMapping bg1="dk1" tx1="lt1" bg2="dk2" tx2="lt2" accent1="accent1" accent2="accent2" accent3="accent3" accent4="accent4" accent5="accent5" accent6="accent6" hlink="hlink" folHlink="folHlink"/>
+    <a:masterClrMapping/>
   </p:clrMapOvr>
 </p:sld>
 </file>

</xml_diff>

<commit_message>
Added some notes on the first slide
</commit_message>
<xml_diff>
--- a/Präsentation/YourChoice.pptx
+++ b/Präsentation/YourChoice.pptx
@@ -238,7 +238,7 @@
           <a:p>
             <a:fld id="{E4DEAD90-4A80-4B89-AD7F-4BDBF11CDDA5}" type="datetimeFigureOut">
               <a:rPr lang="de-DE" smtClean="0"/>
-              <a:t>22.03.2018</a:t>
+              <a:t>23.03.2018</a:t>
             </a:fld>
             <a:endParaRPr lang="de-DE"/>
           </a:p>
@@ -559,6 +559,97 @@
               <a:t>Online Wahlsystem</a:t>
             </a:r>
           </a:p>
+          <a:p>
+            <a:pPr marL="171450" indent="-171450">
+              <a:buFontTx/>
+              <a:buChar char="-"/>
+            </a:pPr>
+            <a:r>
+              <a:rPr lang="en-GB" dirty="0"/>
+              <a:t>N</a:t>
+            </a:r>
+            <a:r>
+              <a:rPr lang="de-DE" dirty="0" err="1"/>
+              <a:t>ame</a:t>
+            </a:r>
+            <a:r>
+              <a:rPr lang="de-DE" dirty="0"/>
+              <a:t> selbsterklärend</a:t>
+            </a:r>
+          </a:p>
+          <a:p>
+            <a:pPr marL="171450" indent="-171450">
+              <a:buFontTx/>
+              <a:buChar char="-"/>
+            </a:pPr>
+            <a:r>
+              <a:rPr lang="en-GB" dirty="0"/>
+              <a:t>T</a:t>
+            </a:r>
+            <a:r>
+              <a:rPr lang="de-DE" dirty="0" err="1"/>
+              <a:t>eamorganisation</a:t>
+            </a:r>
+            <a:endParaRPr lang="de-DE" dirty="0"/>
+          </a:p>
+          <a:p>
+            <a:pPr marL="628650" lvl="1" indent="-171450">
+              <a:buFontTx/>
+              <a:buChar char="-"/>
+            </a:pPr>
+            <a:r>
+              <a:rPr lang="en-GB" dirty="0"/>
+              <a:t>F</a:t>
+            </a:r>
+            <a:r>
+              <a:rPr lang="de-DE" dirty="0" err="1"/>
+              <a:t>rontend</a:t>
+            </a:r>
+            <a:r>
+              <a:rPr lang="de-DE" dirty="0"/>
+              <a:t>: Jonas H. (SL), Jonas K., Matthias und Tarik</a:t>
+            </a:r>
+          </a:p>
+          <a:p>
+            <a:pPr marL="628650" lvl="1" indent="-171450">
+              <a:buFontTx/>
+              <a:buChar char="-"/>
+            </a:pPr>
+            <a:r>
+              <a:rPr lang="en-GB" dirty="0"/>
+              <a:t>B</a:t>
+            </a:r>
+            <a:r>
+              <a:rPr lang="de-DE" dirty="0" err="1"/>
+              <a:t>ackend</a:t>
+            </a:r>
+            <a:r>
+              <a:rPr lang="de-DE" dirty="0"/>
+              <a:t>: Tobin (SL), Kathi, Carmen, Lukas, Anastasia</a:t>
+            </a:r>
+          </a:p>
+          <a:p>
+            <a:pPr marL="628650" lvl="1" indent="-171450">
+              <a:buFontTx/>
+              <a:buChar char="-"/>
+            </a:pPr>
+            <a:r>
+              <a:rPr lang="en-GB" dirty="0"/>
+              <a:t>K</a:t>
+            </a:r>
+            <a:r>
+              <a:rPr lang="de-DE" dirty="0" err="1"/>
+              <a:t>ann</a:t>
+            </a:r>
+            <a:r>
+              <a:rPr lang="de-DE" dirty="0"/>
+              <a:t> </a:t>
+            </a:r>
+            <a:r>
+              <a:rPr lang="de-DE"/>
+              <a:t>noch variieren</a:t>
+            </a:r>
+          </a:p>
         </p:txBody>
       </p:sp>
       <p:sp>
@@ -1565,7 +1656,7 @@
             <a:fld id="{5923F103-BC34-4FE4-A40E-EDDEECFDA5D0}" type="datetimeFigureOut">
               <a:rPr lang="en-US" dirty="0"/>
               <a:pPr/>
-              <a:t>22-Mar-18</a:t>
+              <a:t>3/23/2018</a:t>
             </a:fld>
             <a:endParaRPr lang="en-US" dirty="0"/>
           </a:p>
@@ -2653,7 +2744,7 @@
           <a:p>
             <a:fld id="{923A1CC3-2375-41D4-9E03-427CAF2A4C1A}" type="datetimeFigureOut">
               <a:rPr lang="en-US" dirty="0"/>
-              <a:t>22-Mar-18</a:t>
+              <a:t>3/23/2018</a:t>
             </a:fld>
             <a:endParaRPr lang="en-US" dirty="0"/>
           </a:p>
@@ -3633,7 +3724,7 @@
           <a:p>
             <a:fld id="{AFF16868-8199-4C2C-A5B1-63AEE139F88E}" type="datetimeFigureOut">
               <a:rPr lang="en-US" dirty="0"/>
-              <a:t>22-Mar-18</a:t>
+              <a:t>3/23/2018</a:t>
             </a:fld>
             <a:endParaRPr lang="en-US" dirty="0"/>
           </a:p>
@@ -4767,7 +4858,7 @@
           <a:p>
             <a:fld id="{AAD9FF7F-6988-44CC-821B-644E70CD2F73}" type="datetimeFigureOut">
               <a:rPr lang="en-US" dirty="0"/>
-              <a:t>22-Mar-18</a:t>
+              <a:t>3/23/2018</a:t>
             </a:fld>
             <a:endParaRPr lang="en-US" dirty="0"/>
           </a:p>
@@ -5800,7 +5891,7 @@
           <a:p>
             <a:fld id="{5C12C299-16B2-4475-990D-751901EACC14}" type="datetimeFigureOut">
               <a:rPr lang="en-US" dirty="0"/>
-              <a:t>22-Mar-18</a:t>
+              <a:t>3/23/2018</a:t>
             </a:fld>
             <a:endParaRPr lang="en-US" dirty="0"/>
           </a:p>
@@ -6460,7 +6551,7 @@
           <a:p>
             <a:fld id="{9FE86839-B9D8-4651-8783-F325ECE74E65}" type="datetimeFigureOut">
               <a:rPr lang="en-US" dirty="0"/>
-              <a:t>22-Mar-18</a:t>
+              <a:t>3/23/2018</a:t>
             </a:fld>
             <a:endParaRPr lang="en-US" dirty="0"/>
           </a:p>
@@ -7321,7 +7412,7 @@
           <a:p>
             <a:fld id="{FD484F64-32F6-45C5-931F-ADC1662401D0}" type="datetimeFigureOut">
               <a:rPr lang="en-US" dirty="0"/>
-              <a:t>22-Mar-18</a:t>
+              <a:t>3/23/2018</a:t>
             </a:fld>
             <a:endParaRPr lang="en-US" dirty="0"/>
           </a:p>
@@ -7511,7 +7602,7 @@
           <a:p>
             <a:fld id="{53086D93-FCAC-47E0-A2EE-787E62CA814C}" type="datetimeFigureOut">
               <a:rPr lang="en-US" dirty="0"/>
-              <a:t>22-Mar-18</a:t>
+              <a:t>3/23/2018</a:t>
             </a:fld>
             <a:endParaRPr lang="en-US" dirty="0"/>
           </a:p>
@@ -8483,7 +8574,7 @@
           <a:p>
             <a:fld id="{CDA879A6-0FD0-4734-A311-86BFCA472E6E}" type="datetimeFigureOut">
               <a:rPr lang="en-US" dirty="0"/>
-              <a:t>22-Mar-18</a:t>
+              <a:t>3/23/2018</a:t>
             </a:fld>
             <a:endParaRPr lang="en-US" dirty="0"/>
           </a:p>
@@ -8694,7 +8785,7 @@
           <a:p>
             <a:fld id="{19C9CA7B-DFD4-44B5-8C60-D14B8CD1FB59}" type="datetimeFigureOut">
               <a:rPr lang="en-US" dirty="0"/>
-              <a:t>22-Mar-18</a:t>
+              <a:t>3/23/2018</a:t>
             </a:fld>
             <a:endParaRPr lang="en-US" dirty="0"/>
           </a:p>
@@ -9728,7 +9819,7 @@
           <a:p>
             <a:fld id="{F34E6425-0181-43F2-84FC-787E803FD2F8}" type="datetimeFigureOut">
               <a:rPr lang="en-US" dirty="0"/>
-              <a:t>22-Mar-18</a:t>
+              <a:t>3/23/2018</a:t>
             </a:fld>
             <a:endParaRPr lang="en-US" dirty="0"/>
           </a:p>
@@ -10000,7 +10091,7 @@
           <a:p>
             <a:fld id="{3BDB8791-F1B0-41E7-B7FD-A781E65C4266}" type="datetimeFigureOut">
               <a:rPr lang="en-US" dirty="0"/>
-              <a:t>22-Mar-18</a:t>
+              <a:t>3/23/2018</a:t>
             </a:fld>
             <a:endParaRPr lang="en-US" dirty="0"/>
           </a:p>
@@ -10410,7 +10501,7 @@
           <a:p>
             <a:fld id="{5FDD63B2-E120-4ED8-B27B-C685F510A5FE}" type="datetimeFigureOut">
               <a:rPr lang="en-US" dirty="0"/>
-              <a:t>22-Mar-18</a:t>
+              <a:t>3/23/2018</a:t>
             </a:fld>
             <a:endParaRPr lang="en-US" dirty="0"/>
           </a:p>
@@ -10537,7 +10628,7 @@
           <a:p>
             <a:fld id="{7AA18ACC-A947-437B-A130-35BD54FDF1E9}" type="datetimeFigureOut">
               <a:rPr lang="en-US" dirty="0"/>
-              <a:t>22-Mar-18</a:t>
+              <a:t>3/23/2018</a:t>
             </a:fld>
             <a:endParaRPr lang="en-US" dirty="0"/>
           </a:p>
@@ -10632,7 +10723,7 @@
           <a:p>
             <a:fld id="{7C8D7E02-BCB8-4D50-A234-369438C08659}" type="datetimeFigureOut">
               <a:rPr lang="en-US" dirty="0"/>
-              <a:t>22-Mar-18</a:t>
+              <a:t>3/23/2018</a:t>
             </a:fld>
             <a:endParaRPr lang="en-US" dirty="0"/>
           </a:p>
@@ -11713,7 +11804,7 @@
           <a:p>
             <a:fld id="{76E86A4C-8E40-4F87-A4F0-01A0687C5742}" type="datetimeFigureOut">
               <a:rPr lang="en-US" dirty="0"/>
-              <a:t>22-Mar-18</a:t>
+              <a:t>3/23/2018</a:t>
             </a:fld>
             <a:endParaRPr lang="en-US" dirty="0"/>
           </a:p>
@@ -12821,7 +12912,7 @@
           <a:p>
             <a:fld id="{35E72C73-2D91-4E12-BA25-F0AA0C03599B}" type="datetimeFigureOut">
               <a:rPr lang="en-US" dirty="0"/>
-              <a:t>22-Mar-18</a:t>
+              <a:t>3/23/2018</a:t>
             </a:fld>
             <a:endParaRPr lang="en-US" dirty="0"/>
           </a:p>
@@ -13818,7 +13909,7 @@
           <a:p>
             <a:fld id="{2BE451C3-0FF4-47C4-B829-773ADF60F88C}" type="datetimeFigureOut">
               <a:rPr lang="en-US" dirty="0"/>
-              <a:t>22-Mar-18</a:t>
+              <a:t>3/23/2018</a:t>
             </a:fld>
             <a:endParaRPr lang="en-US" dirty="0"/>
           </a:p>

</xml_diff>